<commit_message>
Add the final presentation
</commit_message>
<xml_diff>
--- a/Presentation/Proect3_Group3.pptx
+++ b/Presentation/Proect3_Group3.pptx
@@ -3406,8 +3406,8 @@
         </p:nvSpPr>
         <p:spPr>
           <a:xfrm>
-            <a:off x="0" y="1033272"/>
-            <a:ext cx="12192000" cy="369332"/>
+            <a:off x="0" y="964585"/>
+            <a:ext cx="12192000" cy="307777"/>
           </a:xfrm>
           <a:prstGeom prst="rect">
             <a:avLst/>
@@ -3422,9 +3422,79 @@
           <a:p>
             <a:pPr algn="ctr"/>
             <a:r>
-              <a:rPr lang="en-US" dirty="0"/>
+              <a:rPr lang="en-US" sz="1400" dirty="0"/>
               <a:t>Jim piper, Lee Julia, Lu Ann, Walgama Jay</a:t>
             </a:r>
+          </a:p>
+        </p:txBody>
+      </p:sp>
+      <p:sp>
+        <p:nvSpPr>
+          <p:cNvPr id="5" name="TextBox 4">
+            <a:extLst>
+              <a:ext uri="{FF2B5EF4-FFF2-40B4-BE49-F238E27FC236}">
+                <a16:creationId xmlns:a16="http://schemas.microsoft.com/office/drawing/2014/main" id="{FD28AF83-D9E7-1048-AE8B-28A0B0876A75}"/>
+              </a:ext>
+            </a:extLst>
+          </p:cNvPr>
+          <p:cNvSpPr txBox="1"/>
+          <p:nvPr/>
+        </p:nvSpPr>
+        <p:spPr>
+          <a:xfrm>
+            <a:off x="0" y="2967335"/>
+            <a:ext cx="12192000" cy="923330"/>
+          </a:xfrm>
+          <a:prstGeom prst="rect">
+            <a:avLst/>
+          </a:prstGeom>
+          <a:noFill/>
+        </p:spPr>
+        <p:txBody>
+          <a:bodyPr wrap="square" rtlCol="0">
+            <a:spAutoFit/>
+          </a:bodyPr>
+          <a:lstStyle/>
+          <a:p>
+            <a:pPr algn="ctr"/>
+            <a:endParaRPr lang="en-US" b="0" dirty="0">
+              <a:solidFill>
+                <a:srgbClr val="D4D4D4"/>
+              </a:solidFill>
+              <a:effectLst/>
+              <a:highlight>
+                <a:srgbClr val="1E1E1E"/>
+              </a:highlight>
+              <a:latin typeface="Arial Rounded MT Bold" panose="020F0704030504030204" pitchFamily="34" charset="0"/>
+            </a:endParaRPr>
+          </a:p>
+          <a:p>
+            <a:pPr algn="ctr"/>
+            <a:r>
+              <a:rPr lang="en-US" b="1" dirty="0">
+                <a:solidFill>
+                  <a:srgbClr val="444444"/>
+                </a:solidFill>
+                <a:highlight>
+                  <a:srgbClr val="FFFFFF"/>
+                </a:highlight>
+                <a:latin typeface="Arial Rounded MT Bold" panose="020F0704030504030204" pitchFamily="34" charset="0"/>
+              </a:rPr>
+              <a:t>MLB Players from 1876-2015 Birthplaces </a:t>
+            </a:r>
+          </a:p>
+          <a:p>
+            <a:pPr algn="ctr"/>
+            <a:endParaRPr lang="en-US" b="0" i="0" dirty="0">
+              <a:solidFill>
+                <a:srgbClr val="444444"/>
+              </a:solidFill>
+              <a:effectLst/>
+              <a:highlight>
+                <a:srgbClr val="FFFFFF"/>
+              </a:highlight>
+              <a:latin typeface="Arial Rounded MT Bold" panose="020F0704030504030204" pitchFamily="34" charset="0"/>
+            </a:endParaRPr>
           </a:p>
         </p:txBody>
       </p:sp>

</xml_diff>

<commit_message>
added graphics to file
</commit_message>
<xml_diff>
--- a/Presentation/Proect3_Group3.pptx
+++ b/Presentation/Proect3_Group3.pptx
@@ -119,6 +119,7 @@
 <file path=ppt/revisionInfo.xml><?xml version="1.0" encoding="utf-8"?>
 <p1510:revInfo xmlns:a="http://schemas.openxmlformats.org/drawingml/2006/main" xmlns:r="http://schemas.openxmlformats.org/officeDocument/2006/relationships" xmlns:p1510="http://schemas.microsoft.com/office/powerpoint/2015/10/main">
   <p1510:revLst>
+    <p1510:client id="{C39F6B6F-DF65-45AA-B91E-27C5D666BD64}" v="4" dt="2024-07-23T02:09:43.693"/>
     <p1510:client id="{C9DAFF7B-E82D-426E-BEF2-3502DB69F227}" v="15" dt="2024-07-23T01:05:46.393"/>
   </p1510:revLst>
 </p1510:revInfo>
@@ -272,6 +273,84 @@
             <ac:spMk id="3" creationId="{45C7E082-7169-14B0-95F1-3B5E75C605D4}"/>
           </ac:spMkLst>
         </pc:spChg>
+      </pc:sldChg>
+    </pc:docChg>
+  </pc:docChgLst>
+  <pc:docChgLst>
+    <pc:chgData name="Jim Pieper" userId="70ec17d751b5d6ef" providerId="LiveId" clId="{C39F6B6F-DF65-45AA-B91E-27C5D666BD64}"/>
+    <pc:docChg chg="modSld">
+      <pc:chgData name="Jim Pieper" userId="70ec17d751b5d6ef" providerId="LiveId" clId="{C39F6B6F-DF65-45AA-B91E-27C5D666BD64}" dt="2024-07-23T02:10:33.465" v="33" actId="20577"/>
+      <pc:docMkLst>
+        <pc:docMk/>
+      </pc:docMkLst>
+      <pc:sldChg chg="addSp modSp mod">
+        <pc:chgData name="Jim Pieper" userId="70ec17d751b5d6ef" providerId="LiveId" clId="{C39F6B6F-DF65-45AA-B91E-27C5D666BD64}" dt="2024-07-23T02:10:33.465" v="33" actId="20577"/>
+        <pc:sldMkLst>
+          <pc:docMk/>
+          <pc:sldMk cId="1528074873" sldId="257"/>
+        </pc:sldMkLst>
+        <pc:spChg chg="mod">
+          <ac:chgData name="Jim Pieper" userId="70ec17d751b5d6ef" providerId="LiveId" clId="{C39F6B6F-DF65-45AA-B91E-27C5D666BD64}" dt="2024-07-23T02:10:33.465" v="33" actId="20577"/>
+          <ac:spMkLst>
+            <pc:docMk/>
+            <pc:sldMk cId="1528074873" sldId="257"/>
+            <ac:spMk id="3" creationId="{C604EF24-9696-F68D-65A3-5E01DE11245F}"/>
+          </ac:spMkLst>
+        </pc:spChg>
+        <pc:spChg chg="mod">
+          <ac:chgData name="Jim Pieper" userId="70ec17d751b5d6ef" providerId="LiveId" clId="{C39F6B6F-DF65-45AA-B91E-27C5D666BD64}" dt="2024-07-23T02:06:25.431" v="5" actId="1076"/>
+          <ac:spMkLst>
+            <pc:docMk/>
+            <pc:sldMk cId="1528074873" sldId="257"/>
+            <ac:spMk id="5" creationId="{FD28AF83-D9E7-1048-AE8B-28A0B0876A75}"/>
+          </ac:spMkLst>
+        </pc:spChg>
+        <pc:picChg chg="add mod">
+          <ac:chgData name="Jim Pieper" userId="70ec17d751b5d6ef" providerId="LiveId" clId="{C39F6B6F-DF65-45AA-B91E-27C5D666BD64}" dt="2024-07-23T02:06:31.552" v="7" actId="1076"/>
+          <ac:picMkLst>
+            <pc:docMk/>
+            <pc:sldMk cId="1528074873" sldId="257"/>
+            <ac:picMk id="6" creationId="{9C52897D-B685-6DCC-5113-6DB2721238BF}"/>
+          </ac:picMkLst>
+        </pc:picChg>
+      </pc:sldChg>
+      <pc:sldChg chg="addSp modSp mod">
+        <pc:chgData name="Jim Pieper" userId="70ec17d751b5d6ef" providerId="LiveId" clId="{C39F6B6F-DF65-45AA-B91E-27C5D666BD64}" dt="2024-07-23T02:07:37.816" v="22" actId="1076"/>
+        <pc:sldMkLst>
+          <pc:docMk/>
+          <pc:sldMk cId="2678295895" sldId="259"/>
+        </pc:sldMkLst>
+        <pc:picChg chg="add mod">
+          <ac:chgData name="Jim Pieper" userId="70ec17d751b5d6ef" providerId="LiveId" clId="{C39F6B6F-DF65-45AA-B91E-27C5D666BD64}" dt="2024-07-23T02:07:07.543" v="13" actId="1076"/>
+          <ac:picMkLst>
+            <pc:docMk/>
+            <pc:sldMk cId="2678295895" sldId="259"/>
+            <ac:picMk id="9" creationId="{A7A76F33-0B10-F6D9-CA7D-76126C88BF40}"/>
+          </ac:picMkLst>
+        </pc:picChg>
+        <pc:picChg chg="add mod">
+          <ac:chgData name="Jim Pieper" userId="70ec17d751b5d6ef" providerId="LiveId" clId="{C39F6B6F-DF65-45AA-B91E-27C5D666BD64}" dt="2024-07-23T02:07:37.816" v="22" actId="1076"/>
+          <ac:picMkLst>
+            <pc:docMk/>
+            <pc:sldMk cId="2678295895" sldId="259"/>
+            <ac:picMk id="11" creationId="{CDC7E4A5-3252-7697-A384-35B0D1C04FAC}"/>
+          </ac:picMkLst>
+        </pc:picChg>
+      </pc:sldChg>
+      <pc:sldChg chg="addSp modSp mod">
+        <pc:chgData name="Jim Pieper" userId="70ec17d751b5d6ef" providerId="LiveId" clId="{C39F6B6F-DF65-45AA-B91E-27C5D666BD64}" dt="2024-07-23T02:09:53.863" v="28" actId="1076"/>
+        <pc:sldMkLst>
+          <pc:docMk/>
+          <pc:sldMk cId="3650296232" sldId="260"/>
+        </pc:sldMkLst>
+        <pc:picChg chg="add mod">
+          <ac:chgData name="Jim Pieper" userId="70ec17d751b5d6ef" providerId="LiveId" clId="{C39F6B6F-DF65-45AA-B91E-27C5D666BD64}" dt="2024-07-23T02:09:53.863" v="28" actId="1076"/>
+          <ac:picMkLst>
+            <pc:docMk/>
+            <pc:sldMk cId="3650296232" sldId="260"/>
+            <ac:picMk id="5" creationId="{170D67A4-2436-81AE-9002-6E7534C3383F}"/>
+          </ac:picMkLst>
+        </pc:picChg>
       </pc:sldChg>
     </pc:docChg>
   </pc:docChgLst>
@@ -3588,7 +3667,7 @@
             <a:pPr algn="ctr"/>
             <a:r>
               <a:rPr lang="en-US" sz="1400" dirty="0"/>
-              <a:t>Jim piper, Lee Julia, Lu Ann, Walgama Jay</a:t>
+              <a:t>Jim Pieper, Lee Julia, Lu Ann, Walgama Jay</a:t>
             </a:r>
           </a:p>
         </p:txBody>
@@ -3607,7 +3686,7 @@
         </p:nvSpPr>
         <p:spPr>
           <a:xfrm>
-            <a:off x="0" y="2967335"/>
+            <a:off x="0" y="4462130"/>
             <a:ext cx="12192000" cy="923330"/>
           </a:xfrm>
           <a:prstGeom prst="rect">
@@ -3663,6 +3742,42 @@
           </a:p>
         </p:txBody>
       </p:sp>
+      <p:pic>
+        <p:nvPicPr>
+          <p:cNvPr id="6" name="Picture 5" descr="A baseball player in a helmet&#10;&#10;Description automatically generated">
+            <a:extLst>
+              <a:ext uri="{FF2B5EF4-FFF2-40B4-BE49-F238E27FC236}">
+                <a16:creationId xmlns:a16="http://schemas.microsoft.com/office/drawing/2014/main" id="{9C52897D-B685-6DCC-5113-6DB2721238BF}"/>
+              </a:ext>
+            </a:extLst>
+          </p:cNvPr>
+          <p:cNvPicPr>
+            <a:picLocks noChangeAspect="1"/>
+          </p:cNvPicPr>
+          <p:nvPr/>
+        </p:nvPicPr>
+        <p:blipFill>
+          <a:blip r:embed="rId2">
+            <a:extLst>
+              <a:ext uri="{28A0092B-C50C-407E-A947-70E740481C1C}">
+                <a14:useLocalDpi xmlns:a14="http://schemas.microsoft.com/office/drawing/2010/main" val="0"/>
+              </a:ext>
+            </a:extLst>
+          </a:blip>
+          <a:stretch>
+            <a:fillRect/>
+          </a:stretch>
+        </p:blipFill>
+        <p:spPr>
+          <a:xfrm>
+            <a:off x="3700338" y="1610916"/>
+            <a:ext cx="4441783" cy="2684442"/>
+          </a:xfrm>
+          <a:prstGeom prst="rect">
+            <a:avLst/>
+          </a:prstGeom>
+        </p:spPr>
+      </p:pic>
     </p:spTree>
     <p:extLst>
       <p:ext uri="{BB962C8B-B14F-4D97-AF65-F5344CB8AC3E}">
@@ -4261,6 +4376,78 @@
           </a:p>
         </p:txBody>
       </p:sp>
+      <p:pic>
+        <p:nvPicPr>
+          <p:cNvPr id="9" name="Picture 8" descr="A baseball logo with a ball and stars&#10;&#10;Description automatically generated">
+            <a:extLst>
+              <a:ext uri="{FF2B5EF4-FFF2-40B4-BE49-F238E27FC236}">
+                <a16:creationId xmlns:a16="http://schemas.microsoft.com/office/drawing/2014/main" id="{A7A76F33-0B10-F6D9-CA7D-76126C88BF40}"/>
+              </a:ext>
+            </a:extLst>
+          </p:cNvPr>
+          <p:cNvPicPr>
+            <a:picLocks noChangeAspect="1"/>
+          </p:cNvPicPr>
+          <p:nvPr/>
+        </p:nvPicPr>
+        <p:blipFill>
+          <a:blip r:embed="rId2">
+            <a:extLst>
+              <a:ext uri="{28A0092B-C50C-407E-A947-70E740481C1C}">
+                <a14:useLocalDpi xmlns:a14="http://schemas.microsoft.com/office/drawing/2010/main" val="0"/>
+              </a:ext>
+            </a:extLst>
+          </a:blip>
+          <a:stretch>
+            <a:fillRect/>
+          </a:stretch>
+        </p:blipFill>
+        <p:spPr>
+          <a:xfrm>
+            <a:off x="3248179" y="1457010"/>
+            <a:ext cx="2134304" cy="1251697"/>
+          </a:xfrm>
+          <a:prstGeom prst="rect">
+            <a:avLst/>
+          </a:prstGeom>
+        </p:spPr>
+      </p:pic>
+      <p:pic>
+        <p:nvPicPr>
+          <p:cNvPr id="11" name="Picture 10" descr="A logo of a baseball team&#10;&#10;Description automatically generated">
+            <a:extLst>
+              <a:ext uri="{FF2B5EF4-FFF2-40B4-BE49-F238E27FC236}">
+                <a16:creationId xmlns:a16="http://schemas.microsoft.com/office/drawing/2014/main" id="{CDC7E4A5-3252-7697-A384-35B0D1C04FAC}"/>
+              </a:ext>
+            </a:extLst>
+          </p:cNvPr>
+          <p:cNvPicPr>
+            <a:picLocks noChangeAspect="1"/>
+          </p:cNvPicPr>
+          <p:nvPr/>
+        </p:nvPicPr>
+        <p:blipFill>
+          <a:blip r:embed="rId3">
+            <a:extLst>
+              <a:ext uri="{28A0092B-C50C-407E-A947-70E740481C1C}">
+                <a14:useLocalDpi xmlns:a14="http://schemas.microsoft.com/office/drawing/2010/main" val="0"/>
+              </a:ext>
+            </a:extLst>
+          </a:blip>
+          <a:stretch>
+            <a:fillRect/>
+          </a:stretch>
+        </p:blipFill>
+        <p:spPr>
+          <a:xfrm>
+            <a:off x="9286386" y="1487826"/>
+            <a:ext cx="1045159" cy="1072663"/>
+          </a:xfrm>
+          <a:prstGeom prst="rect">
+            <a:avLst/>
+          </a:prstGeom>
+        </p:spPr>
+      </p:pic>
     </p:spTree>
     <p:extLst>
       <p:ext uri="{BB962C8B-B14F-4D97-AF65-F5344CB8AC3E}">
@@ -4444,6 +4631,42 @@
           </a:p>
         </p:txBody>
       </p:sp>
+      <p:pic>
+        <p:nvPicPr>
+          <p:cNvPr id="5" name="Picture 4" descr="A baseball bat and glove on a dirt field&#10;&#10;Description automatically generated">
+            <a:extLst>
+              <a:ext uri="{FF2B5EF4-FFF2-40B4-BE49-F238E27FC236}">
+                <a16:creationId xmlns:a16="http://schemas.microsoft.com/office/drawing/2014/main" id="{170D67A4-2436-81AE-9002-6E7534C3383F}"/>
+              </a:ext>
+            </a:extLst>
+          </p:cNvPr>
+          <p:cNvPicPr>
+            <a:picLocks noChangeAspect="1"/>
+          </p:cNvPicPr>
+          <p:nvPr/>
+        </p:nvPicPr>
+        <p:blipFill>
+          <a:blip r:embed="rId2">
+            <a:extLst>
+              <a:ext uri="{28A0092B-C50C-407E-A947-70E740481C1C}">
+                <a14:useLocalDpi xmlns:a14="http://schemas.microsoft.com/office/drawing/2010/main" val="0"/>
+              </a:ext>
+            </a:extLst>
+          </a:blip>
+          <a:stretch>
+            <a:fillRect/>
+          </a:stretch>
+        </p:blipFill>
+        <p:spPr>
+          <a:xfrm>
+            <a:off x="3473996" y="3653103"/>
+            <a:ext cx="4259658" cy="2839772"/>
+          </a:xfrm>
+          <a:prstGeom prst="rect">
+            <a:avLst/>
+          </a:prstGeom>
+        </p:spPr>
+      </p:pic>
     </p:spTree>
     <p:extLst>
       <p:ext uri="{BB962C8B-B14F-4D97-AF65-F5344CB8AC3E}">

</xml_diff>

<commit_message>
commit some changes to the presentation
</commit_message>
<xml_diff>
--- a/Presentation/Proect3_Group3.pptx
+++ b/Presentation/Proect3_Group3.pptx
@@ -9,7 +9,11 @@
     <p:sldId id="256" r:id="rId3"/>
     <p:sldId id="259" r:id="rId4"/>
     <p:sldId id="258" r:id="rId5"/>
-    <p:sldId id="260" r:id="rId6"/>
+    <p:sldId id="261" r:id="rId6"/>
+    <p:sldId id="262" r:id="rId7"/>
+    <p:sldId id="263" r:id="rId8"/>
+    <p:sldId id="260" r:id="rId9"/>
+    <p:sldId id="264" r:id="rId10"/>
   </p:sldIdLst>
   <p:sldSz cx="12192000" cy="6858000"/>
   <p:notesSz cx="6858000" cy="9144000"/>
@@ -127,6 +131,84 @@
 
 <file path=ppt/changesInfos/changesInfo1.xml><?xml version="1.0" encoding="utf-8"?>
 <pc:chgInfo xmlns:a="http://schemas.openxmlformats.org/drawingml/2006/main" xmlns:r="http://schemas.openxmlformats.org/officeDocument/2006/relationships" xmlns:ac="http://schemas.microsoft.com/office/drawing/2013/main/command" xmlns:pc="http://schemas.microsoft.com/office/powerpoint/2013/main/command">
+  <pc:docChgLst>
+    <pc:chgData name="Jim Pieper" userId="70ec17d751b5d6ef" providerId="LiveId" clId="{C39F6B6F-DF65-45AA-B91E-27C5D666BD64}"/>
+    <pc:docChg chg="modSld">
+      <pc:chgData name="Jim Pieper" userId="70ec17d751b5d6ef" providerId="LiveId" clId="{C39F6B6F-DF65-45AA-B91E-27C5D666BD64}" dt="2024-07-23T02:10:33.465" v="33" actId="20577"/>
+      <pc:docMkLst>
+        <pc:docMk/>
+      </pc:docMkLst>
+      <pc:sldChg chg="addSp modSp mod">
+        <pc:chgData name="Jim Pieper" userId="70ec17d751b5d6ef" providerId="LiveId" clId="{C39F6B6F-DF65-45AA-B91E-27C5D666BD64}" dt="2024-07-23T02:10:33.465" v="33" actId="20577"/>
+        <pc:sldMkLst>
+          <pc:docMk/>
+          <pc:sldMk cId="1528074873" sldId="257"/>
+        </pc:sldMkLst>
+        <pc:spChg chg="mod">
+          <ac:chgData name="Jim Pieper" userId="70ec17d751b5d6ef" providerId="LiveId" clId="{C39F6B6F-DF65-45AA-B91E-27C5D666BD64}" dt="2024-07-23T02:10:33.465" v="33" actId="20577"/>
+          <ac:spMkLst>
+            <pc:docMk/>
+            <pc:sldMk cId="1528074873" sldId="257"/>
+            <ac:spMk id="3" creationId="{C604EF24-9696-F68D-65A3-5E01DE11245F}"/>
+          </ac:spMkLst>
+        </pc:spChg>
+        <pc:spChg chg="mod">
+          <ac:chgData name="Jim Pieper" userId="70ec17d751b5d6ef" providerId="LiveId" clId="{C39F6B6F-DF65-45AA-B91E-27C5D666BD64}" dt="2024-07-23T02:06:25.431" v="5" actId="1076"/>
+          <ac:spMkLst>
+            <pc:docMk/>
+            <pc:sldMk cId="1528074873" sldId="257"/>
+            <ac:spMk id="5" creationId="{FD28AF83-D9E7-1048-AE8B-28A0B0876A75}"/>
+          </ac:spMkLst>
+        </pc:spChg>
+        <pc:picChg chg="add mod">
+          <ac:chgData name="Jim Pieper" userId="70ec17d751b5d6ef" providerId="LiveId" clId="{C39F6B6F-DF65-45AA-B91E-27C5D666BD64}" dt="2024-07-23T02:06:31.552" v="7" actId="1076"/>
+          <ac:picMkLst>
+            <pc:docMk/>
+            <pc:sldMk cId="1528074873" sldId="257"/>
+            <ac:picMk id="6" creationId="{9C52897D-B685-6DCC-5113-6DB2721238BF}"/>
+          </ac:picMkLst>
+        </pc:picChg>
+      </pc:sldChg>
+      <pc:sldChg chg="addSp modSp mod">
+        <pc:chgData name="Jim Pieper" userId="70ec17d751b5d6ef" providerId="LiveId" clId="{C39F6B6F-DF65-45AA-B91E-27C5D666BD64}" dt="2024-07-23T02:07:37.816" v="22" actId="1076"/>
+        <pc:sldMkLst>
+          <pc:docMk/>
+          <pc:sldMk cId="2678295895" sldId="259"/>
+        </pc:sldMkLst>
+        <pc:picChg chg="add mod">
+          <ac:chgData name="Jim Pieper" userId="70ec17d751b5d6ef" providerId="LiveId" clId="{C39F6B6F-DF65-45AA-B91E-27C5D666BD64}" dt="2024-07-23T02:07:07.543" v="13" actId="1076"/>
+          <ac:picMkLst>
+            <pc:docMk/>
+            <pc:sldMk cId="2678295895" sldId="259"/>
+            <ac:picMk id="9" creationId="{A7A76F33-0B10-F6D9-CA7D-76126C88BF40}"/>
+          </ac:picMkLst>
+        </pc:picChg>
+        <pc:picChg chg="add mod">
+          <ac:chgData name="Jim Pieper" userId="70ec17d751b5d6ef" providerId="LiveId" clId="{C39F6B6F-DF65-45AA-B91E-27C5D666BD64}" dt="2024-07-23T02:07:37.816" v="22" actId="1076"/>
+          <ac:picMkLst>
+            <pc:docMk/>
+            <pc:sldMk cId="2678295895" sldId="259"/>
+            <ac:picMk id="11" creationId="{CDC7E4A5-3252-7697-A384-35B0D1C04FAC}"/>
+          </ac:picMkLst>
+        </pc:picChg>
+      </pc:sldChg>
+      <pc:sldChg chg="addSp modSp mod">
+        <pc:chgData name="Jim Pieper" userId="70ec17d751b5d6ef" providerId="LiveId" clId="{C39F6B6F-DF65-45AA-B91E-27C5D666BD64}" dt="2024-07-23T02:09:53.863" v="28" actId="1076"/>
+        <pc:sldMkLst>
+          <pc:docMk/>
+          <pc:sldMk cId="3650296232" sldId="260"/>
+        </pc:sldMkLst>
+        <pc:picChg chg="add mod">
+          <ac:chgData name="Jim Pieper" userId="70ec17d751b5d6ef" providerId="LiveId" clId="{C39F6B6F-DF65-45AA-B91E-27C5D666BD64}" dt="2024-07-23T02:09:53.863" v="28" actId="1076"/>
+          <ac:picMkLst>
+            <pc:docMk/>
+            <pc:sldMk cId="3650296232" sldId="260"/>
+            <ac:picMk id="5" creationId="{170D67A4-2436-81AE-9002-6E7534C3383F}"/>
+          </ac:picMkLst>
+        </pc:picChg>
+      </pc:sldChg>
+    </pc:docChg>
+  </pc:docChgLst>
   <pc:docChgLst>
     <pc:chgData name="Julia Lee" userId="717c3f08ebd32c59" providerId="LiveId" clId="{C9DAFF7B-E82D-426E-BEF2-3502DB69F227}"/>
     <pc:docChg chg="undo custSel addSld modSld">
@@ -276,84 +358,6 @@
       </pc:sldChg>
     </pc:docChg>
   </pc:docChgLst>
-  <pc:docChgLst>
-    <pc:chgData name="Jim Pieper" userId="70ec17d751b5d6ef" providerId="LiveId" clId="{C39F6B6F-DF65-45AA-B91E-27C5D666BD64}"/>
-    <pc:docChg chg="modSld">
-      <pc:chgData name="Jim Pieper" userId="70ec17d751b5d6ef" providerId="LiveId" clId="{C39F6B6F-DF65-45AA-B91E-27C5D666BD64}" dt="2024-07-23T02:10:33.465" v="33" actId="20577"/>
-      <pc:docMkLst>
-        <pc:docMk/>
-      </pc:docMkLst>
-      <pc:sldChg chg="addSp modSp mod">
-        <pc:chgData name="Jim Pieper" userId="70ec17d751b5d6ef" providerId="LiveId" clId="{C39F6B6F-DF65-45AA-B91E-27C5D666BD64}" dt="2024-07-23T02:10:33.465" v="33" actId="20577"/>
-        <pc:sldMkLst>
-          <pc:docMk/>
-          <pc:sldMk cId="1528074873" sldId="257"/>
-        </pc:sldMkLst>
-        <pc:spChg chg="mod">
-          <ac:chgData name="Jim Pieper" userId="70ec17d751b5d6ef" providerId="LiveId" clId="{C39F6B6F-DF65-45AA-B91E-27C5D666BD64}" dt="2024-07-23T02:10:33.465" v="33" actId="20577"/>
-          <ac:spMkLst>
-            <pc:docMk/>
-            <pc:sldMk cId="1528074873" sldId="257"/>
-            <ac:spMk id="3" creationId="{C604EF24-9696-F68D-65A3-5E01DE11245F}"/>
-          </ac:spMkLst>
-        </pc:spChg>
-        <pc:spChg chg="mod">
-          <ac:chgData name="Jim Pieper" userId="70ec17d751b5d6ef" providerId="LiveId" clId="{C39F6B6F-DF65-45AA-B91E-27C5D666BD64}" dt="2024-07-23T02:06:25.431" v="5" actId="1076"/>
-          <ac:spMkLst>
-            <pc:docMk/>
-            <pc:sldMk cId="1528074873" sldId="257"/>
-            <ac:spMk id="5" creationId="{FD28AF83-D9E7-1048-AE8B-28A0B0876A75}"/>
-          </ac:spMkLst>
-        </pc:spChg>
-        <pc:picChg chg="add mod">
-          <ac:chgData name="Jim Pieper" userId="70ec17d751b5d6ef" providerId="LiveId" clId="{C39F6B6F-DF65-45AA-B91E-27C5D666BD64}" dt="2024-07-23T02:06:31.552" v="7" actId="1076"/>
-          <ac:picMkLst>
-            <pc:docMk/>
-            <pc:sldMk cId="1528074873" sldId="257"/>
-            <ac:picMk id="6" creationId="{9C52897D-B685-6DCC-5113-6DB2721238BF}"/>
-          </ac:picMkLst>
-        </pc:picChg>
-      </pc:sldChg>
-      <pc:sldChg chg="addSp modSp mod">
-        <pc:chgData name="Jim Pieper" userId="70ec17d751b5d6ef" providerId="LiveId" clId="{C39F6B6F-DF65-45AA-B91E-27C5D666BD64}" dt="2024-07-23T02:07:37.816" v="22" actId="1076"/>
-        <pc:sldMkLst>
-          <pc:docMk/>
-          <pc:sldMk cId="2678295895" sldId="259"/>
-        </pc:sldMkLst>
-        <pc:picChg chg="add mod">
-          <ac:chgData name="Jim Pieper" userId="70ec17d751b5d6ef" providerId="LiveId" clId="{C39F6B6F-DF65-45AA-B91E-27C5D666BD64}" dt="2024-07-23T02:07:07.543" v="13" actId="1076"/>
-          <ac:picMkLst>
-            <pc:docMk/>
-            <pc:sldMk cId="2678295895" sldId="259"/>
-            <ac:picMk id="9" creationId="{A7A76F33-0B10-F6D9-CA7D-76126C88BF40}"/>
-          </ac:picMkLst>
-        </pc:picChg>
-        <pc:picChg chg="add mod">
-          <ac:chgData name="Jim Pieper" userId="70ec17d751b5d6ef" providerId="LiveId" clId="{C39F6B6F-DF65-45AA-B91E-27C5D666BD64}" dt="2024-07-23T02:07:37.816" v="22" actId="1076"/>
-          <ac:picMkLst>
-            <pc:docMk/>
-            <pc:sldMk cId="2678295895" sldId="259"/>
-            <ac:picMk id="11" creationId="{CDC7E4A5-3252-7697-A384-35B0D1C04FAC}"/>
-          </ac:picMkLst>
-        </pc:picChg>
-      </pc:sldChg>
-      <pc:sldChg chg="addSp modSp mod">
-        <pc:chgData name="Jim Pieper" userId="70ec17d751b5d6ef" providerId="LiveId" clId="{C39F6B6F-DF65-45AA-B91E-27C5D666BD64}" dt="2024-07-23T02:09:53.863" v="28" actId="1076"/>
-        <pc:sldMkLst>
-          <pc:docMk/>
-          <pc:sldMk cId="3650296232" sldId="260"/>
-        </pc:sldMkLst>
-        <pc:picChg chg="add mod">
-          <ac:chgData name="Jim Pieper" userId="70ec17d751b5d6ef" providerId="LiveId" clId="{C39F6B6F-DF65-45AA-B91E-27C5D666BD64}" dt="2024-07-23T02:09:53.863" v="28" actId="1076"/>
-          <ac:picMkLst>
-            <pc:docMk/>
-            <pc:sldMk cId="3650296232" sldId="260"/>
-            <ac:picMk id="5" creationId="{170D67A4-2436-81AE-9002-6E7534C3383F}"/>
-          </ac:picMkLst>
-        </pc:picChg>
-      </pc:sldChg>
-    </pc:docChg>
-  </pc:docChgLst>
 </pc:chgInfo>
 </file>
 
@@ -504,7 +508,7 @@
           <a:p>
             <a:fld id="{A19DD7AC-7C8D-480B-B857-397721A82A82}" type="datetimeFigureOut">
               <a:rPr lang="en-US" smtClean="0"/>
-              <a:t>7/22/2024</a:t>
+              <a:t>7/23/2024</a:t>
             </a:fld>
             <a:endParaRPr lang="en-US"/>
           </a:p>
@@ -702,7 +706,7 @@
           <a:p>
             <a:fld id="{A19DD7AC-7C8D-480B-B857-397721A82A82}" type="datetimeFigureOut">
               <a:rPr lang="en-US" smtClean="0"/>
-              <a:t>7/22/2024</a:t>
+              <a:t>7/23/2024</a:t>
             </a:fld>
             <a:endParaRPr lang="en-US"/>
           </a:p>
@@ -910,7 +914,7 @@
           <a:p>
             <a:fld id="{A19DD7AC-7C8D-480B-B857-397721A82A82}" type="datetimeFigureOut">
               <a:rPr lang="en-US" smtClean="0"/>
-              <a:t>7/22/2024</a:t>
+              <a:t>7/23/2024</a:t>
             </a:fld>
             <a:endParaRPr lang="en-US"/>
           </a:p>
@@ -1108,7 +1112,7 @@
           <a:p>
             <a:fld id="{A19DD7AC-7C8D-480B-B857-397721A82A82}" type="datetimeFigureOut">
               <a:rPr lang="en-US" smtClean="0"/>
-              <a:t>7/22/2024</a:t>
+              <a:t>7/23/2024</a:t>
             </a:fld>
             <a:endParaRPr lang="en-US"/>
           </a:p>
@@ -1383,7 +1387,7 @@
           <a:p>
             <a:fld id="{A19DD7AC-7C8D-480B-B857-397721A82A82}" type="datetimeFigureOut">
               <a:rPr lang="en-US" smtClean="0"/>
-              <a:t>7/22/2024</a:t>
+              <a:t>7/23/2024</a:t>
             </a:fld>
             <a:endParaRPr lang="en-US"/>
           </a:p>
@@ -1648,7 +1652,7 @@
           <a:p>
             <a:fld id="{A19DD7AC-7C8D-480B-B857-397721A82A82}" type="datetimeFigureOut">
               <a:rPr lang="en-US" smtClean="0"/>
-              <a:t>7/22/2024</a:t>
+              <a:t>7/23/2024</a:t>
             </a:fld>
             <a:endParaRPr lang="en-US"/>
           </a:p>
@@ -2060,7 +2064,7 @@
           <a:p>
             <a:fld id="{A19DD7AC-7C8D-480B-B857-397721A82A82}" type="datetimeFigureOut">
               <a:rPr lang="en-US" smtClean="0"/>
-              <a:t>7/22/2024</a:t>
+              <a:t>7/23/2024</a:t>
             </a:fld>
             <a:endParaRPr lang="en-US"/>
           </a:p>
@@ -2201,7 +2205,7 @@
           <a:p>
             <a:fld id="{A19DD7AC-7C8D-480B-B857-397721A82A82}" type="datetimeFigureOut">
               <a:rPr lang="en-US" smtClean="0"/>
-              <a:t>7/22/2024</a:t>
+              <a:t>7/23/2024</a:t>
             </a:fld>
             <a:endParaRPr lang="en-US"/>
           </a:p>
@@ -2314,7 +2318,7 @@
           <a:p>
             <a:fld id="{A19DD7AC-7C8D-480B-B857-397721A82A82}" type="datetimeFigureOut">
               <a:rPr lang="en-US" smtClean="0"/>
-              <a:t>7/22/2024</a:t>
+              <a:t>7/23/2024</a:t>
             </a:fld>
             <a:endParaRPr lang="en-US"/>
           </a:p>
@@ -2625,7 +2629,7 @@
           <a:p>
             <a:fld id="{A19DD7AC-7C8D-480B-B857-397721A82A82}" type="datetimeFigureOut">
               <a:rPr lang="en-US" smtClean="0"/>
-              <a:t>7/22/2024</a:t>
+              <a:t>7/23/2024</a:t>
             </a:fld>
             <a:endParaRPr lang="en-US"/>
           </a:p>
@@ -2913,7 +2917,7 @@
           <a:p>
             <a:fld id="{A19DD7AC-7C8D-480B-B857-397721A82A82}" type="datetimeFigureOut">
               <a:rPr lang="en-US" smtClean="0"/>
-              <a:t>7/22/2024</a:t>
+              <a:t>7/23/2024</a:t>
             </a:fld>
             <a:endParaRPr lang="en-US"/>
           </a:p>
@@ -3154,7 +3158,7 @@
           <a:p>
             <a:fld id="{A19DD7AC-7C8D-480B-B857-397721A82A82}" type="datetimeFigureOut">
               <a:rPr lang="en-US" smtClean="0"/>
-              <a:t>7/22/2024</a:t>
+              <a:t>7/23/2024</a:t>
             </a:fld>
             <a:endParaRPr lang="en-US"/>
           </a:p>
@@ -4492,8 +4496,8 @@
         </p:nvSpPr>
         <p:spPr>
           <a:xfrm>
-            <a:off x="461818" y="424873"/>
-            <a:ext cx="5163128" cy="369332"/>
+            <a:off x="296441" y="424873"/>
+            <a:ext cx="11599118" cy="369332"/>
           </a:xfrm>
           <a:prstGeom prst="rect">
             <a:avLst/>
@@ -4506,13 +4510,302 @@
           </a:bodyPr>
           <a:lstStyle/>
           <a:p>
+            <a:pPr algn="ctr"/>
             <a:r>
               <a:rPr lang="en-US" dirty="0"/>
-              <a:t>Challenges  we face and techniques we used</a:t>
-            </a:r>
-          </a:p>
-        </p:txBody>
-      </p:sp>
+              <a:t>Tools</a:t>
+            </a:r>
+          </a:p>
+        </p:txBody>
+      </p:sp>
+      <p:sp>
+        <p:nvSpPr>
+          <p:cNvPr id="3" name="TextBox 2">
+            <a:extLst>
+              <a:ext uri="{FF2B5EF4-FFF2-40B4-BE49-F238E27FC236}">
+                <a16:creationId xmlns:a16="http://schemas.microsoft.com/office/drawing/2014/main" id="{120DF477-C2E9-B295-5ECC-41B8021A039E}"/>
+              </a:ext>
+            </a:extLst>
+          </p:cNvPr>
+          <p:cNvSpPr txBox="1"/>
+          <p:nvPr/>
+        </p:nvSpPr>
+        <p:spPr>
+          <a:xfrm>
+            <a:off x="502920" y="1133856"/>
+            <a:ext cx="4123944" cy="369332"/>
+          </a:xfrm>
+          <a:prstGeom prst="rect">
+            <a:avLst/>
+          </a:prstGeom>
+          <a:noFill/>
+          <a:ln w="12700" cap="rnd">
+            <a:solidFill>
+              <a:schemeClr val="accent1"/>
+            </a:solidFill>
+          </a:ln>
+        </p:spPr>
+        <p:txBody>
+          <a:bodyPr wrap="square" rtlCol="0">
+            <a:spAutoFit/>
+          </a:bodyPr>
+          <a:lstStyle/>
+          <a:p>
+            <a:r>
+              <a:rPr lang="en-US" dirty="0"/>
+              <a:t>Project Path </a:t>
+            </a:r>
+          </a:p>
+        </p:txBody>
+      </p:sp>
+      <p:sp>
+        <p:nvSpPr>
+          <p:cNvPr id="4" name="TextBox 3">
+            <a:extLst>
+              <a:ext uri="{FF2B5EF4-FFF2-40B4-BE49-F238E27FC236}">
+                <a16:creationId xmlns:a16="http://schemas.microsoft.com/office/drawing/2014/main" id="{8C35EFD2-02F8-58E8-06A9-1519469FDB3C}"/>
+              </a:ext>
+            </a:extLst>
+          </p:cNvPr>
+          <p:cNvSpPr txBox="1"/>
+          <p:nvPr/>
+        </p:nvSpPr>
+        <p:spPr>
+          <a:xfrm>
+            <a:off x="6215611" y="1136257"/>
+            <a:ext cx="4517044" cy="369332"/>
+          </a:xfrm>
+          <a:prstGeom prst="rect">
+            <a:avLst/>
+          </a:prstGeom>
+          <a:noFill/>
+          <a:ln w="12700" cap="rnd">
+            <a:solidFill>
+              <a:schemeClr val="accent1"/>
+            </a:solidFill>
+          </a:ln>
+        </p:spPr>
+        <p:txBody>
+          <a:bodyPr wrap="square" rtlCol="0">
+            <a:spAutoFit/>
+          </a:bodyPr>
+          <a:lstStyle>
+            <a:defPPr>
+              <a:defRPr lang="en-US"/>
+            </a:defPPr>
+            <a:lvl1pPr>
+              <a:defRPr/>
+            </a:lvl1pPr>
+          </a:lstStyle>
+          <a:p>
+            <a:r>
+              <a:rPr lang="en-US" dirty="0"/>
+              <a:t>Data Visualization Track</a:t>
+            </a:r>
+          </a:p>
+        </p:txBody>
+      </p:sp>
+      <p:cxnSp>
+        <p:nvCxnSpPr>
+          <p:cNvPr id="6" name="Straight Arrow Connector 5">
+            <a:extLst>
+              <a:ext uri="{FF2B5EF4-FFF2-40B4-BE49-F238E27FC236}">
+                <a16:creationId xmlns:a16="http://schemas.microsoft.com/office/drawing/2014/main" id="{D93F80F7-C782-2423-07BA-B394C2B6452A}"/>
+              </a:ext>
+            </a:extLst>
+          </p:cNvPr>
+          <p:cNvCxnSpPr>
+            <a:cxnSpLocks/>
+          </p:cNvCxnSpPr>
+          <p:nvPr/>
+        </p:nvCxnSpPr>
+        <p:spPr>
+          <a:xfrm>
+            <a:off x="5181600" y="1318522"/>
+            <a:ext cx="775855" cy="0"/>
+          </a:xfrm>
+          <a:prstGeom prst="straightConnector1">
+            <a:avLst/>
+          </a:prstGeom>
+          <a:ln w="57150">
+            <a:tailEnd type="triangle"/>
+          </a:ln>
+        </p:spPr>
+        <p:style>
+          <a:lnRef idx="2">
+            <a:schemeClr val="accent1"/>
+          </a:lnRef>
+          <a:fillRef idx="0">
+            <a:schemeClr val="accent1"/>
+          </a:fillRef>
+          <a:effectRef idx="1">
+            <a:schemeClr val="accent1"/>
+          </a:effectRef>
+          <a:fontRef idx="minor">
+            <a:schemeClr val="tx1"/>
+          </a:fontRef>
+        </p:style>
+      </p:cxnSp>
+      <p:sp>
+        <p:nvSpPr>
+          <p:cNvPr id="8" name="TextBox 7">
+            <a:extLst>
+              <a:ext uri="{FF2B5EF4-FFF2-40B4-BE49-F238E27FC236}">
+                <a16:creationId xmlns:a16="http://schemas.microsoft.com/office/drawing/2014/main" id="{5D896ABA-F770-F96B-AE8E-E3618E6AD5E8}"/>
+              </a:ext>
+            </a:extLst>
+          </p:cNvPr>
+          <p:cNvSpPr txBox="1"/>
+          <p:nvPr/>
+        </p:nvSpPr>
+        <p:spPr>
+          <a:xfrm>
+            <a:off x="502920" y="2692645"/>
+            <a:ext cx="4123944" cy="369332"/>
+          </a:xfrm>
+          <a:prstGeom prst="rect">
+            <a:avLst/>
+          </a:prstGeom>
+          <a:noFill/>
+          <a:ln w="12700" cap="rnd">
+            <a:solidFill>
+              <a:schemeClr val="accent1"/>
+            </a:solidFill>
+          </a:ln>
+        </p:spPr>
+        <p:txBody>
+          <a:bodyPr wrap="square" rtlCol="0">
+            <a:spAutoFit/>
+          </a:bodyPr>
+          <a:lstStyle/>
+          <a:p>
+            <a:r>
+              <a:rPr lang="en-US" dirty="0"/>
+              <a:t>Tools </a:t>
+            </a:r>
+          </a:p>
+        </p:txBody>
+      </p:sp>
+      <p:sp>
+        <p:nvSpPr>
+          <p:cNvPr id="9" name="TextBox 8">
+            <a:extLst>
+              <a:ext uri="{FF2B5EF4-FFF2-40B4-BE49-F238E27FC236}">
+                <a16:creationId xmlns:a16="http://schemas.microsoft.com/office/drawing/2014/main" id="{6657CB0B-F0F9-1BAB-EE34-499D641C8B4D}"/>
+              </a:ext>
+            </a:extLst>
+          </p:cNvPr>
+          <p:cNvSpPr txBox="1"/>
+          <p:nvPr/>
+        </p:nvSpPr>
+        <p:spPr>
+          <a:xfrm>
+            <a:off x="6215610" y="2593446"/>
+            <a:ext cx="4517045" cy="1477328"/>
+          </a:xfrm>
+          <a:prstGeom prst="rect">
+            <a:avLst/>
+          </a:prstGeom>
+          <a:noFill/>
+          <a:ln w="12700" cap="rnd">
+            <a:solidFill>
+              <a:schemeClr val="accent1"/>
+            </a:solidFill>
+          </a:ln>
+        </p:spPr>
+        <p:txBody>
+          <a:bodyPr wrap="square" rtlCol="0">
+            <a:spAutoFit/>
+          </a:bodyPr>
+          <a:lstStyle>
+            <a:defPPr>
+              <a:defRPr lang="en-US"/>
+            </a:defPPr>
+            <a:lvl1pPr>
+              <a:defRPr/>
+            </a:lvl1pPr>
+          </a:lstStyle>
+          <a:p>
+            <a:r>
+              <a:rPr lang="en-US" dirty="0"/>
+              <a:t>Code Development  : Microsoft VS Code</a:t>
+            </a:r>
+          </a:p>
+          <a:p>
+            <a:r>
+              <a:rPr lang="en-US" dirty="0"/>
+              <a:t>Data Cleaning             : </a:t>
+            </a:r>
+            <a:r>
+              <a:rPr lang="en-US" dirty="0" err="1"/>
+              <a:t>Jupyter</a:t>
+            </a:r>
+            <a:r>
+              <a:rPr lang="en-US" dirty="0"/>
+              <a:t> Notebook</a:t>
+            </a:r>
+          </a:p>
+          <a:p>
+            <a:r>
+              <a:rPr lang="en-US" dirty="0"/>
+              <a:t>Data Storage                : MongoDB, Excel , CSV  </a:t>
+            </a:r>
+          </a:p>
+          <a:p>
+            <a:r>
+              <a:rPr lang="en-US" dirty="0"/>
+              <a:t>Documentation           : Microsoft Word</a:t>
+            </a:r>
+          </a:p>
+          <a:p>
+            <a:r>
+              <a:rPr lang="en-US" dirty="0"/>
+              <a:t>Project Collaboration : Git and GitHub</a:t>
+            </a:r>
+          </a:p>
+        </p:txBody>
+      </p:sp>
+      <p:cxnSp>
+        <p:nvCxnSpPr>
+          <p:cNvPr id="10" name="Straight Arrow Connector 9">
+            <a:extLst>
+              <a:ext uri="{FF2B5EF4-FFF2-40B4-BE49-F238E27FC236}">
+                <a16:creationId xmlns:a16="http://schemas.microsoft.com/office/drawing/2014/main" id="{FC1C362B-89CC-EF49-C79B-629A378EBBB6}"/>
+              </a:ext>
+            </a:extLst>
+          </p:cNvPr>
+          <p:cNvCxnSpPr>
+            <a:cxnSpLocks/>
+          </p:cNvCxnSpPr>
+          <p:nvPr/>
+        </p:nvCxnSpPr>
+        <p:spPr>
+          <a:xfrm>
+            <a:off x="5172363" y="2893705"/>
+            <a:ext cx="775855" cy="0"/>
+          </a:xfrm>
+          <a:prstGeom prst="straightConnector1">
+            <a:avLst/>
+          </a:prstGeom>
+          <a:ln w="57150">
+            <a:tailEnd type="triangle"/>
+          </a:ln>
+        </p:spPr>
+        <p:style>
+          <a:lnRef idx="2">
+            <a:schemeClr val="accent1"/>
+          </a:lnRef>
+          <a:fillRef idx="0">
+            <a:schemeClr val="accent1"/>
+          </a:fillRef>
+          <a:effectRef idx="1">
+            <a:schemeClr val="accent1"/>
+          </a:effectRef>
+          <a:fontRef idx="minor">
+            <a:schemeClr val="tx1"/>
+          </a:fontRef>
+        </p:style>
+      </p:cxnSp>
     </p:spTree>
     <p:extLst>
       <p:ext uri="{BB962C8B-B14F-4D97-AF65-F5344CB8AC3E}">
@@ -4545,98 +4838,193 @@
       </p:grpSpPr>
       <p:sp>
         <p:nvSpPr>
-          <p:cNvPr id="2" name="Title 1">
-            <a:extLst>
-              <a:ext uri="{FF2B5EF4-FFF2-40B4-BE49-F238E27FC236}">
-                <a16:creationId xmlns:a16="http://schemas.microsoft.com/office/drawing/2014/main" id="{792CF614-8A26-89E2-AE07-1602A5BBCEFA}"/>
-              </a:ext>
-            </a:extLst>
-          </p:cNvPr>
-          <p:cNvSpPr>
-            <a:spLocks noGrp="1"/>
-          </p:cNvSpPr>
-          <p:nvPr>
-            <p:ph type="title"/>
-          </p:nvPr>
-        </p:nvSpPr>
-        <p:spPr/>
-        <p:txBody>
-          <a:bodyPr/>
-          <a:lstStyle/>
-          <a:p>
-            <a:r>
-              <a:rPr lang="en-US" dirty="0"/>
-              <a:t>Conclusion</a:t>
-            </a:r>
-          </a:p>
-        </p:txBody>
-      </p:sp>
-      <p:sp>
-        <p:nvSpPr>
-          <p:cNvPr id="3" name="Content Placeholder 2">
-            <a:extLst>
-              <a:ext uri="{FF2B5EF4-FFF2-40B4-BE49-F238E27FC236}">
-                <a16:creationId xmlns:a16="http://schemas.microsoft.com/office/drawing/2014/main" id="{45C7E082-7169-14B0-95F1-3B5E75C605D4}"/>
-              </a:ext>
-            </a:extLst>
-          </p:cNvPr>
-          <p:cNvSpPr>
-            <a:spLocks noGrp="1"/>
-          </p:cNvSpPr>
-          <p:nvPr>
-            <p:ph idx="1"/>
-          </p:nvPr>
-        </p:nvSpPr>
-        <p:spPr/>
-        <p:txBody>
-          <a:bodyPr>
-            <a:normAutofit/>
+          <p:cNvPr id="2" name="TextBox 1">
+            <a:extLst>
+              <a:ext uri="{FF2B5EF4-FFF2-40B4-BE49-F238E27FC236}">
+                <a16:creationId xmlns:a16="http://schemas.microsoft.com/office/drawing/2014/main" id="{A0C598AD-C50B-FD11-8A37-9EBC8E8CAE59}"/>
+              </a:ext>
+            </a:extLst>
+          </p:cNvPr>
+          <p:cNvSpPr txBox="1"/>
+          <p:nvPr/>
+        </p:nvSpPr>
+        <p:spPr>
+          <a:xfrm>
+            <a:off x="296441" y="424873"/>
+            <a:ext cx="11599118" cy="369332"/>
+          </a:xfrm>
+          <a:prstGeom prst="rect">
+            <a:avLst/>
+          </a:prstGeom>
+          <a:noFill/>
+        </p:spPr>
+        <p:txBody>
+          <a:bodyPr wrap="square" rtlCol="0">
+            <a:spAutoFit/>
           </a:bodyPr>
           <a:lstStyle/>
           <a:p>
-            <a:pPr marL="0" indent="0">
-              <a:buNone/>
-            </a:pPr>
-            <a:r>
-              <a:rPr lang="en-US" sz="1800" dirty="0"/>
-              <a:t>Summarize the visuals</a:t>
-            </a:r>
-          </a:p>
-          <a:p>
-            <a:r>
-              <a:rPr lang="en-US" sz="1800" dirty="0"/>
-              <a:t>World Density– not many players internationally join the American MLB.</a:t>
-            </a:r>
-          </a:p>
-          <a:p>
-            <a:r>
-              <a:rPr lang="en-US" sz="1800" dirty="0"/>
-              <a:t>States Density – Base on the visual we can tell that California has produce the most MLB players. </a:t>
-            </a:r>
-          </a:p>
-          <a:p>
-            <a:r>
-              <a:rPr lang="en-US" sz="1800" dirty="0"/>
-              <a:t>MLB players birth years – Most players born from 1960’s into late 1980’s contributed to the MLB.</a:t>
-            </a:r>
-          </a:p>
-          <a:p>
-            <a:endParaRPr lang="en-US" sz="1800" dirty="0"/>
-          </a:p>
-          <a:p>
-            <a:endParaRPr lang="en-US" sz="1800"/>
-          </a:p>
-          <a:p>
-            <a:endParaRPr lang="en-US" sz="1800" dirty="0"/>
-          </a:p>
-        </p:txBody>
-      </p:sp>
+            <a:pPr algn="ctr"/>
+            <a:r>
+              <a:rPr lang="en-US" dirty="0"/>
+              <a:t>Challenges </a:t>
+            </a:r>
+          </a:p>
+        </p:txBody>
+      </p:sp>
+      <p:sp>
+        <p:nvSpPr>
+          <p:cNvPr id="11" name="TextBox 10">
+            <a:extLst>
+              <a:ext uri="{FF2B5EF4-FFF2-40B4-BE49-F238E27FC236}">
+                <a16:creationId xmlns:a16="http://schemas.microsoft.com/office/drawing/2014/main" id="{ED95BD74-ED7D-123A-73FF-3E4902F6FAF2}"/>
+              </a:ext>
+            </a:extLst>
+          </p:cNvPr>
+          <p:cNvSpPr txBox="1"/>
+          <p:nvPr/>
+        </p:nvSpPr>
+        <p:spPr>
+          <a:xfrm>
+            <a:off x="632229" y="940861"/>
+            <a:ext cx="3135099" cy="369332"/>
+          </a:xfrm>
+          <a:prstGeom prst="rect">
+            <a:avLst/>
+          </a:prstGeom>
+          <a:noFill/>
+          <a:ln w="12700" cap="rnd">
+            <a:solidFill>
+              <a:schemeClr val="accent1"/>
+            </a:solidFill>
+          </a:ln>
+        </p:spPr>
+        <p:txBody>
+          <a:bodyPr wrap="square" rtlCol="0">
+            <a:spAutoFit/>
+          </a:bodyPr>
+          <a:lstStyle/>
+          <a:p>
+            <a:r>
+              <a:rPr lang="en-US" dirty="0"/>
+              <a:t>Finding a Data source </a:t>
+            </a:r>
+          </a:p>
+        </p:txBody>
+      </p:sp>
+      <p:sp>
+        <p:nvSpPr>
+          <p:cNvPr id="12" name="TextBox 11">
+            <a:extLst>
+              <a:ext uri="{FF2B5EF4-FFF2-40B4-BE49-F238E27FC236}">
+                <a16:creationId xmlns:a16="http://schemas.microsoft.com/office/drawing/2014/main" id="{9F35E88E-BAA8-BBA1-A048-3031F1397AA7}"/>
+              </a:ext>
+            </a:extLst>
+          </p:cNvPr>
+          <p:cNvSpPr txBox="1"/>
+          <p:nvPr/>
+        </p:nvSpPr>
+        <p:spPr>
+          <a:xfrm>
+            <a:off x="4974336" y="922987"/>
+            <a:ext cx="6510528" cy="1107996"/>
+          </a:xfrm>
+          <a:prstGeom prst="rect">
+            <a:avLst/>
+          </a:prstGeom>
+          <a:noFill/>
+          <a:ln w="12700" cap="rnd">
+            <a:solidFill>
+              <a:schemeClr val="accent1"/>
+            </a:solidFill>
+          </a:ln>
+        </p:spPr>
+        <p:txBody>
+          <a:bodyPr wrap="square" rtlCol="0">
+            <a:spAutoFit/>
+          </a:bodyPr>
+          <a:lstStyle>
+            <a:defPPr>
+              <a:defRPr lang="en-US"/>
+            </a:defPPr>
+            <a:lvl1pPr>
+              <a:defRPr/>
+            </a:lvl1pPr>
+          </a:lstStyle>
+          <a:p>
+            <a:r>
+              <a:rPr lang="en-US" dirty="0"/>
+              <a:t>Web scraping :  </a:t>
+            </a:r>
+            <a:r>
+              <a:rPr lang="en-US" sz="1200" dirty="0"/>
+              <a:t>https://www.baseball-almanac.com/players/birthplace.php </a:t>
+            </a:r>
+          </a:p>
+          <a:p>
+            <a:endParaRPr lang="en-US" sz="1200" dirty="0"/>
+          </a:p>
+          <a:p>
+            <a:endParaRPr lang="en-US" sz="1200" dirty="0"/>
+          </a:p>
+          <a:p>
+            <a:endParaRPr lang="en-US" sz="1200" dirty="0"/>
+          </a:p>
+          <a:p>
+            <a:r>
+              <a:rPr lang="en-US" sz="1200" dirty="0"/>
+              <a:t> </a:t>
+            </a:r>
+          </a:p>
+        </p:txBody>
+      </p:sp>
+      <p:cxnSp>
+        <p:nvCxnSpPr>
+          <p:cNvPr id="13" name="Straight Arrow Connector 12">
+            <a:extLst>
+              <a:ext uri="{FF2B5EF4-FFF2-40B4-BE49-F238E27FC236}">
+                <a16:creationId xmlns:a16="http://schemas.microsoft.com/office/drawing/2014/main" id="{42B99BCF-9641-63AA-676B-B9151DB5FBF6}"/>
+              </a:ext>
+            </a:extLst>
+          </p:cNvPr>
+          <p:cNvCxnSpPr>
+            <a:cxnSpLocks/>
+          </p:cNvCxnSpPr>
+          <p:nvPr/>
+        </p:nvCxnSpPr>
+        <p:spPr>
+          <a:xfrm>
+            <a:off x="4039800" y="1141921"/>
+            <a:ext cx="775855" cy="0"/>
+          </a:xfrm>
+          <a:prstGeom prst="straightConnector1">
+            <a:avLst/>
+          </a:prstGeom>
+          <a:ln w="57150">
+            <a:tailEnd type="triangle"/>
+          </a:ln>
+        </p:spPr>
+        <p:style>
+          <a:lnRef idx="2">
+            <a:schemeClr val="accent1"/>
+          </a:lnRef>
+          <a:fillRef idx="0">
+            <a:schemeClr val="accent1"/>
+          </a:fillRef>
+          <a:effectRef idx="1">
+            <a:schemeClr val="accent1"/>
+          </a:effectRef>
+          <a:fontRef idx="minor">
+            <a:schemeClr val="tx1"/>
+          </a:fontRef>
+        </p:style>
+      </p:cxnSp>
       <p:pic>
         <p:nvPicPr>
-          <p:cNvPr id="5" name="Picture 4" descr="A baseball bat and glove on a dirt field&#10;&#10;Description automatically generated">
-            <a:extLst>
-              <a:ext uri="{FF2B5EF4-FFF2-40B4-BE49-F238E27FC236}">
-                <a16:creationId xmlns:a16="http://schemas.microsoft.com/office/drawing/2014/main" id="{170D67A4-2436-81AE-9002-6E7534C3383F}"/>
+          <p:cNvPr id="5" name="Picture 4">
+            <a:extLst>
+              <a:ext uri="{FF2B5EF4-FFF2-40B4-BE49-F238E27FC236}">
+                <a16:creationId xmlns:a16="http://schemas.microsoft.com/office/drawing/2014/main" id="{08B1A52B-C857-2D60-D1EC-967FE5C64252}"/>
               </a:ext>
             </a:extLst>
           </p:cNvPr>
@@ -4646,21 +5034,616 @@
           <p:nvPr/>
         </p:nvPicPr>
         <p:blipFill>
-          <a:blip r:embed="rId2">
-            <a:extLst>
-              <a:ext uri="{28A0092B-C50C-407E-A947-70E740481C1C}">
-                <a14:useLocalDpi xmlns:a14="http://schemas.microsoft.com/office/drawing/2010/main" val="0"/>
-              </a:ext>
-            </a:extLst>
-          </a:blip>
+          <a:blip r:embed="rId2"/>
           <a:stretch>
             <a:fillRect/>
           </a:stretch>
         </p:blipFill>
         <p:spPr>
           <a:xfrm>
-            <a:off x="3473996" y="3653103"/>
-            <a:ext cx="4259658" cy="2839772"/>
+            <a:off x="4974336" y="2159765"/>
+            <a:ext cx="6510528" cy="3399787"/>
+          </a:xfrm>
+          <a:prstGeom prst="rect">
+            <a:avLst/>
+          </a:prstGeom>
+        </p:spPr>
+      </p:pic>
+      <p:pic>
+        <p:nvPicPr>
+          <p:cNvPr id="7" name="Picture 6">
+            <a:extLst>
+              <a:ext uri="{FF2B5EF4-FFF2-40B4-BE49-F238E27FC236}">
+                <a16:creationId xmlns:a16="http://schemas.microsoft.com/office/drawing/2014/main" id="{B0F3C398-8F99-B7C6-01EC-48FF35B2211A}"/>
+              </a:ext>
+            </a:extLst>
+          </p:cNvPr>
+          <p:cNvPicPr>
+            <a:picLocks noChangeAspect="1"/>
+          </p:cNvPicPr>
+          <p:nvPr/>
+        </p:nvPicPr>
+        <p:blipFill>
+          <a:blip r:embed="rId3"/>
+          <a:stretch>
+            <a:fillRect/>
+          </a:stretch>
+        </p:blipFill>
+        <p:spPr>
+          <a:xfrm>
+            <a:off x="411479" y="2159764"/>
+            <a:ext cx="4168767" cy="3399786"/>
+          </a:xfrm>
+          <a:prstGeom prst="rect">
+            <a:avLst/>
+          </a:prstGeom>
+        </p:spPr>
+      </p:pic>
+      <p:sp>
+        <p:nvSpPr>
+          <p:cNvPr id="8" name="TextBox 7">
+            <a:extLst>
+              <a:ext uri="{FF2B5EF4-FFF2-40B4-BE49-F238E27FC236}">
+                <a16:creationId xmlns:a16="http://schemas.microsoft.com/office/drawing/2014/main" id="{A302C97E-8D62-7990-662E-39EEE1DBDFE8}"/>
+              </a:ext>
+            </a:extLst>
+          </p:cNvPr>
+          <p:cNvSpPr txBox="1"/>
+          <p:nvPr/>
+        </p:nvSpPr>
+        <p:spPr>
+          <a:xfrm>
+            <a:off x="748053" y="6348083"/>
+            <a:ext cx="3135099" cy="369332"/>
+          </a:xfrm>
+          <a:prstGeom prst="rect">
+            <a:avLst/>
+          </a:prstGeom>
+          <a:noFill/>
+          <a:ln w="12700" cap="rnd">
+            <a:solidFill>
+              <a:schemeClr val="accent1"/>
+            </a:solidFill>
+          </a:ln>
+        </p:spPr>
+        <p:txBody>
+          <a:bodyPr wrap="square" rtlCol="0">
+            <a:spAutoFit/>
+          </a:bodyPr>
+          <a:lstStyle/>
+          <a:p>
+            <a:r>
+              <a:rPr lang="en-US" dirty="0"/>
+              <a:t>Solution </a:t>
+            </a:r>
+          </a:p>
+        </p:txBody>
+      </p:sp>
+      <p:cxnSp>
+        <p:nvCxnSpPr>
+          <p:cNvPr id="9" name="Straight Arrow Connector 8">
+            <a:extLst>
+              <a:ext uri="{FF2B5EF4-FFF2-40B4-BE49-F238E27FC236}">
+                <a16:creationId xmlns:a16="http://schemas.microsoft.com/office/drawing/2014/main" id="{67C32159-C201-07C0-B992-D3868EB905F9}"/>
+              </a:ext>
+            </a:extLst>
+          </p:cNvPr>
+          <p:cNvCxnSpPr>
+            <a:cxnSpLocks/>
+          </p:cNvCxnSpPr>
+          <p:nvPr/>
+        </p:nvCxnSpPr>
+        <p:spPr>
+          <a:xfrm>
+            <a:off x="4057190" y="6506401"/>
+            <a:ext cx="775855" cy="0"/>
+          </a:xfrm>
+          <a:prstGeom prst="straightConnector1">
+            <a:avLst/>
+          </a:prstGeom>
+          <a:ln w="57150">
+            <a:tailEnd type="triangle"/>
+          </a:ln>
+        </p:spPr>
+        <p:style>
+          <a:lnRef idx="2">
+            <a:schemeClr val="accent1"/>
+          </a:lnRef>
+          <a:fillRef idx="0">
+            <a:schemeClr val="accent1"/>
+          </a:fillRef>
+          <a:effectRef idx="1">
+            <a:schemeClr val="accent1"/>
+          </a:effectRef>
+          <a:fontRef idx="minor">
+            <a:schemeClr val="tx1"/>
+          </a:fontRef>
+        </p:style>
+      </p:cxnSp>
+      <p:sp>
+        <p:nvSpPr>
+          <p:cNvPr id="10" name="TextBox 9">
+            <a:extLst>
+              <a:ext uri="{FF2B5EF4-FFF2-40B4-BE49-F238E27FC236}">
+                <a16:creationId xmlns:a16="http://schemas.microsoft.com/office/drawing/2014/main" id="{77441A59-FDEA-C7F8-B1D9-AD96E1D87DAC}"/>
+              </a:ext>
+            </a:extLst>
+          </p:cNvPr>
+          <p:cNvSpPr txBox="1"/>
+          <p:nvPr/>
+        </p:nvSpPr>
+        <p:spPr>
+          <a:xfrm>
+            <a:off x="765443" y="11712563"/>
+            <a:ext cx="3135099" cy="369332"/>
+          </a:xfrm>
+          <a:prstGeom prst="rect">
+            <a:avLst/>
+          </a:prstGeom>
+          <a:noFill/>
+          <a:ln w="12700" cap="rnd">
+            <a:solidFill>
+              <a:schemeClr val="accent1"/>
+            </a:solidFill>
+          </a:ln>
+        </p:spPr>
+        <p:txBody>
+          <a:bodyPr wrap="square" rtlCol="0">
+            <a:spAutoFit/>
+          </a:bodyPr>
+          <a:lstStyle/>
+          <a:p>
+            <a:r>
+              <a:rPr lang="en-US" dirty="0"/>
+              <a:t>Solution </a:t>
+            </a:r>
+          </a:p>
+        </p:txBody>
+      </p:sp>
+      <p:sp>
+        <p:nvSpPr>
+          <p:cNvPr id="14" name="TextBox 13">
+            <a:extLst>
+              <a:ext uri="{FF2B5EF4-FFF2-40B4-BE49-F238E27FC236}">
+                <a16:creationId xmlns:a16="http://schemas.microsoft.com/office/drawing/2014/main" id="{3798C23D-9DCA-7A54-5795-8C5D0686A6DE}"/>
+              </a:ext>
+            </a:extLst>
+          </p:cNvPr>
+          <p:cNvSpPr txBox="1"/>
+          <p:nvPr/>
+        </p:nvSpPr>
+        <p:spPr>
+          <a:xfrm>
+            <a:off x="5007083" y="6316524"/>
+            <a:ext cx="6753394" cy="276999"/>
+          </a:xfrm>
+          <a:prstGeom prst="rect">
+            <a:avLst/>
+          </a:prstGeom>
+          <a:noFill/>
+          <a:ln w="12700" cap="rnd">
+            <a:solidFill>
+              <a:schemeClr val="accent1"/>
+            </a:solidFill>
+          </a:ln>
+        </p:spPr>
+        <p:txBody>
+          <a:bodyPr wrap="square" rtlCol="0">
+            <a:spAutoFit/>
+          </a:bodyPr>
+          <a:lstStyle/>
+          <a:p>
+            <a:r>
+              <a:rPr lang="en-US" sz="1200" dirty="0"/>
+              <a:t> </a:t>
+            </a:r>
+            <a:r>
+              <a:rPr lang="en-US" sz="1200" dirty="0">
+                <a:hlinkClick r:id="rId4">
+                  <a:extLst>
+                    <a:ext uri="{A12FA001-AC4F-418D-AE19-62706E023703}">
+                      <ahyp:hlinkClr xmlns:ahyp="http://schemas.microsoft.com/office/drawing/2018/hyperlinkcolor" val="tx"/>
+                    </a:ext>
+                  </a:extLst>
+                </a:hlinkClick>
+              </a:rPr>
+              <a:t>https://www.kaggle.com/datasets/open-source-sports/baseball-databank</a:t>
+            </a:r>
+            <a:endParaRPr lang="en-US" sz="1200" dirty="0"/>
+          </a:p>
+        </p:txBody>
+      </p:sp>
+      <p:sp>
+        <p:nvSpPr>
+          <p:cNvPr id="15" name="TextBox 14">
+            <a:extLst>
+              <a:ext uri="{FF2B5EF4-FFF2-40B4-BE49-F238E27FC236}">
+                <a16:creationId xmlns:a16="http://schemas.microsoft.com/office/drawing/2014/main" id="{D3693E0E-463E-D1B6-A2FC-EAFCCA002D46}"/>
+              </a:ext>
+            </a:extLst>
+          </p:cNvPr>
+          <p:cNvSpPr txBox="1"/>
+          <p:nvPr/>
+        </p:nvSpPr>
+        <p:spPr>
+          <a:xfrm>
+            <a:off x="765443" y="5789352"/>
+            <a:ext cx="3135099" cy="369332"/>
+          </a:xfrm>
+          <a:prstGeom prst="rect">
+            <a:avLst/>
+          </a:prstGeom>
+          <a:noFill/>
+          <a:ln w="12700" cap="rnd">
+            <a:solidFill>
+              <a:schemeClr val="accent1"/>
+            </a:solidFill>
+          </a:ln>
+        </p:spPr>
+        <p:txBody>
+          <a:bodyPr wrap="square" rtlCol="0">
+            <a:spAutoFit/>
+          </a:bodyPr>
+          <a:lstStyle/>
+          <a:p>
+            <a:r>
+              <a:rPr lang="en-US" dirty="0"/>
+              <a:t>Problem Faced	 </a:t>
+            </a:r>
+          </a:p>
+        </p:txBody>
+      </p:sp>
+      <p:cxnSp>
+        <p:nvCxnSpPr>
+          <p:cNvPr id="16" name="Straight Arrow Connector 15">
+            <a:extLst>
+              <a:ext uri="{FF2B5EF4-FFF2-40B4-BE49-F238E27FC236}">
+                <a16:creationId xmlns:a16="http://schemas.microsoft.com/office/drawing/2014/main" id="{8A9EAAAE-6292-A7D3-030D-E2191B73C178}"/>
+              </a:ext>
+            </a:extLst>
+          </p:cNvPr>
+          <p:cNvCxnSpPr>
+            <a:cxnSpLocks/>
+          </p:cNvCxnSpPr>
+          <p:nvPr/>
+        </p:nvCxnSpPr>
+        <p:spPr>
+          <a:xfrm>
+            <a:off x="4074580" y="5947670"/>
+            <a:ext cx="775855" cy="0"/>
+          </a:xfrm>
+          <a:prstGeom prst="straightConnector1">
+            <a:avLst/>
+          </a:prstGeom>
+          <a:ln w="57150">
+            <a:tailEnd type="triangle"/>
+          </a:ln>
+        </p:spPr>
+        <p:style>
+          <a:lnRef idx="2">
+            <a:schemeClr val="accent1"/>
+          </a:lnRef>
+          <a:fillRef idx="0">
+            <a:schemeClr val="accent1"/>
+          </a:fillRef>
+          <a:effectRef idx="1">
+            <a:schemeClr val="accent1"/>
+          </a:effectRef>
+          <a:fontRef idx="minor">
+            <a:schemeClr val="tx1"/>
+          </a:fontRef>
+        </p:style>
+      </p:cxnSp>
+      <p:sp>
+        <p:nvSpPr>
+          <p:cNvPr id="17" name="TextBox 16">
+            <a:extLst>
+              <a:ext uri="{FF2B5EF4-FFF2-40B4-BE49-F238E27FC236}">
+                <a16:creationId xmlns:a16="http://schemas.microsoft.com/office/drawing/2014/main" id="{AD279E19-0473-AE74-3A39-424449676C34}"/>
+              </a:ext>
+            </a:extLst>
+          </p:cNvPr>
+          <p:cNvSpPr txBox="1"/>
+          <p:nvPr/>
+        </p:nvSpPr>
+        <p:spPr>
+          <a:xfrm>
+            <a:off x="5024473" y="5757793"/>
+            <a:ext cx="6753394" cy="276999"/>
+          </a:xfrm>
+          <a:prstGeom prst="rect">
+            <a:avLst/>
+          </a:prstGeom>
+          <a:noFill/>
+          <a:ln w="12700" cap="rnd">
+            <a:solidFill>
+              <a:schemeClr val="accent1"/>
+            </a:solidFill>
+          </a:ln>
+        </p:spPr>
+        <p:txBody>
+          <a:bodyPr wrap="square" rtlCol="0">
+            <a:spAutoFit/>
+          </a:bodyPr>
+          <a:lstStyle/>
+          <a:p>
+            <a:r>
+              <a:rPr lang="en-US" sz="1200" dirty="0"/>
+              <a:t>Web scraping is a time consume process and not suitable for  scraping a large data set. </a:t>
+            </a:r>
+          </a:p>
+        </p:txBody>
+      </p:sp>
+    </p:spTree>
+    <p:extLst>
+      <p:ext uri="{BB962C8B-B14F-4D97-AF65-F5344CB8AC3E}">
+        <p14:creationId xmlns:p14="http://schemas.microsoft.com/office/powerpoint/2010/main" val="3284061155"/>
+      </p:ext>
+    </p:extLst>
+  </p:cSld>
+  <p:clrMapOvr>
+    <a:masterClrMapping/>
+  </p:clrMapOvr>
+</p:sld>
+</file>
+
+<file path=ppt/slides/slide6.xml><?xml version="1.0" encoding="utf-8"?>
+<p:sld xmlns:a="http://schemas.openxmlformats.org/drawingml/2006/main" xmlns:r="http://schemas.openxmlformats.org/officeDocument/2006/relationships" xmlns:p="http://schemas.openxmlformats.org/presentationml/2006/main">
+  <p:cSld>
+    <p:spTree>
+      <p:nvGrpSpPr>
+        <p:cNvPr id="1" name=""/>
+        <p:cNvGrpSpPr/>
+        <p:nvPr/>
+      </p:nvGrpSpPr>
+      <p:grpSpPr>
+        <a:xfrm>
+          <a:off x="0" y="0"/>
+          <a:ext cx="0" cy="0"/>
+          <a:chOff x="0" y="0"/>
+          <a:chExt cx="0" cy="0"/>
+        </a:xfrm>
+      </p:grpSpPr>
+      <p:sp>
+        <p:nvSpPr>
+          <p:cNvPr id="2" name="TextBox 1">
+            <a:extLst>
+              <a:ext uri="{FF2B5EF4-FFF2-40B4-BE49-F238E27FC236}">
+                <a16:creationId xmlns:a16="http://schemas.microsoft.com/office/drawing/2014/main" id="{9C29D741-7B5A-EB24-563C-8D8256EF7BAB}"/>
+              </a:ext>
+            </a:extLst>
+          </p:cNvPr>
+          <p:cNvSpPr txBox="1"/>
+          <p:nvPr/>
+        </p:nvSpPr>
+        <p:spPr>
+          <a:xfrm>
+            <a:off x="296441" y="424873"/>
+            <a:ext cx="11599118" cy="369332"/>
+          </a:xfrm>
+          <a:prstGeom prst="rect">
+            <a:avLst/>
+          </a:prstGeom>
+          <a:noFill/>
+        </p:spPr>
+        <p:txBody>
+          <a:bodyPr wrap="square" rtlCol="0">
+            <a:spAutoFit/>
+          </a:bodyPr>
+          <a:lstStyle/>
+          <a:p>
+            <a:pPr algn="ctr"/>
+            <a:r>
+              <a:rPr lang="en-US" dirty="0"/>
+              <a:t>Data Cleaning Process</a:t>
+            </a:r>
+          </a:p>
+        </p:txBody>
+      </p:sp>
+      <p:pic>
+        <p:nvPicPr>
+          <p:cNvPr id="6" name="Picture 5">
+            <a:extLst>
+              <a:ext uri="{FF2B5EF4-FFF2-40B4-BE49-F238E27FC236}">
+                <a16:creationId xmlns:a16="http://schemas.microsoft.com/office/drawing/2014/main" id="{3D391283-3294-F11B-F5E5-765B6D24B80D}"/>
+              </a:ext>
+            </a:extLst>
+          </p:cNvPr>
+          <p:cNvPicPr>
+            <a:picLocks noChangeAspect="1"/>
+          </p:cNvPicPr>
+          <p:nvPr/>
+        </p:nvPicPr>
+        <p:blipFill>
+          <a:blip r:embed="rId2"/>
+          <a:stretch>
+            <a:fillRect/>
+          </a:stretch>
+        </p:blipFill>
+        <p:spPr>
+          <a:xfrm>
+            <a:off x="296441" y="861431"/>
+            <a:ext cx="3953427" cy="2867425"/>
+          </a:xfrm>
+          <a:prstGeom prst="rect">
+            <a:avLst/>
+          </a:prstGeom>
+        </p:spPr>
+      </p:pic>
+      <p:pic>
+        <p:nvPicPr>
+          <p:cNvPr id="8" name="Picture 7">
+            <a:extLst>
+              <a:ext uri="{FF2B5EF4-FFF2-40B4-BE49-F238E27FC236}">
+                <a16:creationId xmlns:a16="http://schemas.microsoft.com/office/drawing/2014/main" id="{6921A932-D631-C2FA-0049-D44603FF8F6E}"/>
+              </a:ext>
+            </a:extLst>
+          </p:cNvPr>
+          <p:cNvPicPr>
+            <a:picLocks noChangeAspect="1"/>
+          </p:cNvPicPr>
+          <p:nvPr/>
+        </p:nvPicPr>
+        <p:blipFill>
+          <a:blip r:embed="rId3"/>
+          <a:stretch>
+            <a:fillRect/>
+          </a:stretch>
+        </p:blipFill>
+        <p:spPr>
+          <a:xfrm>
+            <a:off x="4546309" y="873298"/>
+            <a:ext cx="7645691" cy="952633"/>
+          </a:xfrm>
+          <a:prstGeom prst="rect">
+            <a:avLst/>
+          </a:prstGeom>
+        </p:spPr>
+      </p:pic>
+      <p:pic>
+        <p:nvPicPr>
+          <p:cNvPr id="10" name="Picture 9">
+            <a:extLst>
+              <a:ext uri="{FF2B5EF4-FFF2-40B4-BE49-F238E27FC236}">
+                <a16:creationId xmlns:a16="http://schemas.microsoft.com/office/drawing/2014/main" id="{AF9505C7-A4F5-0ED9-2B2B-3907D040A9CA}"/>
+              </a:ext>
+            </a:extLst>
+          </p:cNvPr>
+          <p:cNvPicPr>
+            <a:picLocks noChangeAspect="1"/>
+          </p:cNvPicPr>
+          <p:nvPr/>
+        </p:nvPicPr>
+        <p:blipFill>
+          <a:blip r:embed="rId4"/>
+          <a:stretch>
+            <a:fillRect/>
+          </a:stretch>
+        </p:blipFill>
+        <p:spPr>
+          <a:xfrm>
+            <a:off x="4546309" y="2091443"/>
+            <a:ext cx="7645691" cy="809738"/>
+          </a:xfrm>
+          <a:prstGeom prst="rect">
+            <a:avLst/>
+          </a:prstGeom>
+        </p:spPr>
+      </p:pic>
+      <p:pic>
+        <p:nvPicPr>
+          <p:cNvPr id="14" name="Picture 13">
+            <a:extLst>
+              <a:ext uri="{FF2B5EF4-FFF2-40B4-BE49-F238E27FC236}">
+                <a16:creationId xmlns:a16="http://schemas.microsoft.com/office/drawing/2014/main" id="{E707A372-68DF-8C4E-5E3D-CF8E02E939FF}"/>
+              </a:ext>
+            </a:extLst>
+          </p:cNvPr>
+          <p:cNvPicPr>
+            <a:picLocks noChangeAspect="1"/>
+          </p:cNvPicPr>
+          <p:nvPr/>
+        </p:nvPicPr>
+        <p:blipFill>
+          <a:blip r:embed="rId5"/>
+          <a:stretch>
+            <a:fillRect/>
+          </a:stretch>
+        </p:blipFill>
+        <p:spPr>
+          <a:xfrm>
+            <a:off x="4612126" y="3015927"/>
+            <a:ext cx="7579873" cy="495369"/>
+          </a:xfrm>
+          <a:prstGeom prst="rect">
+            <a:avLst/>
+          </a:prstGeom>
+        </p:spPr>
+      </p:pic>
+      <p:pic>
+        <p:nvPicPr>
+          <p:cNvPr id="16" name="Picture 15">
+            <a:extLst>
+              <a:ext uri="{FF2B5EF4-FFF2-40B4-BE49-F238E27FC236}">
+                <a16:creationId xmlns:a16="http://schemas.microsoft.com/office/drawing/2014/main" id="{AF882C93-5E37-2863-CF27-AED69E1B8B25}"/>
+              </a:ext>
+            </a:extLst>
+          </p:cNvPr>
+          <p:cNvPicPr>
+            <a:picLocks noChangeAspect="1"/>
+          </p:cNvPicPr>
+          <p:nvPr/>
+        </p:nvPicPr>
+        <p:blipFill>
+          <a:blip r:embed="rId6"/>
+          <a:stretch>
+            <a:fillRect/>
+          </a:stretch>
+        </p:blipFill>
+        <p:spPr>
+          <a:xfrm>
+            <a:off x="4546309" y="3626042"/>
+            <a:ext cx="7645691" cy="914528"/>
+          </a:xfrm>
+          <a:prstGeom prst="rect">
+            <a:avLst/>
+          </a:prstGeom>
+        </p:spPr>
+      </p:pic>
+      <p:pic>
+        <p:nvPicPr>
+          <p:cNvPr id="18" name="Picture 17">
+            <a:extLst>
+              <a:ext uri="{FF2B5EF4-FFF2-40B4-BE49-F238E27FC236}">
+                <a16:creationId xmlns:a16="http://schemas.microsoft.com/office/drawing/2014/main" id="{2C1E6E08-3CC6-1663-D4C8-863DA8D1D945}"/>
+              </a:ext>
+            </a:extLst>
+          </p:cNvPr>
+          <p:cNvPicPr>
+            <a:picLocks noChangeAspect="1"/>
+          </p:cNvPicPr>
+          <p:nvPr/>
+        </p:nvPicPr>
+        <p:blipFill>
+          <a:blip r:embed="rId7"/>
+          <a:stretch>
+            <a:fillRect/>
+          </a:stretch>
+        </p:blipFill>
+        <p:spPr>
+          <a:xfrm>
+            <a:off x="4612127" y="4655316"/>
+            <a:ext cx="7579873" cy="1345671"/>
+          </a:xfrm>
+          <a:prstGeom prst="rect">
+            <a:avLst/>
+          </a:prstGeom>
+        </p:spPr>
+      </p:pic>
+      <p:pic>
+        <p:nvPicPr>
+          <p:cNvPr id="20" name="Picture 19">
+            <a:extLst>
+              <a:ext uri="{FF2B5EF4-FFF2-40B4-BE49-F238E27FC236}">
+                <a16:creationId xmlns:a16="http://schemas.microsoft.com/office/drawing/2014/main" id="{EA282769-AE40-9D8A-037F-B5063CE2B4A3}"/>
+              </a:ext>
+            </a:extLst>
+          </p:cNvPr>
+          <p:cNvPicPr>
+            <a:picLocks noChangeAspect="1"/>
+          </p:cNvPicPr>
+          <p:nvPr/>
+        </p:nvPicPr>
+        <p:blipFill>
+          <a:blip r:embed="rId8"/>
+          <a:stretch>
+            <a:fillRect/>
+          </a:stretch>
+        </p:blipFill>
+        <p:spPr>
+          <a:xfrm>
+            <a:off x="190063" y="4540570"/>
+            <a:ext cx="4208026" cy="1567686"/>
           </a:xfrm>
           <a:prstGeom prst="rect">
             <a:avLst/>
@@ -4670,7 +5653,2247 @@
     </p:spTree>
     <p:extLst>
       <p:ext uri="{BB962C8B-B14F-4D97-AF65-F5344CB8AC3E}">
+        <p14:creationId xmlns:p14="http://schemas.microsoft.com/office/powerpoint/2010/main" val="3252920775"/>
+      </p:ext>
+    </p:extLst>
+  </p:cSld>
+  <p:clrMapOvr>
+    <a:masterClrMapping/>
+  </p:clrMapOvr>
+</p:sld>
+</file>
+
+<file path=ppt/slides/slide7.xml><?xml version="1.0" encoding="utf-8"?>
+<p:sld xmlns:a="http://schemas.openxmlformats.org/drawingml/2006/main" xmlns:r="http://schemas.openxmlformats.org/officeDocument/2006/relationships" xmlns:p="http://schemas.openxmlformats.org/presentationml/2006/main">
+  <p:cSld>
+    <p:spTree>
+      <p:nvGrpSpPr>
+        <p:cNvPr id="1" name=""/>
+        <p:cNvGrpSpPr/>
+        <p:nvPr/>
+      </p:nvGrpSpPr>
+      <p:grpSpPr>
+        <a:xfrm>
+          <a:off x="0" y="0"/>
+          <a:ext cx="0" cy="0"/>
+          <a:chOff x="0" y="0"/>
+          <a:chExt cx="0" cy="0"/>
+        </a:xfrm>
+      </p:grpSpPr>
+      <p:sp>
+        <p:nvSpPr>
+          <p:cNvPr id="2" name="TextBox 1">
+            <a:extLst>
+              <a:ext uri="{FF2B5EF4-FFF2-40B4-BE49-F238E27FC236}">
+                <a16:creationId xmlns:a16="http://schemas.microsoft.com/office/drawing/2014/main" id="{D5288738-3F57-1F81-3512-14FAC729726F}"/>
+              </a:ext>
+            </a:extLst>
+          </p:cNvPr>
+          <p:cNvSpPr txBox="1"/>
+          <p:nvPr/>
+        </p:nvSpPr>
+        <p:spPr>
+          <a:xfrm>
+            <a:off x="296441" y="207004"/>
+            <a:ext cx="11599118" cy="369332"/>
+          </a:xfrm>
+          <a:prstGeom prst="rect">
+            <a:avLst/>
+          </a:prstGeom>
+          <a:noFill/>
+        </p:spPr>
+        <p:txBody>
+          <a:bodyPr wrap="square" rtlCol="0">
+            <a:spAutoFit/>
+          </a:bodyPr>
+          <a:lstStyle/>
+          <a:p>
+            <a:pPr algn="ctr"/>
+            <a:r>
+              <a:rPr lang="en-US" dirty="0"/>
+              <a:t>External Libraries Used </a:t>
+            </a:r>
+          </a:p>
+        </p:txBody>
+      </p:sp>
+      <p:sp>
+        <p:nvSpPr>
+          <p:cNvPr id="3" name="TextBox 2">
+            <a:extLst>
+              <a:ext uri="{FF2B5EF4-FFF2-40B4-BE49-F238E27FC236}">
+                <a16:creationId xmlns:a16="http://schemas.microsoft.com/office/drawing/2014/main" id="{DC2A662C-0492-2251-93FC-13531B64A0D4}"/>
+              </a:ext>
+            </a:extLst>
+          </p:cNvPr>
+          <p:cNvSpPr txBox="1"/>
+          <p:nvPr/>
+        </p:nvSpPr>
+        <p:spPr>
+          <a:xfrm>
+            <a:off x="595653" y="931052"/>
+            <a:ext cx="3135099" cy="369332"/>
+          </a:xfrm>
+          <a:prstGeom prst="rect">
+            <a:avLst/>
+          </a:prstGeom>
+          <a:noFill/>
+          <a:ln w="12700" cap="rnd">
+            <a:solidFill>
+              <a:schemeClr val="accent1"/>
+            </a:solidFill>
+          </a:ln>
+        </p:spPr>
+        <p:txBody>
+          <a:bodyPr wrap="square" rtlCol="0">
+            <a:spAutoFit/>
+          </a:bodyPr>
+          <a:lstStyle/>
+          <a:p>
+            <a:r>
+              <a:rPr lang="en-US" dirty="0"/>
+              <a:t>Data Binding</a:t>
+            </a:r>
+          </a:p>
+        </p:txBody>
+      </p:sp>
+      <p:sp>
+        <p:nvSpPr>
+          <p:cNvPr id="4" name="TextBox 3">
+            <a:extLst>
+              <a:ext uri="{FF2B5EF4-FFF2-40B4-BE49-F238E27FC236}">
+                <a16:creationId xmlns:a16="http://schemas.microsoft.com/office/drawing/2014/main" id="{88B52936-37EF-7C93-5DFC-344D8144A6A9}"/>
+              </a:ext>
+            </a:extLst>
+          </p:cNvPr>
+          <p:cNvSpPr txBox="1"/>
+          <p:nvPr/>
+        </p:nvSpPr>
+        <p:spPr>
+          <a:xfrm>
+            <a:off x="4919472" y="792552"/>
+            <a:ext cx="6510528" cy="1200329"/>
+          </a:xfrm>
+          <a:prstGeom prst="rect">
+            <a:avLst/>
+          </a:prstGeom>
+          <a:noFill/>
+          <a:ln w="12700" cap="rnd">
+            <a:solidFill>
+              <a:schemeClr val="accent1"/>
+            </a:solidFill>
+          </a:ln>
+        </p:spPr>
+        <p:txBody>
+          <a:bodyPr wrap="square" rtlCol="0">
+            <a:spAutoFit/>
+          </a:bodyPr>
+          <a:lstStyle>
+            <a:defPPr>
+              <a:defRPr lang="en-US"/>
+            </a:defPPr>
+            <a:lvl1pPr>
+              <a:defRPr/>
+            </a:lvl1pPr>
+          </a:lstStyle>
+          <a:p>
+            <a:r>
+              <a:rPr lang="en-US" sz="1200" b="0" dirty="0">
+                <a:solidFill>
+                  <a:srgbClr val="9CDCFE"/>
+                </a:solidFill>
+                <a:effectLst/>
+                <a:highlight>
+                  <a:srgbClr val="1E1E1E"/>
+                </a:highlight>
+                <a:latin typeface="Consolas" panose="020B0609020204030204" pitchFamily="49" charset="0"/>
+              </a:rPr>
+              <a:t>d3</a:t>
+            </a:r>
+            <a:r>
+              <a:rPr lang="en-US" sz="1200" b="0" dirty="0">
+                <a:solidFill>
+                  <a:srgbClr val="D4D4D4"/>
+                </a:solidFill>
+                <a:effectLst/>
+                <a:highlight>
+                  <a:srgbClr val="1E1E1E"/>
+                </a:highlight>
+                <a:latin typeface="Consolas" panose="020B0609020204030204" pitchFamily="49" charset="0"/>
+              </a:rPr>
+              <a:t>.</a:t>
+            </a:r>
+            <a:r>
+              <a:rPr lang="en-US" sz="1200" b="0" dirty="0">
+                <a:solidFill>
+                  <a:srgbClr val="DCDCAA"/>
+                </a:solidFill>
+                <a:effectLst/>
+                <a:highlight>
+                  <a:srgbClr val="1E1E1E"/>
+                </a:highlight>
+                <a:latin typeface="Consolas" panose="020B0609020204030204" pitchFamily="49" charset="0"/>
+              </a:rPr>
+              <a:t>csv</a:t>
+            </a:r>
+            <a:r>
+              <a:rPr lang="en-US" sz="1200" b="0" dirty="0">
+                <a:solidFill>
+                  <a:srgbClr val="D4D4D4"/>
+                </a:solidFill>
+                <a:effectLst/>
+                <a:highlight>
+                  <a:srgbClr val="1E1E1E"/>
+                </a:highlight>
+                <a:latin typeface="Consolas" panose="020B0609020204030204" pitchFamily="49" charset="0"/>
+              </a:rPr>
+              <a:t>(</a:t>
+            </a:r>
+            <a:r>
+              <a:rPr lang="en-US" sz="1200" b="0" dirty="0">
+                <a:solidFill>
+                  <a:srgbClr val="CE9178"/>
+                </a:solidFill>
+                <a:effectLst/>
+                <a:highlight>
+                  <a:srgbClr val="1E1E1E"/>
+                </a:highlight>
+                <a:latin typeface="Consolas" panose="020B0609020204030204" pitchFamily="49" charset="0"/>
+              </a:rPr>
+              <a:t>"./Resources/Summary.csv"</a:t>
+            </a:r>
+            <a:r>
+              <a:rPr lang="en-US" sz="1200" b="0" dirty="0">
+                <a:solidFill>
+                  <a:srgbClr val="D4D4D4"/>
+                </a:solidFill>
+                <a:effectLst/>
+                <a:highlight>
+                  <a:srgbClr val="1E1E1E"/>
+                </a:highlight>
+                <a:latin typeface="Consolas" panose="020B0609020204030204" pitchFamily="49" charset="0"/>
+              </a:rPr>
+              <a:t>).</a:t>
+            </a:r>
+            <a:r>
+              <a:rPr lang="en-US" sz="1200" b="0" dirty="0">
+                <a:solidFill>
+                  <a:srgbClr val="DCDCAA"/>
+                </a:solidFill>
+                <a:effectLst/>
+                <a:highlight>
+                  <a:srgbClr val="1E1E1E"/>
+                </a:highlight>
+                <a:latin typeface="Consolas" panose="020B0609020204030204" pitchFamily="49" charset="0"/>
+              </a:rPr>
+              <a:t>then</a:t>
+            </a:r>
+            <a:r>
+              <a:rPr lang="en-US" sz="1200" b="0" dirty="0">
+                <a:solidFill>
+                  <a:srgbClr val="D4D4D4"/>
+                </a:solidFill>
+                <a:effectLst/>
+                <a:highlight>
+                  <a:srgbClr val="1E1E1E"/>
+                </a:highlight>
+                <a:latin typeface="Consolas" panose="020B0609020204030204" pitchFamily="49" charset="0"/>
+              </a:rPr>
+              <a:t>(</a:t>
+            </a:r>
+            <a:r>
+              <a:rPr lang="en-US" sz="1200" b="0" dirty="0">
+                <a:solidFill>
+                  <a:srgbClr val="569CD6"/>
+                </a:solidFill>
+                <a:effectLst/>
+                <a:highlight>
+                  <a:srgbClr val="1E1E1E"/>
+                </a:highlight>
+                <a:latin typeface="Consolas" panose="020B0609020204030204" pitchFamily="49" charset="0"/>
+              </a:rPr>
+              <a:t>function</a:t>
+            </a:r>
+            <a:r>
+              <a:rPr lang="en-US" sz="1200" b="0" dirty="0">
+                <a:solidFill>
+                  <a:srgbClr val="D4D4D4"/>
+                </a:solidFill>
+                <a:effectLst/>
+                <a:highlight>
+                  <a:srgbClr val="1E1E1E"/>
+                </a:highlight>
+                <a:latin typeface="Consolas" panose="020B0609020204030204" pitchFamily="49" charset="0"/>
+              </a:rPr>
+              <a:t>(</a:t>
+            </a:r>
+            <a:r>
+              <a:rPr lang="en-US" sz="1200" b="0" dirty="0">
+                <a:solidFill>
+                  <a:srgbClr val="9CDCFE"/>
+                </a:solidFill>
+                <a:effectLst/>
+                <a:highlight>
+                  <a:srgbClr val="1E1E1E"/>
+                </a:highlight>
+                <a:latin typeface="Consolas" panose="020B0609020204030204" pitchFamily="49" charset="0"/>
+              </a:rPr>
+              <a:t>data</a:t>
+            </a:r>
+            <a:r>
+              <a:rPr lang="en-US" sz="1200" b="0" dirty="0">
+                <a:solidFill>
+                  <a:srgbClr val="D4D4D4"/>
+                </a:solidFill>
+                <a:effectLst/>
+                <a:highlight>
+                  <a:srgbClr val="1E1E1E"/>
+                </a:highlight>
+                <a:latin typeface="Consolas" panose="020B0609020204030204" pitchFamily="49" charset="0"/>
+              </a:rPr>
+              <a:t>) { </a:t>
+            </a:r>
+          </a:p>
+          <a:p>
+            <a:endParaRPr lang="en-US" sz="1200" dirty="0">
+              <a:solidFill>
+                <a:srgbClr val="D4D4D4"/>
+              </a:solidFill>
+              <a:highlight>
+                <a:srgbClr val="1E1E1E"/>
+              </a:highlight>
+              <a:latin typeface="Consolas" panose="020B0609020204030204" pitchFamily="49" charset="0"/>
+            </a:endParaRPr>
+          </a:p>
+          <a:p>
+            <a:r>
+              <a:rPr lang="en-US" sz="1200" b="0" dirty="0">
+                <a:solidFill>
+                  <a:srgbClr val="D4D4D4"/>
+                </a:solidFill>
+                <a:effectLst/>
+                <a:highlight>
+                  <a:srgbClr val="1E1E1E"/>
+                </a:highlight>
+                <a:latin typeface="Consolas" panose="020B0609020204030204" pitchFamily="49" charset="0"/>
+              </a:rPr>
+              <a:t> </a:t>
+            </a:r>
+            <a:r>
+              <a:rPr lang="en-US" sz="1200" b="0" dirty="0">
+                <a:solidFill>
+                  <a:srgbClr val="6A9955"/>
+                </a:solidFill>
+                <a:effectLst/>
+                <a:highlight>
+                  <a:srgbClr val="1E1E1E"/>
+                </a:highlight>
+                <a:latin typeface="Consolas" panose="020B0609020204030204" pitchFamily="49" charset="0"/>
+              </a:rPr>
+              <a:t>&lt;!-- D3 library --&gt;</a:t>
+            </a:r>
+            <a:endParaRPr lang="en-US" sz="1200" b="0" dirty="0">
+              <a:solidFill>
+                <a:srgbClr val="D4D4D4"/>
+              </a:solidFill>
+              <a:effectLst/>
+              <a:highlight>
+                <a:srgbClr val="1E1E1E"/>
+              </a:highlight>
+              <a:latin typeface="Consolas" panose="020B0609020204030204" pitchFamily="49" charset="0"/>
+            </a:endParaRPr>
+          </a:p>
+          <a:p>
+            <a:r>
+              <a:rPr lang="en-US" sz="1200" b="0" dirty="0">
+                <a:solidFill>
+                  <a:srgbClr val="D4D4D4"/>
+                </a:solidFill>
+                <a:effectLst/>
+                <a:highlight>
+                  <a:srgbClr val="1E1E1E"/>
+                </a:highlight>
+                <a:latin typeface="Consolas" panose="020B0609020204030204" pitchFamily="49" charset="0"/>
+              </a:rPr>
+              <a:t>  </a:t>
+            </a:r>
+            <a:r>
+              <a:rPr lang="en-US" sz="1200" b="0" dirty="0">
+                <a:solidFill>
+                  <a:srgbClr val="808080"/>
+                </a:solidFill>
+                <a:effectLst/>
+                <a:highlight>
+                  <a:srgbClr val="1E1E1E"/>
+                </a:highlight>
+                <a:latin typeface="Consolas" panose="020B0609020204030204" pitchFamily="49" charset="0"/>
+              </a:rPr>
+              <a:t>&lt;</a:t>
+            </a:r>
+            <a:r>
+              <a:rPr lang="en-US" sz="1200" b="0" dirty="0">
+                <a:solidFill>
+                  <a:srgbClr val="569CD6"/>
+                </a:solidFill>
+                <a:effectLst/>
+                <a:highlight>
+                  <a:srgbClr val="1E1E1E"/>
+                </a:highlight>
+                <a:latin typeface="Consolas" panose="020B0609020204030204" pitchFamily="49" charset="0"/>
+              </a:rPr>
+              <a:t>script</a:t>
+            </a:r>
+            <a:r>
+              <a:rPr lang="en-US" sz="1200" b="0" dirty="0">
+                <a:solidFill>
+                  <a:srgbClr val="D4D4D4"/>
+                </a:solidFill>
+                <a:effectLst/>
+                <a:highlight>
+                  <a:srgbClr val="1E1E1E"/>
+                </a:highlight>
+                <a:latin typeface="Consolas" panose="020B0609020204030204" pitchFamily="49" charset="0"/>
+              </a:rPr>
+              <a:t> </a:t>
+            </a:r>
+            <a:r>
+              <a:rPr lang="en-US" sz="1200" b="0" dirty="0" err="1">
+                <a:solidFill>
+                  <a:srgbClr val="9CDCFE"/>
+                </a:solidFill>
+                <a:effectLst/>
+                <a:highlight>
+                  <a:srgbClr val="1E1E1E"/>
+                </a:highlight>
+                <a:latin typeface="Consolas" panose="020B0609020204030204" pitchFamily="49" charset="0"/>
+              </a:rPr>
+              <a:t>src</a:t>
+            </a:r>
+            <a:r>
+              <a:rPr lang="en-US" sz="1200" b="0" dirty="0">
+                <a:solidFill>
+                  <a:srgbClr val="D4D4D4"/>
+                </a:solidFill>
+                <a:effectLst/>
+                <a:highlight>
+                  <a:srgbClr val="1E1E1E"/>
+                </a:highlight>
+                <a:latin typeface="Consolas" panose="020B0609020204030204" pitchFamily="49" charset="0"/>
+              </a:rPr>
+              <a:t>=</a:t>
+            </a:r>
+            <a:r>
+              <a:rPr lang="en-US" sz="1200" b="0" dirty="0">
+                <a:solidFill>
+                  <a:srgbClr val="CE9178"/>
+                </a:solidFill>
+                <a:effectLst/>
+                <a:highlight>
+                  <a:srgbClr val="1E1E1E"/>
+                </a:highlight>
+                <a:latin typeface="Consolas" panose="020B0609020204030204" pitchFamily="49" charset="0"/>
+              </a:rPr>
+              <a:t>"https://d3js.org/d3.v7.min.js"</a:t>
+            </a:r>
+            <a:r>
+              <a:rPr lang="en-US" sz="1200" b="0" dirty="0">
+                <a:solidFill>
+                  <a:srgbClr val="808080"/>
+                </a:solidFill>
+                <a:effectLst/>
+                <a:highlight>
+                  <a:srgbClr val="1E1E1E"/>
+                </a:highlight>
+                <a:latin typeface="Consolas" panose="020B0609020204030204" pitchFamily="49" charset="0"/>
+              </a:rPr>
+              <a:t>&gt;&lt;/</a:t>
+            </a:r>
+            <a:r>
+              <a:rPr lang="en-US" sz="1200" b="0" dirty="0">
+                <a:solidFill>
+                  <a:srgbClr val="569CD6"/>
+                </a:solidFill>
+                <a:effectLst/>
+                <a:highlight>
+                  <a:srgbClr val="1E1E1E"/>
+                </a:highlight>
+                <a:latin typeface="Consolas" panose="020B0609020204030204" pitchFamily="49" charset="0"/>
+              </a:rPr>
+              <a:t>script</a:t>
+            </a:r>
+            <a:r>
+              <a:rPr lang="en-US" sz="1200" b="0" dirty="0">
+                <a:solidFill>
+                  <a:srgbClr val="808080"/>
+                </a:solidFill>
+                <a:effectLst/>
+                <a:highlight>
+                  <a:srgbClr val="1E1E1E"/>
+                </a:highlight>
+                <a:latin typeface="Consolas" panose="020B0609020204030204" pitchFamily="49" charset="0"/>
+              </a:rPr>
+              <a:t>&gt;</a:t>
+            </a:r>
+            <a:endParaRPr lang="en-US" sz="1200" b="0" dirty="0">
+              <a:solidFill>
+                <a:srgbClr val="D4D4D4"/>
+              </a:solidFill>
+              <a:effectLst/>
+              <a:highlight>
+                <a:srgbClr val="1E1E1E"/>
+              </a:highlight>
+              <a:latin typeface="Consolas" panose="020B0609020204030204" pitchFamily="49" charset="0"/>
+            </a:endParaRPr>
+          </a:p>
+          <a:p>
+            <a:endParaRPr lang="en-US" sz="1200" b="0" dirty="0">
+              <a:solidFill>
+                <a:srgbClr val="D4D4D4"/>
+              </a:solidFill>
+              <a:effectLst/>
+              <a:highlight>
+                <a:srgbClr val="1E1E1E"/>
+              </a:highlight>
+              <a:latin typeface="Consolas" panose="020B0609020204030204" pitchFamily="49" charset="0"/>
+            </a:endParaRPr>
+          </a:p>
+          <a:p>
+            <a:endParaRPr lang="en-US" sz="1200" b="0" dirty="0">
+              <a:solidFill>
+                <a:srgbClr val="D4D4D4"/>
+              </a:solidFill>
+              <a:effectLst/>
+              <a:highlight>
+                <a:srgbClr val="1E1E1E"/>
+              </a:highlight>
+              <a:latin typeface="Consolas" panose="020B0609020204030204" pitchFamily="49" charset="0"/>
+            </a:endParaRPr>
+          </a:p>
+        </p:txBody>
+      </p:sp>
+      <p:cxnSp>
+        <p:nvCxnSpPr>
+          <p:cNvPr id="5" name="Straight Arrow Connector 4">
+            <a:extLst>
+              <a:ext uri="{FF2B5EF4-FFF2-40B4-BE49-F238E27FC236}">
+                <a16:creationId xmlns:a16="http://schemas.microsoft.com/office/drawing/2014/main" id="{98C532DE-7C1D-547A-A8EF-0B1FDD1B8CCE}"/>
+              </a:ext>
+            </a:extLst>
+          </p:cNvPr>
+          <p:cNvCxnSpPr>
+            <a:cxnSpLocks/>
+          </p:cNvCxnSpPr>
+          <p:nvPr/>
+        </p:nvCxnSpPr>
+        <p:spPr>
+          <a:xfrm>
+            <a:off x="4039800" y="1141921"/>
+            <a:ext cx="775855" cy="0"/>
+          </a:xfrm>
+          <a:prstGeom prst="straightConnector1">
+            <a:avLst/>
+          </a:prstGeom>
+          <a:ln w="57150">
+            <a:tailEnd type="triangle"/>
+          </a:ln>
+        </p:spPr>
+        <p:style>
+          <a:lnRef idx="2">
+            <a:schemeClr val="accent1"/>
+          </a:lnRef>
+          <a:fillRef idx="0">
+            <a:schemeClr val="accent1"/>
+          </a:fillRef>
+          <a:effectRef idx="1">
+            <a:schemeClr val="accent1"/>
+          </a:effectRef>
+          <a:fontRef idx="minor">
+            <a:schemeClr val="tx1"/>
+          </a:fontRef>
+        </p:style>
+      </p:cxnSp>
+      <p:sp>
+        <p:nvSpPr>
+          <p:cNvPr id="8" name="TextBox 7">
+            <a:extLst>
+              <a:ext uri="{FF2B5EF4-FFF2-40B4-BE49-F238E27FC236}">
+                <a16:creationId xmlns:a16="http://schemas.microsoft.com/office/drawing/2014/main" id="{7A5DC2D1-0E45-354A-957C-A95CE65F9F6B}"/>
+              </a:ext>
+            </a:extLst>
+          </p:cNvPr>
+          <p:cNvSpPr txBox="1"/>
+          <p:nvPr/>
+        </p:nvSpPr>
+        <p:spPr>
+          <a:xfrm>
+            <a:off x="595652" y="3244334"/>
+            <a:ext cx="3135099" cy="369332"/>
+          </a:xfrm>
+          <a:prstGeom prst="rect">
+            <a:avLst/>
+          </a:prstGeom>
+          <a:noFill/>
+          <a:ln w="12700" cap="rnd">
+            <a:solidFill>
+              <a:schemeClr val="accent1"/>
+            </a:solidFill>
+          </a:ln>
+        </p:spPr>
+        <p:txBody>
+          <a:bodyPr wrap="square" rtlCol="0">
+            <a:spAutoFit/>
+          </a:bodyPr>
+          <a:lstStyle/>
+          <a:p>
+            <a:r>
+              <a:rPr lang="en-US" dirty="0"/>
+              <a:t>Map Visuals </a:t>
+            </a:r>
+          </a:p>
+        </p:txBody>
+      </p:sp>
+      <p:sp>
+        <p:nvSpPr>
+          <p:cNvPr id="9" name="TextBox 8">
+            <a:extLst>
+              <a:ext uri="{FF2B5EF4-FFF2-40B4-BE49-F238E27FC236}">
+                <a16:creationId xmlns:a16="http://schemas.microsoft.com/office/drawing/2014/main" id="{40AD61F9-3B82-93B7-F6A4-848FFCD490F5}"/>
+              </a:ext>
+            </a:extLst>
+          </p:cNvPr>
+          <p:cNvSpPr txBox="1"/>
+          <p:nvPr/>
+        </p:nvSpPr>
+        <p:spPr>
+          <a:xfrm>
+            <a:off x="4919472" y="2129728"/>
+            <a:ext cx="6510528" cy="2677656"/>
+          </a:xfrm>
+          <a:prstGeom prst="rect">
+            <a:avLst/>
+          </a:prstGeom>
+          <a:noFill/>
+          <a:ln w="12700" cap="rnd">
+            <a:solidFill>
+              <a:schemeClr val="accent1"/>
+            </a:solidFill>
+          </a:ln>
+        </p:spPr>
+        <p:txBody>
+          <a:bodyPr wrap="square" rtlCol="0">
+            <a:spAutoFit/>
+          </a:bodyPr>
+          <a:lstStyle>
+            <a:defPPr>
+              <a:defRPr lang="en-US"/>
+            </a:defPPr>
+            <a:lvl1pPr>
+              <a:defRPr/>
+            </a:lvl1pPr>
+          </a:lstStyle>
+          <a:p>
+            <a:r>
+              <a:rPr lang="en-US" sz="1200" b="0" dirty="0">
+                <a:solidFill>
+                  <a:srgbClr val="6A9955"/>
+                </a:solidFill>
+                <a:effectLst/>
+                <a:highlight>
+                  <a:srgbClr val="1E1E1E"/>
+                </a:highlight>
+                <a:latin typeface="Consolas" panose="020B0609020204030204" pitchFamily="49" charset="0"/>
+              </a:rPr>
+              <a:t>&lt;!-- Leaflet CSS --&gt;</a:t>
+            </a:r>
+            <a:endParaRPr lang="en-US" sz="1200" b="0" dirty="0">
+              <a:solidFill>
+                <a:srgbClr val="D4D4D4"/>
+              </a:solidFill>
+              <a:effectLst/>
+              <a:highlight>
+                <a:srgbClr val="1E1E1E"/>
+              </a:highlight>
+              <a:latin typeface="Consolas" panose="020B0609020204030204" pitchFamily="49" charset="0"/>
+            </a:endParaRPr>
+          </a:p>
+          <a:p>
+            <a:r>
+              <a:rPr lang="en-US" sz="1200" b="0" dirty="0">
+                <a:solidFill>
+                  <a:srgbClr val="D4D4D4"/>
+                </a:solidFill>
+                <a:effectLst/>
+                <a:highlight>
+                  <a:srgbClr val="1E1E1E"/>
+                </a:highlight>
+                <a:latin typeface="Consolas" panose="020B0609020204030204" pitchFamily="49" charset="0"/>
+              </a:rPr>
+              <a:t>  </a:t>
+            </a:r>
+            <a:r>
+              <a:rPr lang="en-US" sz="1200" b="0" dirty="0">
+                <a:solidFill>
+                  <a:srgbClr val="808080"/>
+                </a:solidFill>
+                <a:effectLst/>
+                <a:highlight>
+                  <a:srgbClr val="1E1E1E"/>
+                </a:highlight>
+                <a:latin typeface="Consolas" panose="020B0609020204030204" pitchFamily="49" charset="0"/>
+              </a:rPr>
+              <a:t>&lt;</a:t>
+            </a:r>
+            <a:r>
+              <a:rPr lang="en-US" sz="1200" b="0" dirty="0">
+                <a:solidFill>
+                  <a:srgbClr val="569CD6"/>
+                </a:solidFill>
+                <a:effectLst/>
+                <a:highlight>
+                  <a:srgbClr val="1E1E1E"/>
+                </a:highlight>
+                <a:latin typeface="Consolas" panose="020B0609020204030204" pitchFamily="49" charset="0"/>
+              </a:rPr>
+              <a:t>link</a:t>
+            </a:r>
+            <a:r>
+              <a:rPr lang="en-US" sz="1200" b="0" dirty="0">
+                <a:solidFill>
+                  <a:srgbClr val="D4D4D4"/>
+                </a:solidFill>
+                <a:effectLst/>
+                <a:highlight>
+                  <a:srgbClr val="1E1E1E"/>
+                </a:highlight>
+                <a:latin typeface="Consolas" panose="020B0609020204030204" pitchFamily="49" charset="0"/>
+              </a:rPr>
+              <a:t> </a:t>
+            </a:r>
+            <a:r>
+              <a:rPr lang="en-US" sz="1200" b="0" dirty="0" err="1">
+                <a:solidFill>
+                  <a:srgbClr val="9CDCFE"/>
+                </a:solidFill>
+                <a:effectLst/>
+                <a:highlight>
+                  <a:srgbClr val="1E1E1E"/>
+                </a:highlight>
+                <a:latin typeface="Consolas" panose="020B0609020204030204" pitchFamily="49" charset="0"/>
+              </a:rPr>
+              <a:t>rel</a:t>
+            </a:r>
+            <a:r>
+              <a:rPr lang="en-US" sz="1200" b="0" dirty="0">
+                <a:solidFill>
+                  <a:srgbClr val="D4D4D4"/>
+                </a:solidFill>
+                <a:effectLst/>
+                <a:highlight>
+                  <a:srgbClr val="1E1E1E"/>
+                </a:highlight>
+                <a:latin typeface="Consolas" panose="020B0609020204030204" pitchFamily="49" charset="0"/>
+              </a:rPr>
+              <a:t>=</a:t>
+            </a:r>
+            <a:r>
+              <a:rPr lang="en-US" sz="1200" b="0" dirty="0">
+                <a:solidFill>
+                  <a:srgbClr val="CE9178"/>
+                </a:solidFill>
+                <a:effectLst/>
+                <a:highlight>
+                  <a:srgbClr val="1E1E1E"/>
+                </a:highlight>
+                <a:latin typeface="Consolas" panose="020B0609020204030204" pitchFamily="49" charset="0"/>
+              </a:rPr>
+              <a:t>"stylesheet"</a:t>
+            </a:r>
+            <a:r>
+              <a:rPr lang="en-US" sz="1200" b="0" dirty="0">
+                <a:solidFill>
+                  <a:srgbClr val="D4D4D4"/>
+                </a:solidFill>
+                <a:effectLst/>
+                <a:highlight>
+                  <a:srgbClr val="1E1E1E"/>
+                </a:highlight>
+                <a:latin typeface="Consolas" panose="020B0609020204030204" pitchFamily="49" charset="0"/>
+              </a:rPr>
+              <a:t>  </a:t>
+            </a:r>
+            <a:r>
+              <a:rPr lang="en-US" sz="1200" b="0" dirty="0" err="1">
+                <a:solidFill>
+                  <a:srgbClr val="9CDCFE"/>
+                </a:solidFill>
+                <a:effectLst/>
+                <a:highlight>
+                  <a:srgbClr val="1E1E1E"/>
+                </a:highlight>
+                <a:latin typeface="Consolas" panose="020B0609020204030204" pitchFamily="49" charset="0"/>
+              </a:rPr>
+              <a:t>href</a:t>
+            </a:r>
+            <a:r>
+              <a:rPr lang="en-US" sz="1200" b="0" dirty="0">
+                <a:solidFill>
+                  <a:srgbClr val="D4D4D4"/>
+                </a:solidFill>
+                <a:effectLst/>
+                <a:highlight>
+                  <a:srgbClr val="1E1E1E"/>
+                </a:highlight>
+                <a:latin typeface="Consolas" panose="020B0609020204030204" pitchFamily="49" charset="0"/>
+              </a:rPr>
+              <a:t>=</a:t>
+            </a:r>
+            <a:r>
+              <a:rPr lang="en-US" sz="1200" b="0" dirty="0">
+                <a:solidFill>
+                  <a:srgbClr val="CE9178"/>
+                </a:solidFill>
+                <a:effectLst/>
+                <a:highlight>
+                  <a:srgbClr val="1E1E1E"/>
+                </a:highlight>
+                <a:latin typeface="Consolas" panose="020B0609020204030204" pitchFamily="49" charset="0"/>
+              </a:rPr>
+              <a:t>"https://unpkg.com/leaflet@1.9.4/</a:t>
+            </a:r>
+            <a:r>
+              <a:rPr lang="en-US" sz="1200" b="0" dirty="0" err="1">
+                <a:solidFill>
+                  <a:srgbClr val="CE9178"/>
+                </a:solidFill>
+                <a:effectLst/>
+                <a:highlight>
+                  <a:srgbClr val="1E1E1E"/>
+                </a:highlight>
+                <a:latin typeface="Consolas" panose="020B0609020204030204" pitchFamily="49" charset="0"/>
+              </a:rPr>
+              <a:t>dist</a:t>
+            </a:r>
+            <a:r>
+              <a:rPr lang="en-US" sz="1200" b="0" dirty="0">
+                <a:solidFill>
+                  <a:srgbClr val="CE9178"/>
+                </a:solidFill>
+                <a:effectLst/>
+                <a:highlight>
+                  <a:srgbClr val="1E1E1E"/>
+                </a:highlight>
+                <a:latin typeface="Consolas" panose="020B0609020204030204" pitchFamily="49" charset="0"/>
+              </a:rPr>
+              <a:t>/leaflet.css"</a:t>
+            </a:r>
+            <a:endParaRPr lang="en-US" sz="1200" b="0" dirty="0">
+              <a:solidFill>
+                <a:srgbClr val="D4D4D4"/>
+              </a:solidFill>
+              <a:effectLst/>
+              <a:highlight>
+                <a:srgbClr val="1E1E1E"/>
+              </a:highlight>
+              <a:latin typeface="Consolas" panose="020B0609020204030204" pitchFamily="49" charset="0"/>
+            </a:endParaRPr>
+          </a:p>
+          <a:p>
+            <a:r>
+              <a:rPr lang="en-US" sz="1200" b="0" dirty="0">
+                <a:solidFill>
+                  <a:srgbClr val="D4D4D4"/>
+                </a:solidFill>
+                <a:effectLst/>
+                <a:highlight>
+                  <a:srgbClr val="1E1E1E"/>
+                </a:highlight>
+                <a:latin typeface="Consolas" panose="020B0609020204030204" pitchFamily="49" charset="0"/>
+              </a:rPr>
+              <a:t>    </a:t>
+            </a:r>
+            <a:r>
+              <a:rPr lang="en-US" sz="1200" b="0" dirty="0">
+                <a:solidFill>
+                  <a:srgbClr val="9CDCFE"/>
+                </a:solidFill>
+                <a:effectLst/>
+                <a:highlight>
+                  <a:srgbClr val="1E1E1E"/>
+                </a:highlight>
+                <a:latin typeface="Consolas" panose="020B0609020204030204" pitchFamily="49" charset="0"/>
+              </a:rPr>
+              <a:t>integrity</a:t>
+            </a:r>
+            <a:r>
+              <a:rPr lang="en-US" sz="1200" b="0" dirty="0">
+                <a:solidFill>
+                  <a:srgbClr val="D4D4D4"/>
+                </a:solidFill>
+                <a:effectLst/>
+                <a:highlight>
+                  <a:srgbClr val="1E1E1E"/>
+                </a:highlight>
+                <a:latin typeface="Consolas" panose="020B0609020204030204" pitchFamily="49" charset="0"/>
+              </a:rPr>
+              <a:t>=</a:t>
+            </a:r>
+            <a:r>
+              <a:rPr lang="en-US" sz="1200" b="0" dirty="0">
+                <a:solidFill>
+                  <a:srgbClr val="CE9178"/>
+                </a:solidFill>
+                <a:effectLst/>
+                <a:highlight>
+                  <a:srgbClr val="1E1E1E"/>
+                </a:highlight>
+                <a:latin typeface="Consolas" panose="020B0609020204030204" pitchFamily="49" charset="0"/>
+              </a:rPr>
+              <a:t>"sha256-p4NxAoJBhIIN+hmNHrzRCf9tD/miZyoHS5obTRR9BMY="</a:t>
+            </a:r>
+            <a:endParaRPr lang="en-US" sz="1200" b="0" dirty="0">
+              <a:solidFill>
+                <a:srgbClr val="D4D4D4"/>
+              </a:solidFill>
+              <a:effectLst/>
+              <a:highlight>
+                <a:srgbClr val="1E1E1E"/>
+              </a:highlight>
+              <a:latin typeface="Consolas" panose="020B0609020204030204" pitchFamily="49" charset="0"/>
+            </a:endParaRPr>
+          </a:p>
+          <a:p>
+            <a:r>
+              <a:rPr lang="en-US" sz="1200" b="0" dirty="0">
+                <a:solidFill>
+                  <a:srgbClr val="D4D4D4"/>
+                </a:solidFill>
+                <a:effectLst/>
+                <a:highlight>
+                  <a:srgbClr val="1E1E1E"/>
+                </a:highlight>
+                <a:latin typeface="Consolas" panose="020B0609020204030204" pitchFamily="49" charset="0"/>
+              </a:rPr>
+              <a:t>    </a:t>
+            </a:r>
+            <a:r>
+              <a:rPr lang="en-US" sz="1200" b="0" dirty="0" err="1">
+                <a:solidFill>
+                  <a:srgbClr val="9CDCFE"/>
+                </a:solidFill>
+                <a:effectLst/>
+                <a:highlight>
+                  <a:srgbClr val="1E1E1E"/>
+                </a:highlight>
+                <a:latin typeface="Consolas" panose="020B0609020204030204" pitchFamily="49" charset="0"/>
+              </a:rPr>
+              <a:t>crossorigin</a:t>
+            </a:r>
+            <a:r>
+              <a:rPr lang="en-US" sz="1200" b="0" dirty="0">
+                <a:solidFill>
+                  <a:srgbClr val="D4D4D4"/>
+                </a:solidFill>
+                <a:effectLst/>
+                <a:highlight>
+                  <a:srgbClr val="1E1E1E"/>
+                </a:highlight>
+                <a:latin typeface="Consolas" panose="020B0609020204030204" pitchFamily="49" charset="0"/>
+              </a:rPr>
+              <a:t>=</a:t>
+            </a:r>
+            <a:r>
+              <a:rPr lang="en-US" sz="1200" b="0" dirty="0">
+                <a:solidFill>
+                  <a:srgbClr val="CE9178"/>
+                </a:solidFill>
+                <a:effectLst/>
+                <a:highlight>
+                  <a:srgbClr val="1E1E1E"/>
+                </a:highlight>
+                <a:latin typeface="Consolas" panose="020B0609020204030204" pitchFamily="49" charset="0"/>
+              </a:rPr>
+              <a:t>""</a:t>
+            </a:r>
+            <a:r>
+              <a:rPr lang="en-US" sz="1200" b="0" dirty="0">
+                <a:solidFill>
+                  <a:srgbClr val="D4D4D4"/>
+                </a:solidFill>
+                <a:effectLst/>
+                <a:highlight>
+                  <a:srgbClr val="1E1E1E"/>
+                </a:highlight>
+                <a:latin typeface="Consolas" panose="020B0609020204030204" pitchFamily="49" charset="0"/>
+              </a:rPr>
+              <a:t> </a:t>
+            </a:r>
+            <a:r>
+              <a:rPr lang="en-US" sz="1200" b="0" dirty="0">
+                <a:solidFill>
+                  <a:srgbClr val="808080"/>
+                </a:solidFill>
+                <a:effectLst/>
+                <a:highlight>
+                  <a:srgbClr val="1E1E1E"/>
+                </a:highlight>
+                <a:latin typeface="Consolas" panose="020B0609020204030204" pitchFamily="49" charset="0"/>
+              </a:rPr>
+              <a:t>/&gt;</a:t>
+            </a:r>
+            <a:endParaRPr lang="en-US" sz="1200" b="0" dirty="0">
+              <a:solidFill>
+                <a:srgbClr val="D4D4D4"/>
+              </a:solidFill>
+              <a:effectLst/>
+              <a:highlight>
+                <a:srgbClr val="1E1E1E"/>
+              </a:highlight>
+              <a:latin typeface="Consolas" panose="020B0609020204030204" pitchFamily="49" charset="0"/>
+            </a:endParaRPr>
+          </a:p>
+          <a:p>
+            <a:r>
+              <a:rPr lang="en-US" sz="1200" b="0" dirty="0">
+                <a:solidFill>
+                  <a:srgbClr val="D4D4D4"/>
+                </a:solidFill>
+                <a:effectLst/>
+                <a:highlight>
+                  <a:srgbClr val="1E1E1E"/>
+                </a:highlight>
+                <a:latin typeface="Consolas" panose="020B0609020204030204" pitchFamily="49" charset="0"/>
+              </a:rPr>
+              <a:t>  </a:t>
+            </a:r>
+          </a:p>
+          <a:p>
+            <a:r>
+              <a:rPr lang="en-US" sz="1200" b="0" dirty="0">
+                <a:solidFill>
+                  <a:srgbClr val="D4D4D4"/>
+                </a:solidFill>
+                <a:effectLst/>
+                <a:highlight>
+                  <a:srgbClr val="1E1E1E"/>
+                </a:highlight>
+                <a:latin typeface="Consolas" panose="020B0609020204030204" pitchFamily="49" charset="0"/>
+              </a:rPr>
+              <a:t>  </a:t>
+            </a:r>
+            <a:r>
+              <a:rPr lang="en-US" sz="1200" b="0" dirty="0">
+                <a:solidFill>
+                  <a:srgbClr val="6A9955"/>
+                </a:solidFill>
+                <a:effectLst/>
+                <a:highlight>
+                  <a:srgbClr val="1E1E1E"/>
+                </a:highlight>
+                <a:latin typeface="Consolas" panose="020B0609020204030204" pitchFamily="49" charset="0"/>
+              </a:rPr>
+              <a:t>&lt;!-- Leaflet JavaScript code --&gt;</a:t>
+            </a:r>
+            <a:endParaRPr lang="en-US" sz="1200" b="0" dirty="0">
+              <a:solidFill>
+                <a:srgbClr val="D4D4D4"/>
+              </a:solidFill>
+              <a:effectLst/>
+              <a:highlight>
+                <a:srgbClr val="1E1E1E"/>
+              </a:highlight>
+              <a:latin typeface="Consolas" panose="020B0609020204030204" pitchFamily="49" charset="0"/>
+            </a:endParaRPr>
+          </a:p>
+          <a:p>
+            <a:r>
+              <a:rPr lang="en-US" sz="1200" b="0" dirty="0">
+                <a:solidFill>
+                  <a:srgbClr val="D4D4D4"/>
+                </a:solidFill>
+                <a:effectLst/>
+                <a:highlight>
+                  <a:srgbClr val="1E1E1E"/>
+                </a:highlight>
+                <a:latin typeface="Consolas" panose="020B0609020204030204" pitchFamily="49" charset="0"/>
+              </a:rPr>
+              <a:t>  </a:t>
+            </a:r>
+            <a:r>
+              <a:rPr lang="en-US" sz="1200" b="0" dirty="0">
+                <a:solidFill>
+                  <a:srgbClr val="808080"/>
+                </a:solidFill>
+                <a:effectLst/>
+                <a:highlight>
+                  <a:srgbClr val="1E1E1E"/>
+                </a:highlight>
+                <a:latin typeface="Consolas" panose="020B0609020204030204" pitchFamily="49" charset="0"/>
+              </a:rPr>
+              <a:t>&lt;</a:t>
+            </a:r>
+            <a:r>
+              <a:rPr lang="en-US" sz="1200" b="0" dirty="0">
+                <a:solidFill>
+                  <a:srgbClr val="569CD6"/>
+                </a:solidFill>
+                <a:effectLst/>
+                <a:highlight>
+                  <a:srgbClr val="1E1E1E"/>
+                </a:highlight>
+                <a:latin typeface="Consolas" panose="020B0609020204030204" pitchFamily="49" charset="0"/>
+              </a:rPr>
+              <a:t>script</a:t>
+            </a:r>
+            <a:r>
+              <a:rPr lang="en-US" sz="1200" b="0" dirty="0">
+                <a:solidFill>
+                  <a:srgbClr val="D4D4D4"/>
+                </a:solidFill>
+                <a:effectLst/>
+                <a:highlight>
+                  <a:srgbClr val="1E1E1E"/>
+                </a:highlight>
+                <a:latin typeface="Consolas" panose="020B0609020204030204" pitchFamily="49" charset="0"/>
+              </a:rPr>
+              <a:t> </a:t>
+            </a:r>
+            <a:r>
+              <a:rPr lang="en-US" sz="1200" b="0" dirty="0" err="1">
+                <a:solidFill>
+                  <a:srgbClr val="9CDCFE"/>
+                </a:solidFill>
+                <a:effectLst/>
+                <a:highlight>
+                  <a:srgbClr val="1E1E1E"/>
+                </a:highlight>
+                <a:latin typeface="Consolas" panose="020B0609020204030204" pitchFamily="49" charset="0"/>
+              </a:rPr>
+              <a:t>src</a:t>
+            </a:r>
+            <a:r>
+              <a:rPr lang="en-US" sz="1200" b="0" dirty="0">
+                <a:solidFill>
+                  <a:srgbClr val="D4D4D4"/>
+                </a:solidFill>
+                <a:effectLst/>
+                <a:highlight>
+                  <a:srgbClr val="1E1E1E"/>
+                </a:highlight>
+                <a:latin typeface="Consolas" panose="020B0609020204030204" pitchFamily="49" charset="0"/>
+              </a:rPr>
+              <a:t>=</a:t>
+            </a:r>
+            <a:r>
+              <a:rPr lang="en-US" sz="1200" b="0" dirty="0">
+                <a:solidFill>
+                  <a:srgbClr val="CE9178"/>
+                </a:solidFill>
+                <a:effectLst/>
+                <a:highlight>
+                  <a:srgbClr val="1E1E1E"/>
+                </a:highlight>
+                <a:latin typeface="Consolas" panose="020B0609020204030204" pitchFamily="49" charset="0"/>
+              </a:rPr>
+              <a:t>"https://unpkg.com/leaflet@1.9.4/</a:t>
+            </a:r>
+            <a:r>
+              <a:rPr lang="en-US" sz="1200" b="0" dirty="0" err="1">
+                <a:solidFill>
+                  <a:srgbClr val="CE9178"/>
+                </a:solidFill>
+                <a:effectLst/>
+                <a:highlight>
+                  <a:srgbClr val="1E1E1E"/>
+                </a:highlight>
+                <a:latin typeface="Consolas" panose="020B0609020204030204" pitchFamily="49" charset="0"/>
+              </a:rPr>
+              <a:t>dist</a:t>
+            </a:r>
+            <a:r>
+              <a:rPr lang="en-US" sz="1200" b="0" dirty="0">
+                <a:solidFill>
+                  <a:srgbClr val="CE9178"/>
+                </a:solidFill>
+                <a:effectLst/>
+                <a:highlight>
+                  <a:srgbClr val="1E1E1E"/>
+                </a:highlight>
+                <a:latin typeface="Consolas" panose="020B0609020204030204" pitchFamily="49" charset="0"/>
+              </a:rPr>
+              <a:t>/leaflet.js"</a:t>
+            </a:r>
+            <a:endParaRPr lang="en-US" sz="1200" b="0" dirty="0">
+              <a:solidFill>
+                <a:srgbClr val="D4D4D4"/>
+              </a:solidFill>
+              <a:effectLst/>
+              <a:highlight>
+                <a:srgbClr val="1E1E1E"/>
+              </a:highlight>
+              <a:latin typeface="Consolas" panose="020B0609020204030204" pitchFamily="49" charset="0"/>
+            </a:endParaRPr>
+          </a:p>
+          <a:p>
+            <a:r>
+              <a:rPr lang="en-US" sz="1200" b="0" dirty="0">
+                <a:solidFill>
+                  <a:srgbClr val="D4D4D4"/>
+                </a:solidFill>
+                <a:effectLst/>
+                <a:highlight>
+                  <a:srgbClr val="1E1E1E"/>
+                </a:highlight>
+                <a:latin typeface="Consolas" panose="020B0609020204030204" pitchFamily="49" charset="0"/>
+              </a:rPr>
+              <a:t>    </a:t>
+            </a:r>
+            <a:r>
+              <a:rPr lang="en-US" sz="1200" b="0" dirty="0">
+                <a:solidFill>
+                  <a:srgbClr val="9CDCFE"/>
+                </a:solidFill>
+                <a:effectLst/>
+                <a:highlight>
+                  <a:srgbClr val="1E1E1E"/>
+                </a:highlight>
+                <a:latin typeface="Consolas" panose="020B0609020204030204" pitchFamily="49" charset="0"/>
+              </a:rPr>
+              <a:t>integrity</a:t>
+            </a:r>
+            <a:r>
+              <a:rPr lang="en-US" sz="1200" b="0" dirty="0">
+                <a:solidFill>
+                  <a:srgbClr val="D4D4D4"/>
+                </a:solidFill>
+                <a:effectLst/>
+                <a:highlight>
+                  <a:srgbClr val="1E1E1E"/>
+                </a:highlight>
+                <a:latin typeface="Consolas" panose="020B0609020204030204" pitchFamily="49" charset="0"/>
+              </a:rPr>
+              <a:t>=</a:t>
+            </a:r>
+            <a:r>
+              <a:rPr lang="en-US" sz="1200" b="0" dirty="0">
+                <a:solidFill>
+                  <a:srgbClr val="CE9178"/>
+                </a:solidFill>
+                <a:effectLst/>
+                <a:highlight>
+                  <a:srgbClr val="1E1E1E"/>
+                </a:highlight>
+                <a:latin typeface="Consolas" panose="020B0609020204030204" pitchFamily="49" charset="0"/>
+              </a:rPr>
+              <a:t>"sha256-20nQCchB9co0qIjJZRGuk2/Z9VM+kNiyxNV1lvTlZBo="</a:t>
+            </a:r>
+            <a:endParaRPr lang="en-US" sz="1200" b="0" dirty="0">
+              <a:solidFill>
+                <a:srgbClr val="D4D4D4"/>
+              </a:solidFill>
+              <a:effectLst/>
+              <a:highlight>
+                <a:srgbClr val="1E1E1E"/>
+              </a:highlight>
+              <a:latin typeface="Consolas" panose="020B0609020204030204" pitchFamily="49" charset="0"/>
+            </a:endParaRPr>
+          </a:p>
+          <a:p>
+            <a:r>
+              <a:rPr lang="en-US" sz="1200" b="0" dirty="0">
+                <a:solidFill>
+                  <a:srgbClr val="D4D4D4"/>
+                </a:solidFill>
+                <a:effectLst/>
+                <a:highlight>
+                  <a:srgbClr val="1E1E1E"/>
+                </a:highlight>
+                <a:latin typeface="Consolas" panose="020B0609020204030204" pitchFamily="49" charset="0"/>
+              </a:rPr>
+              <a:t>    </a:t>
+            </a:r>
+            <a:r>
+              <a:rPr lang="en-US" sz="1200" b="0" dirty="0" err="1">
+                <a:solidFill>
+                  <a:srgbClr val="9CDCFE"/>
+                </a:solidFill>
+                <a:effectLst/>
+                <a:highlight>
+                  <a:srgbClr val="1E1E1E"/>
+                </a:highlight>
+                <a:latin typeface="Consolas" panose="020B0609020204030204" pitchFamily="49" charset="0"/>
+              </a:rPr>
+              <a:t>crossorigin</a:t>
+            </a:r>
+            <a:r>
+              <a:rPr lang="en-US" sz="1200" b="0" dirty="0">
+                <a:solidFill>
+                  <a:srgbClr val="D4D4D4"/>
+                </a:solidFill>
+                <a:effectLst/>
+                <a:highlight>
+                  <a:srgbClr val="1E1E1E"/>
+                </a:highlight>
+                <a:latin typeface="Consolas" panose="020B0609020204030204" pitchFamily="49" charset="0"/>
+              </a:rPr>
+              <a:t>=</a:t>
+            </a:r>
+            <a:r>
+              <a:rPr lang="en-US" sz="1200" b="0" dirty="0">
+                <a:solidFill>
+                  <a:srgbClr val="CE9178"/>
+                </a:solidFill>
+                <a:effectLst/>
+                <a:highlight>
+                  <a:srgbClr val="1E1E1E"/>
+                </a:highlight>
+                <a:latin typeface="Consolas" panose="020B0609020204030204" pitchFamily="49" charset="0"/>
+              </a:rPr>
+              <a:t>""</a:t>
+            </a:r>
+            <a:r>
+              <a:rPr lang="en-US" sz="1200" b="0" dirty="0">
+                <a:solidFill>
+                  <a:srgbClr val="808080"/>
+                </a:solidFill>
+                <a:effectLst/>
+                <a:highlight>
+                  <a:srgbClr val="1E1E1E"/>
+                </a:highlight>
+                <a:latin typeface="Consolas" panose="020B0609020204030204" pitchFamily="49" charset="0"/>
+              </a:rPr>
+              <a:t>&gt;&lt;/</a:t>
+            </a:r>
+            <a:r>
+              <a:rPr lang="en-US" sz="1200" b="0" dirty="0">
+                <a:solidFill>
+                  <a:srgbClr val="569CD6"/>
+                </a:solidFill>
+                <a:effectLst/>
+                <a:highlight>
+                  <a:srgbClr val="1E1E1E"/>
+                </a:highlight>
+                <a:latin typeface="Consolas" panose="020B0609020204030204" pitchFamily="49" charset="0"/>
+              </a:rPr>
+              <a:t>script</a:t>
+            </a:r>
+            <a:r>
+              <a:rPr lang="en-US" sz="1200" b="0" dirty="0">
+                <a:solidFill>
+                  <a:srgbClr val="808080"/>
+                </a:solidFill>
+                <a:effectLst/>
+                <a:highlight>
+                  <a:srgbClr val="1E1E1E"/>
+                </a:highlight>
+                <a:latin typeface="Consolas" panose="020B0609020204030204" pitchFamily="49" charset="0"/>
+              </a:rPr>
+              <a:t>&gt;</a:t>
+            </a:r>
+            <a:endParaRPr lang="en-US" sz="1200" b="0" dirty="0">
+              <a:solidFill>
+                <a:srgbClr val="D4D4D4"/>
+              </a:solidFill>
+              <a:effectLst/>
+              <a:highlight>
+                <a:srgbClr val="1E1E1E"/>
+              </a:highlight>
+              <a:latin typeface="Consolas" panose="020B0609020204030204" pitchFamily="49" charset="0"/>
+            </a:endParaRPr>
+          </a:p>
+          <a:p>
+            <a:br>
+              <a:rPr lang="en-US" sz="1200" b="0" dirty="0">
+                <a:solidFill>
+                  <a:srgbClr val="D4D4D4"/>
+                </a:solidFill>
+                <a:effectLst/>
+                <a:highlight>
+                  <a:srgbClr val="1E1E1E"/>
+                </a:highlight>
+                <a:latin typeface="Consolas" panose="020B0609020204030204" pitchFamily="49" charset="0"/>
+              </a:rPr>
+            </a:br>
+            <a:r>
+              <a:rPr lang="en-US" sz="1200" b="0" dirty="0">
+                <a:solidFill>
+                  <a:srgbClr val="D4D4D4"/>
+                </a:solidFill>
+                <a:effectLst/>
+                <a:highlight>
+                  <a:srgbClr val="1E1E1E"/>
+                </a:highlight>
+                <a:latin typeface="Consolas" panose="020B0609020204030204" pitchFamily="49" charset="0"/>
+              </a:rPr>
+              <a:t>    </a:t>
+            </a:r>
+            <a:r>
+              <a:rPr lang="en-US" sz="1200" b="0" dirty="0">
+                <a:solidFill>
+                  <a:srgbClr val="6A9955"/>
+                </a:solidFill>
+                <a:effectLst/>
+                <a:highlight>
+                  <a:srgbClr val="1E1E1E"/>
+                </a:highlight>
+                <a:latin typeface="Consolas" panose="020B0609020204030204" pitchFamily="49" charset="0"/>
+              </a:rPr>
+              <a:t>&lt;!-- leaflet-choropleth JavaScript --&gt;</a:t>
+            </a:r>
+            <a:endParaRPr lang="en-US" sz="1200" b="0" dirty="0">
+              <a:solidFill>
+                <a:srgbClr val="D4D4D4"/>
+              </a:solidFill>
+              <a:effectLst/>
+              <a:highlight>
+                <a:srgbClr val="1E1E1E"/>
+              </a:highlight>
+              <a:latin typeface="Consolas" panose="020B0609020204030204" pitchFamily="49" charset="0"/>
+            </a:endParaRPr>
+          </a:p>
+          <a:p>
+            <a:r>
+              <a:rPr lang="en-US" sz="1200" b="0" dirty="0">
+                <a:solidFill>
+                  <a:srgbClr val="D4D4D4"/>
+                </a:solidFill>
+                <a:effectLst/>
+                <a:highlight>
+                  <a:srgbClr val="1E1E1E"/>
+                </a:highlight>
+                <a:latin typeface="Consolas" panose="020B0609020204030204" pitchFamily="49" charset="0"/>
+              </a:rPr>
+              <a:t>    </a:t>
+            </a:r>
+            <a:r>
+              <a:rPr lang="en-US" sz="1200" b="0" dirty="0">
+                <a:solidFill>
+                  <a:srgbClr val="808080"/>
+                </a:solidFill>
+                <a:effectLst/>
+                <a:highlight>
+                  <a:srgbClr val="1E1E1E"/>
+                </a:highlight>
+                <a:latin typeface="Consolas" panose="020B0609020204030204" pitchFamily="49" charset="0"/>
+              </a:rPr>
+              <a:t>&lt;</a:t>
+            </a:r>
+            <a:r>
+              <a:rPr lang="en-US" sz="1200" b="0" dirty="0">
+                <a:solidFill>
+                  <a:srgbClr val="569CD6"/>
+                </a:solidFill>
+                <a:effectLst/>
+                <a:highlight>
+                  <a:srgbClr val="1E1E1E"/>
+                </a:highlight>
+                <a:latin typeface="Consolas" panose="020B0609020204030204" pitchFamily="49" charset="0"/>
+              </a:rPr>
+              <a:t>script</a:t>
+            </a:r>
+            <a:r>
+              <a:rPr lang="en-US" sz="1200" b="0" dirty="0">
+                <a:solidFill>
+                  <a:srgbClr val="D4D4D4"/>
+                </a:solidFill>
+                <a:effectLst/>
+                <a:highlight>
+                  <a:srgbClr val="1E1E1E"/>
+                </a:highlight>
+                <a:latin typeface="Consolas" panose="020B0609020204030204" pitchFamily="49" charset="0"/>
+              </a:rPr>
+              <a:t> </a:t>
+            </a:r>
+            <a:r>
+              <a:rPr lang="en-US" sz="1200" b="0" dirty="0">
+                <a:solidFill>
+                  <a:srgbClr val="9CDCFE"/>
+                </a:solidFill>
+                <a:effectLst/>
+                <a:highlight>
+                  <a:srgbClr val="1E1E1E"/>
+                </a:highlight>
+                <a:latin typeface="Consolas" panose="020B0609020204030204" pitchFamily="49" charset="0"/>
+              </a:rPr>
+              <a:t>type</a:t>
+            </a:r>
+            <a:r>
+              <a:rPr lang="en-US" sz="1200" b="0" dirty="0">
+                <a:solidFill>
+                  <a:srgbClr val="D4D4D4"/>
+                </a:solidFill>
+                <a:effectLst/>
+                <a:highlight>
+                  <a:srgbClr val="1E1E1E"/>
+                </a:highlight>
+                <a:latin typeface="Consolas" panose="020B0609020204030204" pitchFamily="49" charset="0"/>
+              </a:rPr>
+              <a:t>=</a:t>
+            </a:r>
+            <a:r>
+              <a:rPr lang="en-US" sz="1200" b="0" dirty="0">
+                <a:solidFill>
+                  <a:srgbClr val="CE9178"/>
+                </a:solidFill>
+                <a:effectLst/>
+                <a:highlight>
+                  <a:srgbClr val="1E1E1E"/>
+                </a:highlight>
+                <a:latin typeface="Consolas" panose="020B0609020204030204" pitchFamily="49" charset="0"/>
+              </a:rPr>
+              <a:t>"text/</a:t>
+            </a:r>
+            <a:r>
+              <a:rPr lang="en-US" sz="1200" b="0" dirty="0" err="1">
+                <a:solidFill>
+                  <a:srgbClr val="CE9178"/>
+                </a:solidFill>
+                <a:effectLst/>
+                <a:highlight>
+                  <a:srgbClr val="1E1E1E"/>
+                </a:highlight>
+                <a:latin typeface="Consolas" panose="020B0609020204030204" pitchFamily="49" charset="0"/>
+              </a:rPr>
+              <a:t>javascript</a:t>
+            </a:r>
+            <a:r>
+              <a:rPr lang="en-US" sz="1200" b="0" dirty="0">
+                <a:solidFill>
+                  <a:srgbClr val="CE9178"/>
+                </a:solidFill>
+                <a:effectLst/>
+                <a:highlight>
+                  <a:srgbClr val="1E1E1E"/>
+                </a:highlight>
+                <a:latin typeface="Consolas" panose="020B0609020204030204" pitchFamily="49" charset="0"/>
+              </a:rPr>
+              <a:t>"</a:t>
+            </a:r>
+            <a:r>
+              <a:rPr lang="en-US" sz="1200" b="0" dirty="0">
+                <a:solidFill>
+                  <a:srgbClr val="D4D4D4"/>
+                </a:solidFill>
+                <a:effectLst/>
+                <a:highlight>
+                  <a:srgbClr val="1E1E1E"/>
+                </a:highlight>
+                <a:latin typeface="Consolas" panose="020B0609020204030204" pitchFamily="49" charset="0"/>
+              </a:rPr>
+              <a:t> </a:t>
+            </a:r>
+            <a:r>
+              <a:rPr lang="en-US" sz="1200" b="0" dirty="0" err="1">
+                <a:solidFill>
+                  <a:srgbClr val="9CDCFE"/>
+                </a:solidFill>
+                <a:effectLst/>
+                <a:highlight>
+                  <a:srgbClr val="1E1E1E"/>
+                </a:highlight>
+                <a:latin typeface="Consolas" panose="020B0609020204030204" pitchFamily="49" charset="0"/>
+              </a:rPr>
+              <a:t>src</a:t>
+            </a:r>
+            <a:r>
+              <a:rPr lang="en-US" sz="1200" b="0" dirty="0">
+                <a:solidFill>
+                  <a:srgbClr val="D4D4D4"/>
+                </a:solidFill>
+                <a:effectLst/>
+                <a:highlight>
+                  <a:srgbClr val="1E1E1E"/>
+                </a:highlight>
+                <a:latin typeface="Consolas" panose="020B0609020204030204" pitchFamily="49" charset="0"/>
+              </a:rPr>
+              <a:t>=</a:t>
+            </a:r>
+            <a:r>
+              <a:rPr lang="en-US" sz="1200" b="0" dirty="0">
+                <a:solidFill>
+                  <a:srgbClr val="CE9178"/>
+                </a:solidFill>
+                <a:effectLst/>
+                <a:highlight>
+                  <a:srgbClr val="1E1E1E"/>
+                </a:highlight>
+                <a:latin typeface="Consolas" panose="020B0609020204030204" pitchFamily="49" charset="0"/>
+              </a:rPr>
+              <a:t>"static/</a:t>
+            </a:r>
+            <a:r>
+              <a:rPr lang="en-US" sz="1200" b="0" dirty="0" err="1">
+                <a:solidFill>
+                  <a:srgbClr val="CE9178"/>
+                </a:solidFill>
+                <a:effectLst/>
+                <a:highlight>
+                  <a:srgbClr val="1E1E1E"/>
+                </a:highlight>
+                <a:latin typeface="Consolas" panose="020B0609020204030204" pitchFamily="49" charset="0"/>
+              </a:rPr>
+              <a:t>js</a:t>
+            </a:r>
+            <a:r>
+              <a:rPr lang="en-US" sz="1200" b="0" dirty="0">
+                <a:solidFill>
+                  <a:srgbClr val="CE9178"/>
+                </a:solidFill>
+                <a:effectLst/>
+                <a:highlight>
+                  <a:srgbClr val="1E1E1E"/>
+                </a:highlight>
+                <a:latin typeface="Consolas" panose="020B0609020204030204" pitchFamily="49" charset="0"/>
+              </a:rPr>
+              <a:t>/choropleth.js"</a:t>
+            </a:r>
+            <a:r>
+              <a:rPr lang="en-US" sz="1200" b="0" dirty="0">
+                <a:solidFill>
+                  <a:srgbClr val="808080"/>
+                </a:solidFill>
+                <a:effectLst/>
+                <a:highlight>
+                  <a:srgbClr val="1E1E1E"/>
+                </a:highlight>
+                <a:latin typeface="Consolas" panose="020B0609020204030204" pitchFamily="49" charset="0"/>
+              </a:rPr>
+              <a:t>&gt;&lt;/</a:t>
+            </a:r>
+            <a:r>
+              <a:rPr lang="en-US" sz="1200" b="0" dirty="0">
+                <a:solidFill>
+                  <a:srgbClr val="569CD6"/>
+                </a:solidFill>
+                <a:effectLst/>
+                <a:highlight>
+                  <a:srgbClr val="1E1E1E"/>
+                </a:highlight>
+                <a:latin typeface="Consolas" panose="020B0609020204030204" pitchFamily="49" charset="0"/>
+              </a:rPr>
+              <a:t>script</a:t>
+            </a:r>
+            <a:r>
+              <a:rPr lang="en-US" sz="1200" b="0" dirty="0">
+                <a:solidFill>
+                  <a:srgbClr val="808080"/>
+                </a:solidFill>
+                <a:effectLst/>
+                <a:highlight>
+                  <a:srgbClr val="1E1E1E"/>
+                </a:highlight>
+                <a:latin typeface="Consolas" panose="020B0609020204030204" pitchFamily="49" charset="0"/>
+              </a:rPr>
+              <a:t>&gt;</a:t>
+            </a:r>
+            <a:endParaRPr lang="en-US" sz="1200" b="0" dirty="0">
+              <a:solidFill>
+                <a:srgbClr val="D4D4D4"/>
+              </a:solidFill>
+              <a:effectLst/>
+              <a:highlight>
+                <a:srgbClr val="1E1E1E"/>
+              </a:highlight>
+              <a:latin typeface="Consolas" panose="020B0609020204030204" pitchFamily="49" charset="0"/>
+            </a:endParaRPr>
+          </a:p>
+          <a:p>
+            <a:endParaRPr lang="en-US" sz="1200" b="0" dirty="0">
+              <a:solidFill>
+                <a:srgbClr val="D4D4D4"/>
+              </a:solidFill>
+              <a:effectLst/>
+              <a:highlight>
+                <a:srgbClr val="1E1E1E"/>
+              </a:highlight>
+              <a:latin typeface="Consolas" panose="020B0609020204030204" pitchFamily="49" charset="0"/>
+            </a:endParaRPr>
+          </a:p>
+        </p:txBody>
+      </p:sp>
+      <p:cxnSp>
+        <p:nvCxnSpPr>
+          <p:cNvPr id="10" name="Straight Arrow Connector 9">
+            <a:extLst>
+              <a:ext uri="{FF2B5EF4-FFF2-40B4-BE49-F238E27FC236}">
+                <a16:creationId xmlns:a16="http://schemas.microsoft.com/office/drawing/2014/main" id="{A57A47EE-C1B9-57B0-0FDC-E3D611309A21}"/>
+              </a:ext>
+            </a:extLst>
+          </p:cNvPr>
+          <p:cNvCxnSpPr>
+            <a:cxnSpLocks/>
+          </p:cNvCxnSpPr>
+          <p:nvPr/>
+        </p:nvCxnSpPr>
+        <p:spPr>
+          <a:xfrm>
+            <a:off x="3956673" y="3405042"/>
+            <a:ext cx="775855" cy="0"/>
+          </a:xfrm>
+          <a:prstGeom prst="straightConnector1">
+            <a:avLst/>
+          </a:prstGeom>
+          <a:ln w="57150">
+            <a:tailEnd type="triangle"/>
+          </a:ln>
+        </p:spPr>
+        <p:style>
+          <a:lnRef idx="2">
+            <a:schemeClr val="accent1"/>
+          </a:lnRef>
+          <a:fillRef idx="0">
+            <a:schemeClr val="accent1"/>
+          </a:fillRef>
+          <a:effectRef idx="1">
+            <a:schemeClr val="accent1"/>
+          </a:effectRef>
+          <a:fontRef idx="minor">
+            <a:schemeClr val="tx1"/>
+          </a:fontRef>
+        </p:style>
+      </p:cxnSp>
+      <p:sp>
+        <p:nvSpPr>
+          <p:cNvPr id="11" name="TextBox 10">
+            <a:extLst>
+              <a:ext uri="{FF2B5EF4-FFF2-40B4-BE49-F238E27FC236}">
+                <a16:creationId xmlns:a16="http://schemas.microsoft.com/office/drawing/2014/main" id="{CDA92900-1463-A123-44AB-BF16470B7F42}"/>
+              </a:ext>
+            </a:extLst>
+          </p:cNvPr>
+          <p:cNvSpPr txBox="1"/>
+          <p:nvPr/>
+        </p:nvSpPr>
+        <p:spPr>
+          <a:xfrm>
+            <a:off x="595652" y="5332150"/>
+            <a:ext cx="3135099" cy="369332"/>
+          </a:xfrm>
+          <a:prstGeom prst="rect">
+            <a:avLst/>
+          </a:prstGeom>
+          <a:noFill/>
+          <a:ln w="12700" cap="rnd">
+            <a:solidFill>
+              <a:schemeClr val="accent1"/>
+            </a:solidFill>
+          </a:ln>
+        </p:spPr>
+        <p:txBody>
+          <a:bodyPr wrap="square" rtlCol="0">
+            <a:spAutoFit/>
+          </a:bodyPr>
+          <a:lstStyle/>
+          <a:p>
+            <a:r>
+              <a:rPr lang="en-US" dirty="0"/>
+              <a:t>Graph Visuals </a:t>
+            </a:r>
+          </a:p>
+        </p:txBody>
+      </p:sp>
+      <p:sp>
+        <p:nvSpPr>
+          <p:cNvPr id="12" name="TextBox 11">
+            <a:extLst>
+              <a:ext uri="{FF2B5EF4-FFF2-40B4-BE49-F238E27FC236}">
+                <a16:creationId xmlns:a16="http://schemas.microsoft.com/office/drawing/2014/main" id="{FFCD9377-DD71-AE37-56AE-A0207C08BAB9}"/>
+              </a:ext>
+            </a:extLst>
+          </p:cNvPr>
+          <p:cNvSpPr txBox="1"/>
+          <p:nvPr/>
+        </p:nvSpPr>
+        <p:spPr>
+          <a:xfrm>
+            <a:off x="4919472" y="5239817"/>
+            <a:ext cx="6510528" cy="461665"/>
+          </a:xfrm>
+          <a:prstGeom prst="rect">
+            <a:avLst/>
+          </a:prstGeom>
+          <a:noFill/>
+          <a:ln w="12700" cap="rnd">
+            <a:solidFill>
+              <a:schemeClr val="accent1"/>
+            </a:solidFill>
+          </a:ln>
+        </p:spPr>
+        <p:txBody>
+          <a:bodyPr wrap="square" rtlCol="0">
+            <a:spAutoFit/>
+          </a:bodyPr>
+          <a:lstStyle>
+            <a:defPPr>
+              <a:defRPr lang="en-US"/>
+            </a:defPPr>
+            <a:lvl1pPr>
+              <a:defRPr/>
+            </a:lvl1pPr>
+          </a:lstStyle>
+          <a:p>
+            <a:r>
+              <a:rPr lang="en-US" sz="1200" b="0" dirty="0">
+                <a:solidFill>
+                  <a:srgbClr val="808080"/>
+                </a:solidFill>
+                <a:effectLst/>
+                <a:highlight>
+                  <a:srgbClr val="1E1E1E"/>
+                </a:highlight>
+                <a:latin typeface="Consolas" panose="020B0609020204030204" pitchFamily="49" charset="0"/>
+              </a:rPr>
+              <a:t>&lt;</a:t>
+            </a:r>
+            <a:r>
+              <a:rPr lang="en-US" sz="1200" b="0" dirty="0">
+                <a:solidFill>
+                  <a:srgbClr val="569CD6"/>
+                </a:solidFill>
+                <a:effectLst/>
+                <a:highlight>
+                  <a:srgbClr val="1E1E1E"/>
+                </a:highlight>
+                <a:latin typeface="Consolas" panose="020B0609020204030204" pitchFamily="49" charset="0"/>
+              </a:rPr>
+              <a:t>script</a:t>
+            </a:r>
+            <a:r>
+              <a:rPr lang="en-US" sz="1200" b="0" dirty="0">
+                <a:solidFill>
+                  <a:srgbClr val="D4D4D4"/>
+                </a:solidFill>
+                <a:effectLst/>
+                <a:highlight>
+                  <a:srgbClr val="1E1E1E"/>
+                </a:highlight>
+                <a:latin typeface="Consolas" panose="020B0609020204030204" pitchFamily="49" charset="0"/>
+              </a:rPr>
+              <a:t> </a:t>
+            </a:r>
+            <a:r>
+              <a:rPr lang="en-US" sz="1200" b="0" dirty="0" err="1">
+                <a:solidFill>
+                  <a:srgbClr val="9CDCFE"/>
+                </a:solidFill>
+                <a:effectLst/>
+                <a:highlight>
+                  <a:srgbClr val="1E1E1E"/>
+                </a:highlight>
+                <a:latin typeface="Consolas" panose="020B0609020204030204" pitchFamily="49" charset="0"/>
+              </a:rPr>
+              <a:t>src</a:t>
+            </a:r>
+            <a:r>
+              <a:rPr lang="en-US" sz="1200" b="0" dirty="0">
+                <a:solidFill>
+                  <a:srgbClr val="D4D4D4"/>
+                </a:solidFill>
+                <a:effectLst/>
+                <a:highlight>
+                  <a:srgbClr val="1E1E1E"/>
+                </a:highlight>
+                <a:latin typeface="Consolas" panose="020B0609020204030204" pitchFamily="49" charset="0"/>
+              </a:rPr>
+              <a:t>=</a:t>
+            </a:r>
+            <a:r>
+              <a:rPr lang="en-US" sz="1200" b="0" dirty="0">
+                <a:solidFill>
+                  <a:srgbClr val="CE9178"/>
+                </a:solidFill>
+                <a:effectLst/>
+                <a:highlight>
+                  <a:srgbClr val="1E1E1E"/>
+                </a:highlight>
+                <a:latin typeface="Consolas" panose="020B0609020204030204" pitchFamily="49" charset="0"/>
+              </a:rPr>
+              <a:t>"https://cdn.plot.ly/plotly-latest.min.js"</a:t>
+            </a:r>
+            <a:r>
+              <a:rPr lang="en-US" sz="1200" b="0" dirty="0">
+                <a:solidFill>
+                  <a:srgbClr val="808080"/>
+                </a:solidFill>
+                <a:effectLst/>
+                <a:highlight>
+                  <a:srgbClr val="1E1E1E"/>
+                </a:highlight>
+                <a:latin typeface="Consolas" panose="020B0609020204030204" pitchFamily="49" charset="0"/>
+              </a:rPr>
+              <a:t>&gt;&lt;/</a:t>
+            </a:r>
+            <a:r>
+              <a:rPr lang="en-US" sz="1200" b="0" dirty="0">
+                <a:solidFill>
+                  <a:srgbClr val="569CD6"/>
+                </a:solidFill>
+                <a:effectLst/>
+                <a:highlight>
+                  <a:srgbClr val="1E1E1E"/>
+                </a:highlight>
+                <a:latin typeface="Consolas" panose="020B0609020204030204" pitchFamily="49" charset="0"/>
+              </a:rPr>
+              <a:t>script</a:t>
+            </a:r>
+            <a:r>
+              <a:rPr lang="en-US" sz="1200" b="0" dirty="0">
+                <a:solidFill>
+                  <a:srgbClr val="808080"/>
+                </a:solidFill>
+                <a:effectLst/>
+                <a:highlight>
+                  <a:srgbClr val="1E1E1E"/>
+                </a:highlight>
+                <a:latin typeface="Consolas" panose="020B0609020204030204" pitchFamily="49" charset="0"/>
+              </a:rPr>
+              <a:t>&gt;</a:t>
+            </a:r>
+            <a:endParaRPr lang="en-US" sz="1200" b="0" dirty="0">
+              <a:solidFill>
+                <a:srgbClr val="D4D4D4"/>
+              </a:solidFill>
+              <a:effectLst/>
+              <a:highlight>
+                <a:srgbClr val="1E1E1E"/>
+              </a:highlight>
+              <a:latin typeface="Consolas" panose="020B0609020204030204" pitchFamily="49" charset="0"/>
+            </a:endParaRPr>
+          </a:p>
+          <a:p>
+            <a:endParaRPr lang="en-US" sz="1200" b="0" dirty="0">
+              <a:solidFill>
+                <a:srgbClr val="D4D4D4"/>
+              </a:solidFill>
+              <a:effectLst/>
+              <a:highlight>
+                <a:srgbClr val="1E1E1E"/>
+              </a:highlight>
+              <a:latin typeface="Consolas" panose="020B0609020204030204" pitchFamily="49" charset="0"/>
+            </a:endParaRPr>
+          </a:p>
+        </p:txBody>
+      </p:sp>
+      <p:cxnSp>
+        <p:nvCxnSpPr>
+          <p:cNvPr id="13" name="Straight Arrow Connector 12">
+            <a:extLst>
+              <a:ext uri="{FF2B5EF4-FFF2-40B4-BE49-F238E27FC236}">
+                <a16:creationId xmlns:a16="http://schemas.microsoft.com/office/drawing/2014/main" id="{63FD47B6-D1C2-E6B2-EA47-9DE456D35C52}"/>
+              </a:ext>
+            </a:extLst>
+          </p:cNvPr>
+          <p:cNvCxnSpPr>
+            <a:cxnSpLocks/>
+          </p:cNvCxnSpPr>
+          <p:nvPr/>
+        </p:nvCxnSpPr>
+        <p:spPr>
+          <a:xfrm>
+            <a:off x="4081368" y="5450687"/>
+            <a:ext cx="775855" cy="0"/>
+          </a:xfrm>
+          <a:prstGeom prst="straightConnector1">
+            <a:avLst/>
+          </a:prstGeom>
+          <a:ln w="57150">
+            <a:tailEnd type="triangle"/>
+          </a:ln>
+        </p:spPr>
+        <p:style>
+          <a:lnRef idx="2">
+            <a:schemeClr val="accent1"/>
+          </a:lnRef>
+          <a:fillRef idx="0">
+            <a:schemeClr val="accent1"/>
+          </a:fillRef>
+          <a:effectRef idx="1">
+            <a:schemeClr val="accent1"/>
+          </a:effectRef>
+          <a:fontRef idx="minor">
+            <a:schemeClr val="tx1"/>
+          </a:fontRef>
+        </p:style>
+      </p:cxnSp>
+    </p:spTree>
+    <p:extLst>
+      <p:ext uri="{BB962C8B-B14F-4D97-AF65-F5344CB8AC3E}">
+        <p14:creationId xmlns:p14="http://schemas.microsoft.com/office/powerpoint/2010/main" val="675222058"/>
+      </p:ext>
+    </p:extLst>
+  </p:cSld>
+  <p:clrMapOvr>
+    <a:masterClrMapping/>
+  </p:clrMapOvr>
+</p:sld>
+</file>
+
+<file path=ppt/slides/slide8.xml><?xml version="1.0" encoding="utf-8"?>
+<p:sld xmlns:a="http://schemas.openxmlformats.org/drawingml/2006/main" xmlns:r="http://schemas.openxmlformats.org/officeDocument/2006/relationships" xmlns:p="http://schemas.openxmlformats.org/presentationml/2006/main">
+  <p:cSld>
+    <p:spTree>
+      <p:nvGrpSpPr>
+        <p:cNvPr id="1" name=""/>
+        <p:cNvGrpSpPr/>
+        <p:nvPr/>
+      </p:nvGrpSpPr>
+      <p:grpSpPr>
+        <a:xfrm>
+          <a:off x="0" y="0"/>
+          <a:ext cx="0" cy="0"/>
+          <a:chOff x="0" y="0"/>
+          <a:chExt cx="0" cy="0"/>
+        </a:xfrm>
+      </p:grpSpPr>
+      <p:sp>
+        <p:nvSpPr>
+          <p:cNvPr id="2" name="Title 1">
+            <a:extLst>
+              <a:ext uri="{FF2B5EF4-FFF2-40B4-BE49-F238E27FC236}">
+                <a16:creationId xmlns:a16="http://schemas.microsoft.com/office/drawing/2014/main" id="{792CF614-8A26-89E2-AE07-1602A5BBCEFA}"/>
+              </a:ext>
+            </a:extLst>
+          </p:cNvPr>
+          <p:cNvSpPr>
+            <a:spLocks noGrp="1"/>
+          </p:cNvSpPr>
+          <p:nvPr>
+            <p:ph type="title"/>
+          </p:nvPr>
+        </p:nvSpPr>
+        <p:spPr/>
+        <p:txBody>
+          <a:bodyPr/>
+          <a:lstStyle/>
+          <a:p>
+            <a:pPr algn="ctr"/>
+            <a:r>
+              <a:rPr lang="en-US" dirty="0"/>
+              <a:t>Conclusion</a:t>
+            </a:r>
+          </a:p>
+        </p:txBody>
+      </p:sp>
+      <p:sp>
+        <p:nvSpPr>
+          <p:cNvPr id="3" name="Content Placeholder 2">
+            <a:extLst>
+              <a:ext uri="{FF2B5EF4-FFF2-40B4-BE49-F238E27FC236}">
+                <a16:creationId xmlns:a16="http://schemas.microsoft.com/office/drawing/2014/main" id="{45C7E082-7169-14B0-95F1-3B5E75C605D4}"/>
+              </a:ext>
+            </a:extLst>
+          </p:cNvPr>
+          <p:cNvSpPr>
+            <a:spLocks noGrp="1"/>
+          </p:cNvSpPr>
+          <p:nvPr>
+            <p:ph idx="1"/>
+          </p:nvPr>
+        </p:nvSpPr>
+        <p:spPr/>
+        <p:txBody>
+          <a:bodyPr>
+            <a:normAutofit/>
+          </a:bodyPr>
+          <a:lstStyle/>
+          <a:p>
+            <a:pPr marL="0" indent="0">
+              <a:buNone/>
+            </a:pPr>
+            <a:r>
+              <a:rPr lang="en-US" sz="1800" dirty="0"/>
+              <a:t>Summarize the visuals</a:t>
+            </a:r>
+          </a:p>
+          <a:p>
+            <a:r>
+              <a:rPr lang="en-US" sz="1800" dirty="0"/>
+              <a:t>World Density– not many players internationally join the American MLB.</a:t>
+            </a:r>
+          </a:p>
+          <a:p>
+            <a:r>
+              <a:rPr lang="en-US" sz="1800" dirty="0"/>
+              <a:t>States Density – Base on the visual we can tell that California has produce the most MLB players. </a:t>
+            </a:r>
+          </a:p>
+          <a:p>
+            <a:r>
+              <a:rPr lang="en-US" sz="1800" dirty="0"/>
+              <a:t>MLB players birth years – Most players born from 1960’s into late 1980’s contributed to the MLB.</a:t>
+            </a:r>
+          </a:p>
+          <a:p>
+            <a:endParaRPr lang="en-US" sz="1800" dirty="0"/>
+          </a:p>
+          <a:p>
+            <a:endParaRPr lang="en-US" sz="1800"/>
+          </a:p>
+          <a:p>
+            <a:endParaRPr lang="en-US" sz="1800" dirty="0"/>
+          </a:p>
+        </p:txBody>
+      </p:sp>
+      <p:pic>
+        <p:nvPicPr>
+          <p:cNvPr id="5" name="Picture 4" descr="A baseball bat and glove on a dirt field&#10;&#10;Description automatically generated">
+            <a:extLst>
+              <a:ext uri="{FF2B5EF4-FFF2-40B4-BE49-F238E27FC236}">
+                <a16:creationId xmlns:a16="http://schemas.microsoft.com/office/drawing/2014/main" id="{170D67A4-2436-81AE-9002-6E7534C3383F}"/>
+              </a:ext>
+            </a:extLst>
+          </p:cNvPr>
+          <p:cNvPicPr>
+            <a:picLocks noChangeAspect="1"/>
+          </p:cNvPicPr>
+          <p:nvPr/>
+        </p:nvPicPr>
+        <p:blipFill>
+          <a:blip r:embed="rId2">
+            <a:extLst>
+              <a:ext uri="{28A0092B-C50C-407E-A947-70E740481C1C}">
+                <a14:useLocalDpi xmlns:a14="http://schemas.microsoft.com/office/drawing/2010/main" val="0"/>
+              </a:ext>
+            </a:extLst>
+          </a:blip>
+          <a:stretch>
+            <a:fillRect/>
+          </a:stretch>
+        </p:blipFill>
+        <p:spPr>
+          <a:xfrm>
+            <a:off x="3473996" y="3653103"/>
+            <a:ext cx="3702659" cy="2184279"/>
+          </a:xfrm>
+          <a:prstGeom prst="rect">
+            <a:avLst/>
+          </a:prstGeom>
+        </p:spPr>
+      </p:pic>
+      <p:sp>
+        <p:nvSpPr>
+          <p:cNvPr id="4" name="TextBox 3">
+            <a:extLst>
+              <a:ext uri="{FF2B5EF4-FFF2-40B4-BE49-F238E27FC236}">
+                <a16:creationId xmlns:a16="http://schemas.microsoft.com/office/drawing/2014/main" id="{823740D6-244B-0A0C-4B9D-9D5EB7FDB863}"/>
+              </a:ext>
+            </a:extLst>
+          </p:cNvPr>
+          <p:cNvSpPr txBox="1"/>
+          <p:nvPr/>
+        </p:nvSpPr>
+        <p:spPr>
+          <a:xfrm>
+            <a:off x="73891" y="6308209"/>
+            <a:ext cx="12044218" cy="369332"/>
+          </a:xfrm>
+          <a:prstGeom prst="rect">
+            <a:avLst/>
+          </a:prstGeom>
+          <a:noFill/>
+          <a:ln w="12700" cap="rnd">
+            <a:solidFill>
+              <a:schemeClr val="accent1"/>
+            </a:solidFill>
+          </a:ln>
+        </p:spPr>
+        <p:txBody>
+          <a:bodyPr wrap="square" rtlCol="0">
+            <a:spAutoFit/>
+          </a:bodyPr>
+          <a:lstStyle>
+            <a:defPPr>
+              <a:defRPr lang="en-US"/>
+            </a:defPPr>
+            <a:lvl1pPr>
+              <a:defRPr/>
+            </a:lvl1pPr>
+          </a:lstStyle>
+          <a:p>
+            <a:r>
+              <a:rPr lang="en-US" dirty="0"/>
+              <a:t>Web Project Repositor : </a:t>
+            </a:r>
+            <a:r>
+              <a:rPr lang="en-US" i="1" dirty="0">
+                <a:solidFill>
+                  <a:schemeClr val="tx2">
+                    <a:lumMod val="90000"/>
+                    <a:lumOff val="10000"/>
+                  </a:schemeClr>
+                </a:solidFill>
+              </a:rPr>
+              <a:t>https://github.com/leeju09/Project-3-Baseball-</a:t>
+            </a:r>
+          </a:p>
+        </p:txBody>
+      </p:sp>
+    </p:spTree>
+    <p:extLst>
+      <p:ext uri="{BB962C8B-B14F-4D97-AF65-F5344CB8AC3E}">
         <p14:creationId xmlns:p14="http://schemas.microsoft.com/office/powerpoint/2010/main" val="3650296232"/>
+      </p:ext>
+    </p:extLst>
+  </p:cSld>
+  <p:clrMapOvr>
+    <a:masterClrMapping/>
+  </p:clrMapOvr>
+</p:sld>
+</file>
+
+<file path=ppt/slides/slide9.xml><?xml version="1.0" encoding="utf-8"?>
+<p:sld xmlns:a="http://schemas.openxmlformats.org/drawingml/2006/main" xmlns:r="http://schemas.openxmlformats.org/officeDocument/2006/relationships" xmlns:p="http://schemas.openxmlformats.org/presentationml/2006/main">
+  <p:cSld>
+    <p:spTree>
+      <p:nvGrpSpPr>
+        <p:cNvPr id="1" name=""/>
+        <p:cNvGrpSpPr/>
+        <p:nvPr/>
+      </p:nvGrpSpPr>
+      <p:grpSpPr>
+        <a:xfrm>
+          <a:off x="0" y="0"/>
+          <a:ext cx="0" cy="0"/>
+          <a:chOff x="0" y="0"/>
+          <a:chExt cx="0" cy="0"/>
+        </a:xfrm>
+      </p:grpSpPr>
+      <p:sp>
+        <p:nvSpPr>
+          <p:cNvPr id="2" name="Title 1">
+            <a:extLst>
+              <a:ext uri="{FF2B5EF4-FFF2-40B4-BE49-F238E27FC236}">
+                <a16:creationId xmlns:a16="http://schemas.microsoft.com/office/drawing/2014/main" id="{3EDC26B8-2F0A-193E-D0C0-63B585F2D516}"/>
+              </a:ext>
+            </a:extLst>
+          </p:cNvPr>
+          <p:cNvSpPr>
+            <a:spLocks noGrp="1"/>
+          </p:cNvSpPr>
+          <p:nvPr>
+            <p:ph type="title"/>
+          </p:nvPr>
+        </p:nvSpPr>
+        <p:spPr>
+          <a:xfrm>
+            <a:off x="838200" y="365125"/>
+            <a:ext cx="10515600" cy="1205057"/>
+          </a:xfrm>
+        </p:spPr>
+        <p:txBody>
+          <a:bodyPr/>
+          <a:lstStyle/>
+          <a:p>
+            <a:pPr algn="ctr"/>
+            <a:r>
+              <a:rPr lang="en-US" dirty="0"/>
+              <a:t>Q &amp; A</a:t>
+            </a:r>
+          </a:p>
+        </p:txBody>
+      </p:sp>
+    </p:spTree>
+    <p:extLst>
+      <p:ext uri="{BB962C8B-B14F-4D97-AF65-F5344CB8AC3E}">
+        <p14:creationId xmlns:p14="http://schemas.microsoft.com/office/powerpoint/2010/main" val="3347308563"/>
       </p:ext>
     </p:extLst>
   </p:cSld>

</xml_diff>

<commit_message>
added notes for my talk
</commit_message>
<xml_diff>
--- a/Presentation/Proect3_Group3.pptx
+++ b/Presentation/Proect3_Group3.pptx
@@ -9,11 +9,7 @@
     <p:sldId id="256" r:id="rId3"/>
     <p:sldId id="259" r:id="rId4"/>
     <p:sldId id="258" r:id="rId5"/>
-    <p:sldId id="261" r:id="rId6"/>
-    <p:sldId id="262" r:id="rId7"/>
-    <p:sldId id="263" r:id="rId8"/>
-    <p:sldId id="260" r:id="rId9"/>
-    <p:sldId id="264" r:id="rId10"/>
+    <p:sldId id="260" r:id="rId6"/>
   </p:sldIdLst>
   <p:sldSz cx="12192000" cy="6858000"/>
   <p:notesSz cx="6858000" cy="9144000"/>
@@ -131,84 +127,6 @@
 
 <file path=ppt/changesInfos/changesInfo1.xml><?xml version="1.0" encoding="utf-8"?>
 <pc:chgInfo xmlns:a="http://schemas.openxmlformats.org/drawingml/2006/main" xmlns:r="http://schemas.openxmlformats.org/officeDocument/2006/relationships" xmlns:ac="http://schemas.microsoft.com/office/drawing/2013/main/command" xmlns:pc="http://schemas.microsoft.com/office/powerpoint/2013/main/command">
-  <pc:docChgLst>
-    <pc:chgData name="Jim Pieper" userId="70ec17d751b5d6ef" providerId="LiveId" clId="{C39F6B6F-DF65-45AA-B91E-27C5D666BD64}"/>
-    <pc:docChg chg="modSld">
-      <pc:chgData name="Jim Pieper" userId="70ec17d751b5d6ef" providerId="LiveId" clId="{C39F6B6F-DF65-45AA-B91E-27C5D666BD64}" dt="2024-07-23T02:10:33.465" v="33" actId="20577"/>
-      <pc:docMkLst>
-        <pc:docMk/>
-      </pc:docMkLst>
-      <pc:sldChg chg="addSp modSp mod">
-        <pc:chgData name="Jim Pieper" userId="70ec17d751b5d6ef" providerId="LiveId" clId="{C39F6B6F-DF65-45AA-B91E-27C5D666BD64}" dt="2024-07-23T02:10:33.465" v="33" actId="20577"/>
-        <pc:sldMkLst>
-          <pc:docMk/>
-          <pc:sldMk cId="1528074873" sldId="257"/>
-        </pc:sldMkLst>
-        <pc:spChg chg="mod">
-          <ac:chgData name="Jim Pieper" userId="70ec17d751b5d6ef" providerId="LiveId" clId="{C39F6B6F-DF65-45AA-B91E-27C5D666BD64}" dt="2024-07-23T02:10:33.465" v="33" actId="20577"/>
-          <ac:spMkLst>
-            <pc:docMk/>
-            <pc:sldMk cId="1528074873" sldId="257"/>
-            <ac:spMk id="3" creationId="{C604EF24-9696-F68D-65A3-5E01DE11245F}"/>
-          </ac:spMkLst>
-        </pc:spChg>
-        <pc:spChg chg="mod">
-          <ac:chgData name="Jim Pieper" userId="70ec17d751b5d6ef" providerId="LiveId" clId="{C39F6B6F-DF65-45AA-B91E-27C5D666BD64}" dt="2024-07-23T02:06:25.431" v="5" actId="1076"/>
-          <ac:spMkLst>
-            <pc:docMk/>
-            <pc:sldMk cId="1528074873" sldId="257"/>
-            <ac:spMk id="5" creationId="{FD28AF83-D9E7-1048-AE8B-28A0B0876A75}"/>
-          </ac:spMkLst>
-        </pc:spChg>
-        <pc:picChg chg="add mod">
-          <ac:chgData name="Jim Pieper" userId="70ec17d751b5d6ef" providerId="LiveId" clId="{C39F6B6F-DF65-45AA-B91E-27C5D666BD64}" dt="2024-07-23T02:06:31.552" v="7" actId="1076"/>
-          <ac:picMkLst>
-            <pc:docMk/>
-            <pc:sldMk cId="1528074873" sldId="257"/>
-            <ac:picMk id="6" creationId="{9C52897D-B685-6DCC-5113-6DB2721238BF}"/>
-          </ac:picMkLst>
-        </pc:picChg>
-      </pc:sldChg>
-      <pc:sldChg chg="addSp modSp mod">
-        <pc:chgData name="Jim Pieper" userId="70ec17d751b5d6ef" providerId="LiveId" clId="{C39F6B6F-DF65-45AA-B91E-27C5D666BD64}" dt="2024-07-23T02:07:37.816" v="22" actId="1076"/>
-        <pc:sldMkLst>
-          <pc:docMk/>
-          <pc:sldMk cId="2678295895" sldId="259"/>
-        </pc:sldMkLst>
-        <pc:picChg chg="add mod">
-          <ac:chgData name="Jim Pieper" userId="70ec17d751b5d6ef" providerId="LiveId" clId="{C39F6B6F-DF65-45AA-B91E-27C5D666BD64}" dt="2024-07-23T02:07:07.543" v="13" actId="1076"/>
-          <ac:picMkLst>
-            <pc:docMk/>
-            <pc:sldMk cId="2678295895" sldId="259"/>
-            <ac:picMk id="9" creationId="{A7A76F33-0B10-F6D9-CA7D-76126C88BF40}"/>
-          </ac:picMkLst>
-        </pc:picChg>
-        <pc:picChg chg="add mod">
-          <ac:chgData name="Jim Pieper" userId="70ec17d751b5d6ef" providerId="LiveId" clId="{C39F6B6F-DF65-45AA-B91E-27C5D666BD64}" dt="2024-07-23T02:07:37.816" v="22" actId="1076"/>
-          <ac:picMkLst>
-            <pc:docMk/>
-            <pc:sldMk cId="2678295895" sldId="259"/>
-            <ac:picMk id="11" creationId="{CDC7E4A5-3252-7697-A384-35B0D1C04FAC}"/>
-          </ac:picMkLst>
-        </pc:picChg>
-      </pc:sldChg>
-      <pc:sldChg chg="addSp modSp mod">
-        <pc:chgData name="Jim Pieper" userId="70ec17d751b5d6ef" providerId="LiveId" clId="{C39F6B6F-DF65-45AA-B91E-27C5D666BD64}" dt="2024-07-23T02:09:53.863" v="28" actId="1076"/>
-        <pc:sldMkLst>
-          <pc:docMk/>
-          <pc:sldMk cId="3650296232" sldId="260"/>
-        </pc:sldMkLst>
-        <pc:picChg chg="add mod">
-          <ac:chgData name="Jim Pieper" userId="70ec17d751b5d6ef" providerId="LiveId" clId="{C39F6B6F-DF65-45AA-B91E-27C5D666BD64}" dt="2024-07-23T02:09:53.863" v="28" actId="1076"/>
-          <ac:picMkLst>
-            <pc:docMk/>
-            <pc:sldMk cId="3650296232" sldId="260"/>
-            <ac:picMk id="5" creationId="{170D67A4-2436-81AE-9002-6E7534C3383F}"/>
-          </ac:picMkLst>
-        </pc:picChg>
-      </pc:sldChg>
-    </pc:docChg>
-  </pc:docChgLst>
   <pc:docChgLst>
     <pc:chgData name="Julia Lee" userId="717c3f08ebd32c59" providerId="LiveId" clId="{C9DAFF7B-E82D-426E-BEF2-3502DB69F227}"/>
     <pc:docChg chg="undo custSel addSld modSld">
@@ -358,6 +276,84 @@
       </pc:sldChg>
     </pc:docChg>
   </pc:docChgLst>
+  <pc:docChgLst>
+    <pc:chgData name="Jim Pieper" userId="70ec17d751b5d6ef" providerId="LiveId" clId="{C39F6B6F-DF65-45AA-B91E-27C5D666BD64}"/>
+    <pc:docChg chg="modSld">
+      <pc:chgData name="Jim Pieper" userId="70ec17d751b5d6ef" providerId="LiveId" clId="{C39F6B6F-DF65-45AA-B91E-27C5D666BD64}" dt="2024-07-23T02:10:33.465" v="33" actId="20577"/>
+      <pc:docMkLst>
+        <pc:docMk/>
+      </pc:docMkLst>
+      <pc:sldChg chg="addSp modSp mod">
+        <pc:chgData name="Jim Pieper" userId="70ec17d751b5d6ef" providerId="LiveId" clId="{C39F6B6F-DF65-45AA-B91E-27C5D666BD64}" dt="2024-07-23T02:10:33.465" v="33" actId="20577"/>
+        <pc:sldMkLst>
+          <pc:docMk/>
+          <pc:sldMk cId="1528074873" sldId="257"/>
+        </pc:sldMkLst>
+        <pc:spChg chg="mod">
+          <ac:chgData name="Jim Pieper" userId="70ec17d751b5d6ef" providerId="LiveId" clId="{C39F6B6F-DF65-45AA-B91E-27C5D666BD64}" dt="2024-07-23T02:10:33.465" v="33" actId="20577"/>
+          <ac:spMkLst>
+            <pc:docMk/>
+            <pc:sldMk cId="1528074873" sldId="257"/>
+            <ac:spMk id="3" creationId="{C604EF24-9696-F68D-65A3-5E01DE11245F}"/>
+          </ac:spMkLst>
+        </pc:spChg>
+        <pc:spChg chg="mod">
+          <ac:chgData name="Jim Pieper" userId="70ec17d751b5d6ef" providerId="LiveId" clId="{C39F6B6F-DF65-45AA-B91E-27C5D666BD64}" dt="2024-07-23T02:06:25.431" v="5" actId="1076"/>
+          <ac:spMkLst>
+            <pc:docMk/>
+            <pc:sldMk cId="1528074873" sldId="257"/>
+            <ac:spMk id="5" creationId="{FD28AF83-D9E7-1048-AE8B-28A0B0876A75}"/>
+          </ac:spMkLst>
+        </pc:spChg>
+        <pc:picChg chg="add mod">
+          <ac:chgData name="Jim Pieper" userId="70ec17d751b5d6ef" providerId="LiveId" clId="{C39F6B6F-DF65-45AA-B91E-27C5D666BD64}" dt="2024-07-23T02:06:31.552" v="7" actId="1076"/>
+          <ac:picMkLst>
+            <pc:docMk/>
+            <pc:sldMk cId="1528074873" sldId="257"/>
+            <ac:picMk id="6" creationId="{9C52897D-B685-6DCC-5113-6DB2721238BF}"/>
+          </ac:picMkLst>
+        </pc:picChg>
+      </pc:sldChg>
+      <pc:sldChg chg="addSp modSp mod">
+        <pc:chgData name="Jim Pieper" userId="70ec17d751b5d6ef" providerId="LiveId" clId="{C39F6B6F-DF65-45AA-B91E-27C5D666BD64}" dt="2024-07-23T02:07:37.816" v="22" actId="1076"/>
+        <pc:sldMkLst>
+          <pc:docMk/>
+          <pc:sldMk cId="2678295895" sldId="259"/>
+        </pc:sldMkLst>
+        <pc:picChg chg="add mod">
+          <ac:chgData name="Jim Pieper" userId="70ec17d751b5d6ef" providerId="LiveId" clId="{C39F6B6F-DF65-45AA-B91E-27C5D666BD64}" dt="2024-07-23T02:07:07.543" v="13" actId="1076"/>
+          <ac:picMkLst>
+            <pc:docMk/>
+            <pc:sldMk cId="2678295895" sldId="259"/>
+            <ac:picMk id="9" creationId="{A7A76F33-0B10-F6D9-CA7D-76126C88BF40}"/>
+          </ac:picMkLst>
+        </pc:picChg>
+        <pc:picChg chg="add mod">
+          <ac:chgData name="Jim Pieper" userId="70ec17d751b5d6ef" providerId="LiveId" clId="{C39F6B6F-DF65-45AA-B91E-27C5D666BD64}" dt="2024-07-23T02:07:37.816" v="22" actId="1076"/>
+          <ac:picMkLst>
+            <pc:docMk/>
+            <pc:sldMk cId="2678295895" sldId="259"/>
+            <ac:picMk id="11" creationId="{CDC7E4A5-3252-7697-A384-35B0D1C04FAC}"/>
+          </ac:picMkLst>
+        </pc:picChg>
+      </pc:sldChg>
+      <pc:sldChg chg="addSp modSp mod">
+        <pc:chgData name="Jim Pieper" userId="70ec17d751b5d6ef" providerId="LiveId" clId="{C39F6B6F-DF65-45AA-B91E-27C5D666BD64}" dt="2024-07-23T02:09:53.863" v="28" actId="1076"/>
+        <pc:sldMkLst>
+          <pc:docMk/>
+          <pc:sldMk cId="3650296232" sldId="260"/>
+        </pc:sldMkLst>
+        <pc:picChg chg="add mod">
+          <ac:chgData name="Jim Pieper" userId="70ec17d751b5d6ef" providerId="LiveId" clId="{C39F6B6F-DF65-45AA-B91E-27C5D666BD64}" dt="2024-07-23T02:09:53.863" v="28" actId="1076"/>
+          <ac:picMkLst>
+            <pc:docMk/>
+            <pc:sldMk cId="3650296232" sldId="260"/>
+            <ac:picMk id="5" creationId="{170D67A4-2436-81AE-9002-6E7534C3383F}"/>
+          </ac:picMkLst>
+        </pc:picChg>
+      </pc:sldChg>
+    </pc:docChg>
+  </pc:docChgLst>
 </pc:chgInfo>
 </file>
 
@@ -508,7 +504,7 @@
           <a:p>
             <a:fld id="{A19DD7AC-7C8D-480B-B857-397721A82A82}" type="datetimeFigureOut">
               <a:rPr lang="en-US" smtClean="0"/>
-              <a:t>7/23/2024</a:t>
+              <a:t>7/22/2024</a:t>
             </a:fld>
             <a:endParaRPr lang="en-US"/>
           </a:p>
@@ -706,7 +702,7 @@
           <a:p>
             <a:fld id="{A19DD7AC-7C8D-480B-B857-397721A82A82}" type="datetimeFigureOut">
               <a:rPr lang="en-US" smtClean="0"/>
-              <a:t>7/23/2024</a:t>
+              <a:t>7/22/2024</a:t>
             </a:fld>
             <a:endParaRPr lang="en-US"/>
           </a:p>
@@ -914,7 +910,7 @@
           <a:p>
             <a:fld id="{A19DD7AC-7C8D-480B-B857-397721A82A82}" type="datetimeFigureOut">
               <a:rPr lang="en-US" smtClean="0"/>
-              <a:t>7/23/2024</a:t>
+              <a:t>7/22/2024</a:t>
             </a:fld>
             <a:endParaRPr lang="en-US"/>
           </a:p>
@@ -1112,7 +1108,7 @@
           <a:p>
             <a:fld id="{A19DD7AC-7C8D-480B-B857-397721A82A82}" type="datetimeFigureOut">
               <a:rPr lang="en-US" smtClean="0"/>
-              <a:t>7/23/2024</a:t>
+              <a:t>7/22/2024</a:t>
             </a:fld>
             <a:endParaRPr lang="en-US"/>
           </a:p>
@@ -1387,7 +1383,7 @@
           <a:p>
             <a:fld id="{A19DD7AC-7C8D-480B-B857-397721A82A82}" type="datetimeFigureOut">
               <a:rPr lang="en-US" smtClean="0"/>
-              <a:t>7/23/2024</a:t>
+              <a:t>7/22/2024</a:t>
             </a:fld>
             <a:endParaRPr lang="en-US"/>
           </a:p>
@@ -1652,7 +1648,7 @@
           <a:p>
             <a:fld id="{A19DD7AC-7C8D-480B-B857-397721A82A82}" type="datetimeFigureOut">
               <a:rPr lang="en-US" smtClean="0"/>
-              <a:t>7/23/2024</a:t>
+              <a:t>7/22/2024</a:t>
             </a:fld>
             <a:endParaRPr lang="en-US"/>
           </a:p>
@@ -2064,7 +2060,7 @@
           <a:p>
             <a:fld id="{A19DD7AC-7C8D-480B-B857-397721A82A82}" type="datetimeFigureOut">
               <a:rPr lang="en-US" smtClean="0"/>
-              <a:t>7/23/2024</a:t>
+              <a:t>7/22/2024</a:t>
             </a:fld>
             <a:endParaRPr lang="en-US"/>
           </a:p>
@@ -2205,7 +2201,7 @@
           <a:p>
             <a:fld id="{A19DD7AC-7C8D-480B-B857-397721A82A82}" type="datetimeFigureOut">
               <a:rPr lang="en-US" smtClean="0"/>
-              <a:t>7/23/2024</a:t>
+              <a:t>7/22/2024</a:t>
             </a:fld>
             <a:endParaRPr lang="en-US"/>
           </a:p>
@@ -2318,7 +2314,7 @@
           <a:p>
             <a:fld id="{A19DD7AC-7C8D-480B-B857-397721A82A82}" type="datetimeFigureOut">
               <a:rPr lang="en-US" smtClean="0"/>
-              <a:t>7/23/2024</a:t>
+              <a:t>7/22/2024</a:t>
             </a:fld>
             <a:endParaRPr lang="en-US"/>
           </a:p>
@@ -2629,7 +2625,7 @@
           <a:p>
             <a:fld id="{A19DD7AC-7C8D-480B-B857-397721A82A82}" type="datetimeFigureOut">
               <a:rPr lang="en-US" smtClean="0"/>
-              <a:t>7/23/2024</a:t>
+              <a:t>7/22/2024</a:t>
             </a:fld>
             <a:endParaRPr lang="en-US"/>
           </a:p>
@@ -2917,7 +2913,7 @@
           <a:p>
             <a:fld id="{A19DD7AC-7C8D-480B-B857-397721A82A82}" type="datetimeFigureOut">
               <a:rPr lang="en-US" smtClean="0"/>
-              <a:t>7/23/2024</a:t>
+              <a:t>7/22/2024</a:t>
             </a:fld>
             <a:endParaRPr lang="en-US"/>
           </a:p>
@@ -3158,7 +3154,7 @@
           <a:p>
             <a:fld id="{A19DD7AC-7C8D-480B-B857-397721A82A82}" type="datetimeFigureOut">
               <a:rPr lang="en-US" smtClean="0"/>
-              <a:t>7/23/2024</a:t>
+              <a:t>7/22/2024</a:t>
             </a:fld>
             <a:endParaRPr lang="en-US"/>
           </a:p>
@@ -4496,8 +4492,8 @@
         </p:nvSpPr>
         <p:spPr>
           <a:xfrm>
-            <a:off x="296441" y="424873"/>
-            <a:ext cx="11599118" cy="369332"/>
+            <a:off x="461818" y="424873"/>
+            <a:ext cx="5163128" cy="369332"/>
           </a:xfrm>
           <a:prstGeom prst="rect">
             <a:avLst/>
@@ -4510,302 +4506,13 @@
           </a:bodyPr>
           <a:lstStyle/>
           <a:p>
-            <a:pPr algn="ctr"/>
             <a:r>
               <a:rPr lang="en-US" dirty="0"/>
-              <a:t>Tools</a:t>
-            </a:r>
-          </a:p>
-        </p:txBody>
-      </p:sp>
-      <p:sp>
-        <p:nvSpPr>
-          <p:cNvPr id="3" name="TextBox 2">
-            <a:extLst>
-              <a:ext uri="{FF2B5EF4-FFF2-40B4-BE49-F238E27FC236}">
-                <a16:creationId xmlns:a16="http://schemas.microsoft.com/office/drawing/2014/main" id="{120DF477-C2E9-B295-5ECC-41B8021A039E}"/>
-              </a:ext>
-            </a:extLst>
-          </p:cNvPr>
-          <p:cNvSpPr txBox="1"/>
-          <p:nvPr/>
-        </p:nvSpPr>
-        <p:spPr>
-          <a:xfrm>
-            <a:off x="502920" y="1133856"/>
-            <a:ext cx="4123944" cy="369332"/>
-          </a:xfrm>
-          <a:prstGeom prst="rect">
-            <a:avLst/>
-          </a:prstGeom>
-          <a:noFill/>
-          <a:ln w="12700" cap="rnd">
-            <a:solidFill>
-              <a:schemeClr val="accent1"/>
-            </a:solidFill>
-          </a:ln>
-        </p:spPr>
-        <p:txBody>
-          <a:bodyPr wrap="square" rtlCol="0">
-            <a:spAutoFit/>
-          </a:bodyPr>
-          <a:lstStyle/>
-          <a:p>
-            <a:r>
-              <a:rPr lang="en-US" dirty="0"/>
-              <a:t>Project Path </a:t>
-            </a:r>
-          </a:p>
-        </p:txBody>
-      </p:sp>
-      <p:sp>
-        <p:nvSpPr>
-          <p:cNvPr id="4" name="TextBox 3">
-            <a:extLst>
-              <a:ext uri="{FF2B5EF4-FFF2-40B4-BE49-F238E27FC236}">
-                <a16:creationId xmlns:a16="http://schemas.microsoft.com/office/drawing/2014/main" id="{8C35EFD2-02F8-58E8-06A9-1519469FDB3C}"/>
-              </a:ext>
-            </a:extLst>
-          </p:cNvPr>
-          <p:cNvSpPr txBox="1"/>
-          <p:nvPr/>
-        </p:nvSpPr>
-        <p:spPr>
-          <a:xfrm>
-            <a:off x="6215611" y="1136257"/>
-            <a:ext cx="4517044" cy="369332"/>
-          </a:xfrm>
-          <a:prstGeom prst="rect">
-            <a:avLst/>
-          </a:prstGeom>
-          <a:noFill/>
-          <a:ln w="12700" cap="rnd">
-            <a:solidFill>
-              <a:schemeClr val="accent1"/>
-            </a:solidFill>
-          </a:ln>
-        </p:spPr>
-        <p:txBody>
-          <a:bodyPr wrap="square" rtlCol="0">
-            <a:spAutoFit/>
-          </a:bodyPr>
-          <a:lstStyle>
-            <a:defPPr>
-              <a:defRPr lang="en-US"/>
-            </a:defPPr>
-            <a:lvl1pPr>
-              <a:defRPr/>
-            </a:lvl1pPr>
-          </a:lstStyle>
-          <a:p>
-            <a:r>
-              <a:rPr lang="en-US" dirty="0"/>
-              <a:t>Data Visualization Track</a:t>
-            </a:r>
-          </a:p>
-        </p:txBody>
-      </p:sp>
-      <p:cxnSp>
-        <p:nvCxnSpPr>
-          <p:cNvPr id="6" name="Straight Arrow Connector 5">
-            <a:extLst>
-              <a:ext uri="{FF2B5EF4-FFF2-40B4-BE49-F238E27FC236}">
-                <a16:creationId xmlns:a16="http://schemas.microsoft.com/office/drawing/2014/main" id="{D93F80F7-C782-2423-07BA-B394C2B6452A}"/>
-              </a:ext>
-            </a:extLst>
-          </p:cNvPr>
-          <p:cNvCxnSpPr>
-            <a:cxnSpLocks/>
-          </p:cNvCxnSpPr>
-          <p:nvPr/>
-        </p:nvCxnSpPr>
-        <p:spPr>
-          <a:xfrm>
-            <a:off x="5181600" y="1318522"/>
-            <a:ext cx="775855" cy="0"/>
-          </a:xfrm>
-          <a:prstGeom prst="straightConnector1">
-            <a:avLst/>
-          </a:prstGeom>
-          <a:ln w="57150">
-            <a:tailEnd type="triangle"/>
-          </a:ln>
-        </p:spPr>
-        <p:style>
-          <a:lnRef idx="2">
-            <a:schemeClr val="accent1"/>
-          </a:lnRef>
-          <a:fillRef idx="0">
-            <a:schemeClr val="accent1"/>
-          </a:fillRef>
-          <a:effectRef idx="1">
-            <a:schemeClr val="accent1"/>
-          </a:effectRef>
-          <a:fontRef idx="minor">
-            <a:schemeClr val="tx1"/>
-          </a:fontRef>
-        </p:style>
-      </p:cxnSp>
-      <p:sp>
-        <p:nvSpPr>
-          <p:cNvPr id="8" name="TextBox 7">
-            <a:extLst>
-              <a:ext uri="{FF2B5EF4-FFF2-40B4-BE49-F238E27FC236}">
-                <a16:creationId xmlns:a16="http://schemas.microsoft.com/office/drawing/2014/main" id="{5D896ABA-F770-F96B-AE8E-E3618E6AD5E8}"/>
-              </a:ext>
-            </a:extLst>
-          </p:cNvPr>
-          <p:cNvSpPr txBox="1"/>
-          <p:nvPr/>
-        </p:nvSpPr>
-        <p:spPr>
-          <a:xfrm>
-            <a:off x="502920" y="2692645"/>
-            <a:ext cx="4123944" cy="369332"/>
-          </a:xfrm>
-          <a:prstGeom prst="rect">
-            <a:avLst/>
-          </a:prstGeom>
-          <a:noFill/>
-          <a:ln w="12700" cap="rnd">
-            <a:solidFill>
-              <a:schemeClr val="accent1"/>
-            </a:solidFill>
-          </a:ln>
-        </p:spPr>
-        <p:txBody>
-          <a:bodyPr wrap="square" rtlCol="0">
-            <a:spAutoFit/>
-          </a:bodyPr>
-          <a:lstStyle/>
-          <a:p>
-            <a:r>
-              <a:rPr lang="en-US" dirty="0"/>
-              <a:t>Tools </a:t>
-            </a:r>
-          </a:p>
-        </p:txBody>
-      </p:sp>
-      <p:sp>
-        <p:nvSpPr>
-          <p:cNvPr id="9" name="TextBox 8">
-            <a:extLst>
-              <a:ext uri="{FF2B5EF4-FFF2-40B4-BE49-F238E27FC236}">
-                <a16:creationId xmlns:a16="http://schemas.microsoft.com/office/drawing/2014/main" id="{6657CB0B-F0F9-1BAB-EE34-499D641C8B4D}"/>
-              </a:ext>
-            </a:extLst>
-          </p:cNvPr>
-          <p:cNvSpPr txBox="1"/>
-          <p:nvPr/>
-        </p:nvSpPr>
-        <p:spPr>
-          <a:xfrm>
-            <a:off x="6215610" y="2593446"/>
-            <a:ext cx="4517045" cy="1477328"/>
-          </a:xfrm>
-          <a:prstGeom prst="rect">
-            <a:avLst/>
-          </a:prstGeom>
-          <a:noFill/>
-          <a:ln w="12700" cap="rnd">
-            <a:solidFill>
-              <a:schemeClr val="accent1"/>
-            </a:solidFill>
-          </a:ln>
-        </p:spPr>
-        <p:txBody>
-          <a:bodyPr wrap="square" rtlCol="0">
-            <a:spAutoFit/>
-          </a:bodyPr>
-          <a:lstStyle>
-            <a:defPPr>
-              <a:defRPr lang="en-US"/>
-            </a:defPPr>
-            <a:lvl1pPr>
-              <a:defRPr/>
-            </a:lvl1pPr>
-          </a:lstStyle>
-          <a:p>
-            <a:r>
-              <a:rPr lang="en-US" dirty="0"/>
-              <a:t>Code Development  : Microsoft VS Code</a:t>
-            </a:r>
-          </a:p>
-          <a:p>
-            <a:r>
-              <a:rPr lang="en-US" dirty="0"/>
-              <a:t>Data Cleaning             : </a:t>
-            </a:r>
-            <a:r>
-              <a:rPr lang="en-US" dirty="0" err="1"/>
-              <a:t>Jupyter</a:t>
-            </a:r>
-            <a:r>
-              <a:rPr lang="en-US" dirty="0"/>
-              <a:t> Notebook</a:t>
-            </a:r>
-          </a:p>
-          <a:p>
-            <a:r>
-              <a:rPr lang="en-US" dirty="0"/>
-              <a:t>Data Storage                : MongoDB, Excel , CSV  </a:t>
-            </a:r>
-          </a:p>
-          <a:p>
-            <a:r>
-              <a:rPr lang="en-US" dirty="0"/>
-              <a:t>Documentation           : Microsoft Word</a:t>
-            </a:r>
-          </a:p>
-          <a:p>
-            <a:r>
-              <a:rPr lang="en-US" dirty="0"/>
-              <a:t>Project Collaboration : Git and GitHub</a:t>
-            </a:r>
-          </a:p>
-        </p:txBody>
-      </p:sp>
-      <p:cxnSp>
-        <p:nvCxnSpPr>
-          <p:cNvPr id="10" name="Straight Arrow Connector 9">
-            <a:extLst>
-              <a:ext uri="{FF2B5EF4-FFF2-40B4-BE49-F238E27FC236}">
-                <a16:creationId xmlns:a16="http://schemas.microsoft.com/office/drawing/2014/main" id="{FC1C362B-89CC-EF49-C79B-629A378EBBB6}"/>
-              </a:ext>
-            </a:extLst>
-          </p:cNvPr>
-          <p:cNvCxnSpPr>
-            <a:cxnSpLocks/>
-          </p:cNvCxnSpPr>
-          <p:nvPr/>
-        </p:nvCxnSpPr>
-        <p:spPr>
-          <a:xfrm>
-            <a:off x="5172363" y="2893705"/>
-            <a:ext cx="775855" cy="0"/>
-          </a:xfrm>
-          <a:prstGeom prst="straightConnector1">
-            <a:avLst/>
-          </a:prstGeom>
-          <a:ln w="57150">
-            <a:tailEnd type="triangle"/>
-          </a:ln>
-        </p:spPr>
-        <p:style>
-          <a:lnRef idx="2">
-            <a:schemeClr val="accent1"/>
-          </a:lnRef>
-          <a:fillRef idx="0">
-            <a:schemeClr val="accent1"/>
-          </a:fillRef>
-          <a:effectRef idx="1">
-            <a:schemeClr val="accent1"/>
-          </a:effectRef>
-          <a:fontRef idx="minor">
-            <a:schemeClr val="tx1"/>
-          </a:fontRef>
-        </p:style>
-      </p:cxnSp>
+              <a:t>Challenges  we face and techniques we used</a:t>
+            </a:r>
+          </a:p>
+        </p:txBody>
+      </p:sp>
     </p:spTree>
     <p:extLst>
       <p:ext uri="{BB962C8B-B14F-4D97-AF65-F5344CB8AC3E}">
@@ -4838,193 +4545,98 @@
       </p:grpSpPr>
       <p:sp>
         <p:nvSpPr>
-          <p:cNvPr id="2" name="TextBox 1">
-            <a:extLst>
-              <a:ext uri="{FF2B5EF4-FFF2-40B4-BE49-F238E27FC236}">
-                <a16:creationId xmlns:a16="http://schemas.microsoft.com/office/drawing/2014/main" id="{A0C598AD-C50B-FD11-8A37-9EBC8E8CAE59}"/>
-              </a:ext>
-            </a:extLst>
-          </p:cNvPr>
-          <p:cNvSpPr txBox="1"/>
-          <p:nvPr/>
-        </p:nvSpPr>
-        <p:spPr>
-          <a:xfrm>
-            <a:off x="296441" y="424873"/>
-            <a:ext cx="11599118" cy="369332"/>
-          </a:xfrm>
-          <a:prstGeom prst="rect">
-            <a:avLst/>
-          </a:prstGeom>
-          <a:noFill/>
-        </p:spPr>
-        <p:txBody>
-          <a:bodyPr wrap="square" rtlCol="0">
-            <a:spAutoFit/>
+          <p:cNvPr id="2" name="Title 1">
+            <a:extLst>
+              <a:ext uri="{FF2B5EF4-FFF2-40B4-BE49-F238E27FC236}">
+                <a16:creationId xmlns:a16="http://schemas.microsoft.com/office/drawing/2014/main" id="{792CF614-8A26-89E2-AE07-1602A5BBCEFA}"/>
+              </a:ext>
+            </a:extLst>
+          </p:cNvPr>
+          <p:cNvSpPr>
+            <a:spLocks noGrp="1"/>
+          </p:cNvSpPr>
+          <p:nvPr>
+            <p:ph type="title"/>
+          </p:nvPr>
+        </p:nvSpPr>
+        <p:spPr/>
+        <p:txBody>
+          <a:bodyPr/>
+          <a:lstStyle/>
+          <a:p>
+            <a:r>
+              <a:rPr lang="en-US" dirty="0"/>
+              <a:t>Conclusion</a:t>
+            </a:r>
+          </a:p>
+        </p:txBody>
+      </p:sp>
+      <p:sp>
+        <p:nvSpPr>
+          <p:cNvPr id="3" name="Content Placeholder 2">
+            <a:extLst>
+              <a:ext uri="{FF2B5EF4-FFF2-40B4-BE49-F238E27FC236}">
+                <a16:creationId xmlns:a16="http://schemas.microsoft.com/office/drawing/2014/main" id="{45C7E082-7169-14B0-95F1-3B5E75C605D4}"/>
+              </a:ext>
+            </a:extLst>
+          </p:cNvPr>
+          <p:cNvSpPr>
+            <a:spLocks noGrp="1"/>
+          </p:cNvSpPr>
+          <p:nvPr>
+            <p:ph idx="1"/>
+          </p:nvPr>
+        </p:nvSpPr>
+        <p:spPr/>
+        <p:txBody>
+          <a:bodyPr>
+            <a:normAutofit/>
           </a:bodyPr>
           <a:lstStyle/>
           <a:p>
-            <a:pPr algn="ctr"/>
-            <a:r>
-              <a:rPr lang="en-US" dirty="0"/>
-              <a:t>Challenges </a:t>
-            </a:r>
-          </a:p>
-        </p:txBody>
-      </p:sp>
-      <p:sp>
-        <p:nvSpPr>
-          <p:cNvPr id="11" name="TextBox 10">
-            <a:extLst>
-              <a:ext uri="{FF2B5EF4-FFF2-40B4-BE49-F238E27FC236}">
-                <a16:creationId xmlns:a16="http://schemas.microsoft.com/office/drawing/2014/main" id="{ED95BD74-ED7D-123A-73FF-3E4902F6FAF2}"/>
-              </a:ext>
-            </a:extLst>
-          </p:cNvPr>
-          <p:cNvSpPr txBox="1"/>
-          <p:nvPr/>
-        </p:nvSpPr>
-        <p:spPr>
-          <a:xfrm>
-            <a:off x="632229" y="940861"/>
-            <a:ext cx="3135099" cy="369332"/>
-          </a:xfrm>
-          <a:prstGeom prst="rect">
-            <a:avLst/>
-          </a:prstGeom>
-          <a:noFill/>
-          <a:ln w="12700" cap="rnd">
-            <a:solidFill>
-              <a:schemeClr val="accent1"/>
-            </a:solidFill>
-          </a:ln>
-        </p:spPr>
-        <p:txBody>
-          <a:bodyPr wrap="square" rtlCol="0">
-            <a:spAutoFit/>
-          </a:bodyPr>
-          <a:lstStyle/>
-          <a:p>
-            <a:r>
-              <a:rPr lang="en-US" dirty="0"/>
-              <a:t>Finding a Data source </a:t>
-            </a:r>
-          </a:p>
-        </p:txBody>
-      </p:sp>
-      <p:sp>
-        <p:nvSpPr>
-          <p:cNvPr id="12" name="TextBox 11">
-            <a:extLst>
-              <a:ext uri="{FF2B5EF4-FFF2-40B4-BE49-F238E27FC236}">
-                <a16:creationId xmlns:a16="http://schemas.microsoft.com/office/drawing/2014/main" id="{9F35E88E-BAA8-BBA1-A048-3031F1397AA7}"/>
-              </a:ext>
-            </a:extLst>
-          </p:cNvPr>
-          <p:cNvSpPr txBox="1"/>
-          <p:nvPr/>
-        </p:nvSpPr>
-        <p:spPr>
-          <a:xfrm>
-            <a:off x="4974336" y="922987"/>
-            <a:ext cx="6510528" cy="1107996"/>
-          </a:xfrm>
-          <a:prstGeom prst="rect">
-            <a:avLst/>
-          </a:prstGeom>
-          <a:noFill/>
-          <a:ln w="12700" cap="rnd">
-            <a:solidFill>
-              <a:schemeClr val="accent1"/>
-            </a:solidFill>
-          </a:ln>
-        </p:spPr>
-        <p:txBody>
-          <a:bodyPr wrap="square" rtlCol="0">
-            <a:spAutoFit/>
-          </a:bodyPr>
-          <a:lstStyle>
-            <a:defPPr>
-              <a:defRPr lang="en-US"/>
-            </a:defPPr>
-            <a:lvl1pPr>
-              <a:defRPr/>
-            </a:lvl1pPr>
-          </a:lstStyle>
-          <a:p>
-            <a:r>
-              <a:rPr lang="en-US" dirty="0"/>
-              <a:t>Web scraping :  </a:t>
-            </a:r>
-            <a:r>
-              <a:rPr lang="en-US" sz="1200" dirty="0"/>
-              <a:t>https://www.baseball-almanac.com/players/birthplace.php </a:t>
-            </a:r>
-          </a:p>
-          <a:p>
-            <a:endParaRPr lang="en-US" sz="1200" dirty="0"/>
-          </a:p>
-          <a:p>
-            <a:endParaRPr lang="en-US" sz="1200" dirty="0"/>
-          </a:p>
-          <a:p>
-            <a:endParaRPr lang="en-US" sz="1200" dirty="0"/>
-          </a:p>
-          <a:p>
-            <a:r>
-              <a:rPr lang="en-US" sz="1200" dirty="0"/>
-              <a:t> </a:t>
-            </a:r>
-          </a:p>
-        </p:txBody>
-      </p:sp>
-      <p:cxnSp>
-        <p:nvCxnSpPr>
-          <p:cNvPr id="13" name="Straight Arrow Connector 12">
-            <a:extLst>
-              <a:ext uri="{FF2B5EF4-FFF2-40B4-BE49-F238E27FC236}">
-                <a16:creationId xmlns:a16="http://schemas.microsoft.com/office/drawing/2014/main" id="{42B99BCF-9641-63AA-676B-B9151DB5FBF6}"/>
-              </a:ext>
-            </a:extLst>
-          </p:cNvPr>
-          <p:cNvCxnSpPr>
-            <a:cxnSpLocks/>
-          </p:cNvCxnSpPr>
-          <p:nvPr/>
-        </p:nvCxnSpPr>
-        <p:spPr>
-          <a:xfrm>
-            <a:off x="4039800" y="1141921"/>
-            <a:ext cx="775855" cy="0"/>
-          </a:xfrm>
-          <a:prstGeom prst="straightConnector1">
-            <a:avLst/>
-          </a:prstGeom>
-          <a:ln w="57150">
-            <a:tailEnd type="triangle"/>
-          </a:ln>
-        </p:spPr>
-        <p:style>
-          <a:lnRef idx="2">
-            <a:schemeClr val="accent1"/>
-          </a:lnRef>
-          <a:fillRef idx="0">
-            <a:schemeClr val="accent1"/>
-          </a:fillRef>
-          <a:effectRef idx="1">
-            <a:schemeClr val="accent1"/>
-          </a:effectRef>
-          <a:fontRef idx="minor">
-            <a:schemeClr val="tx1"/>
-          </a:fontRef>
-        </p:style>
-      </p:cxnSp>
+            <a:pPr marL="0" indent="0">
+              <a:buNone/>
+            </a:pPr>
+            <a:r>
+              <a:rPr lang="en-US" sz="1800" dirty="0"/>
+              <a:t>Summarize the visuals</a:t>
+            </a:r>
+          </a:p>
+          <a:p>
+            <a:r>
+              <a:rPr lang="en-US" sz="1800" dirty="0"/>
+              <a:t>World Density– not many players internationally join the American MLB.</a:t>
+            </a:r>
+          </a:p>
+          <a:p>
+            <a:r>
+              <a:rPr lang="en-US" sz="1800" dirty="0"/>
+              <a:t>States Density – Base on the visual we can tell that California has produce the most MLB players. </a:t>
+            </a:r>
+          </a:p>
+          <a:p>
+            <a:r>
+              <a:rPr lang="en-US" sz="1800" dirty="0"/>
+              <a:t>MLB players birth years – Most players born from 1960’s into late 1980’s contributed to the MLB.</a:t>
+            </a:r>
+          </a:p>
+          <a:p>
+            <a:endParaRPr lang="en-US" sz="1800" dirty="0"/>
+          </a:p>
+          <a:p>
+            <a:endParaRPr lang="en-US" sz="1800"/>
+          </a:p>
+          <a:p>
+            <a:endParaRPr lang="en-US" sz="1800" dirty="0"/>
+          </a:p>
+        </p:txBody>
+      </p:sp>
       <p:pic>
         <p:nvPicPr>
-          <p:cNvPr id="5" name="Picture 4">
-            <a:extLst>
-              <a:ext uri="{FF2B5EF4-FFF2-40B4-BE49-F238E27FC236}">
-                <a16:creationId xmlns:a16="http://schemas.microsoft.com/office/drawing/2014/main" id="{08B1A52B-C857-2D60-D1EC-967FE5C64252}"/>
+          <p:cNvPr id="5" name="Picture 4" descr="A baseball bat and glove on a dirt field&#10;&#10;Description automatically generated">
+            <a:extLst>
+              <a:ext uri="{FF2B5EF4-FFF2-40B4-BE49-F238E27FC236}">
+                <a16:creationId xmlns:a16="http://schemas.microsoft.com/office/drawing/2014/main" id="{170D67A4-2436-81AE-9002-6E7534C3383F}"/>
               </a:ext>
             </a:extLst>
           </p:cNvPr>
@@ -5034,616 +4646,21 @@
           <p:nvPr/>
         </p:nvPicPr>
         <p:blipFill>
-          <a:blip r:embed="rId2"/>
+          <a:blip r:embed="rId2">
+            <a:extLst>
+              <a:ext uri="{28A0092B-C50C-407E-A947-70E740481C1C}">
+                <a14:useLocalDpi xmlns:a14="http://schemas.microsoft.com/office/drawing/2010/main" val="0"/>
+              </a:ext>
+            </a:extLst>
+          </a:blip>
           <a:stretch>
             <a:fillRect/>
           </a:stretch>
         </p:blipFill>
         <p:spPr>
           <a:xfrm>
-            <a:off x="4974336" y="2159765"/>
-            <a:ext cx="6510528" cy="3399787"/>
-          </a:xfrm>
-          <a:prstGeom prst="rect">
-            <a:avLst/>
-          </a:prstGeom>
-        </p:spPr>
-      </p:pic>
-      <p:pic>
-        <p:nvPicPr>
-          <p:cNvPr id="7" name="Picture 6">
-            <a:extLst>
-              <a:ext uri="{FF2B5EF4-FFF2-40B4-BE49-F238E27FC236}">
-                <a16:creationId xmlns:a16="http://schemas.microsoft.com/office/drawing/2014/main" id="{B0F3C398-8F99-B7C6-01EC-48FF35B2211A}"/>
-              </a:ext>
-            </a:extLst>
-          </p:cNvPr>
-          <p:cNvPicPr>
-            <a:picLocks noChangeAspect="1"/>
-          </p:cNvPicPr>
-          <p:nvPr/>
-        </p:nvPicPr>
-        <p:blipFill>
-          <a:blip r:embed="rId3"/>
-          <a:stretch>
-            <a:fillRect/>
-          </a:stretch>
-        </p:blipFill>
-        <p:spPr>
-          <a:xfrm>
-            <a:off x="411479" y="2159764"/>
-            <a:ext cx="4168767" cy="3399786"/>
-          </a:xfrm>
-          <a:prstGeom prst="rect">
-            <a:avLst/>
-          </a:prstGeom>
-        </p:spPr>
-      </p:pic>
-      <p:sp>
-        <p:nvSpPr>
-          <p:cNvPr id="8" name="TextBox 7">
-            <a:extLst>
-              <a:ext uri="{FF2B5EF4-FFF2-40B4-BE49-F238E27FC236}">
-                <a16:creationId xmlns:a16="http://schemas.microsoft.com/office/drawing/2014/main" id="{A302C97E-8D62-7990-662E-39EEE1DBDFE8}"/>
-              </a:ext>
-            </a:extLst>
-          </p:cNvPr>
-          <p:cNvSpPr txBox="1"/>
-          <p:nvPr/>
-        </p:nvSpPr>
-        <p:spPr>
-          <a:xfrm>
-            <a:off x="748053" y="6348083"/>
-            <a:ext cx="3135099" cy="369332"/>
-          </a:xfrm>
-          <a:prstGeom prst="rect">
-            <a:avLst/>
-          </a:prstGeom>
-          <a:noFill/>
-          <a:ln w="12700" cap="rnd">
-            <a:solidFill>
-              <a:schemeClr val="accent1"/>
-            </a:solidFill>
-          </a:ln>
-        </p:spPr>
-        <p:txBody>
-          <a:bodyPr wrap="square" rtlCol="0">
-            <a:spAutoFit/>
-          </a:bodyPr>
-          <a:lstStyle/>
-          <a:p>
-            <a:r>
-              <a:rPr lang="en-US" dirty="0"/>
-              <a:t>Solution </a:t>
-            </a:r>
-          </a:p>
-        </p:txBody>
-      </p:sp>
-      <p:cxnSp>
-        <p:nvCxnSpPr>
-          <p:cNvPr id="9" name="Straight Arrow Connector 8">
-            <a:extLst>
-              <a:ext uri="{FF2B5EF4-FFF2-40B4-BE49-F238E27FC236}">
-                <a16:creationId xmlns:a16="http://schemas.microsoft.com/office/drawing/2014/main" id="{67C32159-C201-07C0-B992-D3868EB905F9}"/>
-              </a:ext>
-            </a:extLst>
-          </p:cNvPr>
-          <p:cNvCxnSpPr>
-            <a:cxnSpLocks/>
-          </p:cNvCxnSpPr>
-          <p:nvPr/>
-        </p:nvCxnSpPr>
-        <p:spPr>
-          <a:xfrm>
-            <a:off x="4057190" y="6506401"/>
-            <a:ext cx="775855" cy="0"/>
-          </a:xfrm>
-          <a:prstGeom prst="straightConnector1">
-            <a:avLst/>
-          </a:prstGeom>
-          <a:ln w="57150">
-            <a:tailEnd type="triangle"/>
-          </a:ln>
-        </p:spPr>
-        <p:style>
-          <a:lnRef idx="2">
-            <a:schemeClr val="accent1"/>
-          </a:lnRef>
-          <a:fillRef idx="0">
-            <a:schemeClr val="accent1"/>
-          </a:fillRef>
-          <a:effectRef idx="1">
-            <a:schemeClr val="accent1"/>
-          </a:effectRef>
-          <a:fontRef idx="minor">
-            <a:schemeClr val="tx1"/>
-          </a:fontRef>
-        </p:style>
-      </p:cxnSp>
-      <p:sp>
-        <p:nvSpPr>
-          <p:cNvPr id="10" name="TextBox 9">
-            <a:extLst>
-              <a:ext uri="{FF2B5EF4-FFF2-40B4-BE49-F238E27FC236}">
-                <a16:creationId xmlns:a16="http://schemas.microsoft.com/office/drawing/2014/main" id="{77441A59-FDEA-C7F8-B1D9-AD96E1D87DAC}"/>
-              </a:ext>
-            </a:extLst>
-          </p:cNvPr>
-          <p:cNvSpPr txBox="1"/>
-          <p:nvPr/>
-        </p:nvSpPr>
-        <p:spPr>
-          <a:xfrm>
-            <a:off x="765443" y="11712563"/>
-            <a:ext cx="3135099" cy="369332"/>
-          </a:xfrm>
-          <a:prstGeom prst="rect">
-            <a:avLst/>
-          </a:prstGeom>
-          <a:noFill/>
-          <a:ln w="12700" cap="rnd">
-            <a:solidFill>
-              <a:schemeClr val="accent1"/>
-            </a:solidFill>
-          </a:ln>
-        </p:spPr>
-        <p:txBody>
-          <a:bodyPr wrap="square" rtlCol="0">
-            <a:spAutoFit/>
-          </a:bodyPr>
-          <a:lstStyle/>
-          <a:p>
-            <a:r>
-              <a:rPr lang="en-US" dirty="0"/>
-              <a:t>Solution </a:t>
-            </a:r>
-          </a:p>
-        </p:txBody>
-      </p:sp>
-      <p:sp>
-        <p:nvSpPr>
-          <p:cNvPr id="14" name="TextBox 13">
-            <a:extLst>
-              <a:ext uri="{FF2B5EF4-FFF2-40B4-BE49-F238E27FC236}">
-                <a16:creationId xmlns:a16="http://schemas.microsoft.com/office/drawing/2014/main" id="{3798C23D-9DCA-7A54-5795-8C5D0686A6DE}"/>
-              </a:ext>
-            </a:extLst>
-          </p:cNvPr>
-          <p:cNvSpPr txBox="1"/>
-          <p:nvPr/>
-        </p:nvSpPr>
-        <p:spPr>
-          <a:xfrm>
-            <a:off x="5007083" y="6316524"/>
-            <a:ext cx="6753394" cy="276999"/>
-          </a:xfrm>
-          <a:prstGeom prst="rect">
-            <a:avLst/>
-          </a:prstGeom>
-          <a:noFill/>
-          <a:ln w="12700" cap="rnd">
-            <a:solidFill>
-              <a:schemeClr val="accent1"/>
-            </a:solidFill>
-          </a:ln>
-        </p:spPr>
-        <p:txBody>
-          <a:bodyPr wrap="square" rtlCol="0">
-            <a:spAutoFit/>
-          </a:bodyPr>
-          <a:lstStyle/>
-          <a:p>
-            <a:r>
-              <a:rPr lang="en-US" sz="1200" dirty="0"/>
-              <a:t> </a:t>
-            </a:r>
-            <a:r>
-              <a:rPr lang="en-US" sz="1200" dirty="0">
-                <a:hlinkClick r:id="rId4">
-                  <a:extLst>
-                    <a:ext uri="{A12FA001-AC4F-418D-AE19-62706E023703}">
-                      <ahyp:hlinkClr xmlns:ahyp="http://schemas.microsoft.com/office/drawing/2018/hyperlinkcolor" val="tx"/>
-                    </a:ext>
-                  </a:extLst>
-                </a:hlinkClick>
-              </a:rPr>
-              <a:t>https://www.kaggle.com/datasets/open-source-sports/baseball-databank</a:t>
-            </a:r>
-            <a:endParaRPr lang="en-US" sz="1200" dirty="0"/>
-          </a:p>
-        </p:txBody>
-      </p:sp>
-      <p:sp>
-        <p:nvSpPr>
-          <p:cNvPr id="15" name="TextBox 14">
-            <a:extLst>
-              <a:ext uri="{FF2B5EF4-FFF2-40B4-BE49-F238E27FC236}">
-                <a16:creationId xmlns:a16="http://schemas.microsoft.com/office/drawing/2014/main" id="{D3693E0E-463E-D1B6-A2FC-EAFCCA002D46}"/>
-              </a:ext>
-            </a:extLst>
-          </p:cNvPr>
-          <p:cNvSpPr txBox="1"/>
-          <p:nvPr/>
-        </p:nvSpPr>
-        <p:spPr>
-          <a:xfrm>
-            <a:off x="765443" y="5789352"/>
-            <a:ext cx="3135099" cy="369332"/>
-          </a:xfrm>
-          <a:prstGeom prst="rect">
-            <a:avLst/>
-          </a:prstGeom>
-          <a:noFill/>
-          <a:ln w="12700" cap="rnd">
-            <a:solidFill>
-              <a:schemeClr val="accent1"/>
-            </a:solidFill>
-          </a:ln>
-        </p:spPr>
-        <p:txBody>
-          <a:bodyPr wrap="square" rtlCol="0">
-            <a:spAutoFit/>
-          </a:bodyPr>
-          <a:lstStyle/>
-          <a:p>
-            <a:r>
-              <a:rPr lang="en-US" dirty="0"/>
-              <a:t>Problem Faced	 </a:t>
-            </a:r>
-          </a:p>
-        </p:txBody>
-      </p:sp>
-      <p:cxnSp>
-        <p:nvCxnSpPr>
-          <p:cNvPr id="16" name="Straight Arrow Connector 15">
-            <a:extLst>
-              <a:ext uri="{FF2B5EF4-FFF2-40B4-BE49-F238E27FC236}">
-                <a16:creationId xmlns:a16="http://schemas.microsoft.com/office/drawing/2014/main" id="{8A9EAAAE-6292-A7D3-030D-E2191B73C178}"/>
-              </a:ext>
-            </a:extLst>
-          </p:cNvPr>
-          <p:cNvCxnSpPr>
-            <a:cxnSpLocks/>
-          </p:cNvCxnSpPr>
-          <p:nvPr/>
-        </p:nvCxnSpPr>
-        <p:spPr>
-          <a:xfrm>
-            <a:off x="4074580" y="5947670"/>
-            <a:ext cx="775855" cy="0"/>
-          </a:xfrm>
-          <a:prstGeom prst="straightConnector1">
-            <a:avLst/>
-          </a:prstGeom>
-          <a:ln w="57150">
-            <a:tailEnd type="triangle"/>
-          </a:ln>
-        </p:spPr>
-        <p:style>
-          <a:lnRef idx="2">
-            <a:schemeClr val="accent1"/>
-          </a:lnRef>
-          <a:fillRef idx="0">
-            <a:schemeClr val="accent1"/>
-          </a:fillRef>
-          <a:effectRef idx="1">
-            <a:schemeClr val="accent1"/>
-          </a:effectRef>
-          <a:fontRef idx="minor">
-            <a:schemeClr val="tx1"/>
-          </a:fontRef>
-        </p:style>
-      </p:cxnSp>
-      <p:sp>
-        <p:nvSpPr>
-          <p:cNvPr id="17" name="TextBox 16">
-            <a:extLst>
-              <a:ext uri="{FF2B5EF4-FFF2-40B4-BE49-F238E27FC236}">
-                <a16:creationId xmlns:a16="http://schemas.microsoft.com/office/drawing/2014/main" id="{AD279E19-0473-AE74-3A39-424449676C34}"/>
-              </a:ext>
-            </a:extLst>
-          </p:cNvPr>
-          <p:cNvSpPr txBox="1"/>
-          <p:nvPr/>
-        </p:nvSpPr>
-        <p:spPr>
-          <a:xfrm>
-            <a:off x="5024473" y="5757793"/>
-            <a:ext cx="6753394" cy="276999"/>
-          </a:xfrm>
-          <a:prstGeom prst="rect">
-            <a:avLst/>
-          </a:prstGeom>
-          <a:noFill/>
-          <a:ln w="12700" cap="rnd">
-            <a:solidFill>
-              <a:schemeClr val="accent1"/>
-            </a:solidFill>
-          </a:ln>
-        </p:spPr>
-        <p:txBody>
-          <a:bodyPr wrap="square" rtlCol="0">
-            <a:spAutoFit/>
-          </a:bodyPr>
-          <a:lstStyle/>
-          <a:p>
-            <a:r>
-              <a:rPr lang="en-US" sz="1200" dirty="0"/>
-              <a:t>Web scraping is a time consume process and not suitable for  scraping a large data set. </a:t>
-            </a:r>
-          </a:p>
-        </p:txBody>
-      </p:sp>
-    </p:spTree>
-    <p:extLst>
-      <p:ext uri="{BB962C8B-B14F-4D97-AF65-F5344CB8AC3E}">
-        <p14:creationId xmlns:p14="http://schemas.microsoft.com/office/powerpoint/2010/main" val="3284061155"/>
-      </p:ext>
-    </p:extLst>
-  </p:cSld>
-  <p:clrMapOvr>
-    <a:masterClrMapping/>
-  </p:clrMapOvr>
-</p:sld>
-</file>
-
-<file path=ppt/slides/slide6.xml><?xml version="1.0" encoding="utf-8"?>
-<p:sld xmlns:a="http://schemas.openxmlformats.org/drawingml/2006/main" xmlns:r="http://schemas.openxmlformats.org/officeDocument/2006/relationships" xmlns:p="http://schemas.openxmlformats.org/presentationml/2006/main">
-  <p:cSld>
-    <p:spTree>
-      <p:nvGrpSpPr>
-        <p:cNvPr id="1" name=""/>
-        <p:cNvGrpSpPr/>
-        <p:nvPr/>
-      </p:nvGrpSpPr>
-      <p:grpSpPr>
-        <a:xfrm>
-          <a:off x="0" y="0"/>
-          <a:ext cx="0" cy="0"/>
-          <a:chOff x="0" y="0"/>
-          <a:chExt cx="0" cy="0"/>
-        </a:xfrm>
-      </p:grpSpPr>
-      <p:sp>
-        <p:nvSpPr>
-          <p:cNvPr id="2" name="TextBox 1">
-            <a:extLst>
-              <a:ext uri="{FF2B5EF4-FFF2-40B4-BE49-F238E27FC236}">
-                <a16:creationId xmlns:a16="http://schemas.microsoft.com/office/drawing/2014/main" id="{9C29D741-7B5A-EB24-563C-8D8256EF7BAB}"/>
-              </a:ext>
-            </a:extLst>
-          </p:cNvPr>
-          <p:cNvSpPr txBox="1"/>
-          <p:nvPr/>
-        </p:nvSpPr>
-        <p:spPr>
-          <a:xfrm>
-            <a:off x="296441" y="424873"/>
-            <a:ext cx="11599118" cy="369332"/>
-          </a:xfrm>
-          <a:prstGeom prst="rect">
-            <a:avLst/>
-          </a:prstGeom>
-          <a:noFill/>
-        </p:spPr>
-        <p:txBody>
-          <a:bodyPr wrap="square" rtlCol="0">
-            <a:spAutoFit/>
-          </a:bodyPr>
-          <a:lstStyle/>
-          <a:p>
-            <a:pPr algn="ctr"/>
-            <a:r>
-              <a:rPr lang="en-US" dirty="0"/>
-              <a:t>Data Cleaning Process</a:t>
-            </a:r>
-          </a:p>
-        </p:txBody>
-      </p:sp>
-      <p:pic>
-        <p:nvPicPr>
-          <p:cNvPr id="6" name="Picture 5">
-            <a:extLst>
-              <a:ext uri="{FF2B5EF4-FFF2-40B4-BE49-F238E27FC236}">
-                <a16:creationId xmlns:a16="http://schemas.microsoft.com/office/drawing/2014/main" id="{3D391283-3294-F11B-F5E5-765B6D24B80D}"/>
-              </a:ext>
-            </a:extLst>
-          </p:cNvPr>
-          <p:cNvPicPr>
-            <a:picLocks noChangeAspect="1"/>
-          </p:cNvPicPr>
-          <p:nvPr/>
-        </p:nvPicPr>
-        <p:blipFill>
-          <a:blip r:embed="rId2"/>
-          <a:stretch>
-            <a:fillRect/>
-          </a:stretch>
-        </p:blipFill>
-        <p:spPr>
-          <a:xfrm>
-            <a:off x="296441" y="861431"/>
-            <a:ext cx="3953427" cy="2867425"/>
-          </a:xfrm>
-          <a:prstGeom prst="rect">
-            <a:avLst/>
-          </a:prstGeom>
-        </p:spPr>
-      </p:pic>
-      <p:pic>
-        <p:nvPicPr>
-          <p:cNvPr id="8" name="Picture 7">
-            <a:extLst>
-              <a:ext uri="{FF2B5EF4-FFF2-40B4-BE49-F238E27FC236}">
-                <a16:creationId xmlns:a16="http://schemas.microsoft.com/office/drawing/2014/main" id="{6921A932-D631-C2FA-0049-D44603FF8F6E}"/>
-              </a:ext>
-            </a:extLst>
-          </p:cNvPr>
-          <p:cNvPicPr>
-            <a:picLocks noChangeAspect="1"/>
-          </p:cNvPicPr>
-          <p:nvPr/>
-        </p:nvPicPr>
-        <p:blipFill>
-          <a:blip r:embed="rId3"/>
-          <a:stretch>
-            <a:fillRect/>
-          </a:stretch>
-        </p:blipFill>
-        <p:spPr>
-          <a:xfrm>
-            <a:off x="4546309" y="873298"/>
-            <a:ext cx="7645691" cy="952633"/>
-          </a:xfrm>
-          <a:prstGeom prst="rect">
-            <a:avLst/>
-          </a:prstGeom>
-        </p:spPr>
-      </p:pic>
-      <p:pic>
-        <p:nvPicPr>
-          <p:cNvPr id="10" name="Picture 9">
-            <a:extLst>
-              <a:ext uri="{FF2B5EF4-FFF2-40B4-BE49-F238E27FC236}">
-                <a16:creationId xmlns:a16="http://schemas.microsoft.com/office/drawing/2014/main" id="{AF9505C7-A4F5-0ED9-2B2B-3907D040A9CA}"/>
-              </a:ext>
-            </a:extLst>
-          </p:cNvPr>
-          <p:cNvPicPr>
-            <a:picLocks noChangeAspect="1"/>
-          </p:cNvPicPr>
-          <p:nvPr/>
-        </p:nvPicPr>
-        <p:blipFill>
-          <a:blip r:embed="rId4"/>
-          <a:stretch>
-            <a:fillRect/>
-          </a:stretch>
-        </p:blipFill>
-        <p:spPr>
-          <a:xfrm>
-            <a:off x="4546309" y="2091443"/>
-            <a:ext cx="7645691" cy="809738"/>
-          </a:xfrm>
-          <a:prstGeom prst="rect">
-            <a:avLst/>
-          </a:prstGeom>
-        </p:spPr>
-      </p:pic>
-      <p:pic>
-        <p:nvPicPr>
-          <p:cNvPr id="14" name="Picture 13">
-            <a:extLst>
-              <a:ext uri="{FF2B5EF4-FFF2-40B4-BE49-F238E27FC236}">
-                <a16:creationId xmlns:a16="http://schemas.microsoft.com/office/drawing/2014/main" id="{E707A372-68DF-8C4E-5E3D-CF8E02E939FF}"/>
-              </a:ext>
-            </a:extLst>
-          </p:cNvPr>
-          <p:cNvPicPr>
-            <a:picLocks noChangeAspect="1"/>
-          </p:cNvPicPr>
-          <p:nvPr/>
-        </p:nvPicPr>
-        <p:blipFill>
-          <a:blip r:embed="rId5"/>
-          <a:stretch>
-            <a:fillRect/>
-          </a:stretch>
-        </p:blipFill>
-        <p:spPr>
-          <a:xfrm>
-            <a:off x="4612126" y="3015927"/>
-            <a:ext cx="7579873" cy="495369"/>
-          </a:xfrm>
-          <a:prstGeom prst="rect">
-            <a:avLst/>
-          </a:prstGeom>
-        </p:spPr>
-      </p:pic>
-      <p:pic>
-        <p:nvPicPr>
-          <p:cNvPr id="16" name="Picture 15">
-            <a:extLst>
-              <a:ext uri="{FF2B5EF4-FFF2-40B4-BE49-F238E27FC236}">
-                <a16:creationId xmlns:a16="http://schemas.microsoft.com/office/drawing/2014/main" id="{AF882C93-5E37-2863-CF27-AED69E1B8B25}"/>
-              </a:ext>
-            </a:extLst>
-          </p:cNvPr>
-          <p:cNvPicPr>
-            <a:picLocks noChangeAspect="1"/>
-          </p:cNvPicPr>
-          <p:nvPr/>
-        </p:nvPicPr>
-        <p:blipFill>
-          <a:blip r:embed="rId6"/>
-          <a:stretch>
-            <a:fillRect/>
-          </a:stretch>
-        </p:blipFill>
-        <p:spPr>
-          <a:xfrm>
-            <a:off x="4546309" y="3626042"/>
-            <a:ext cx="7645691" cy="914528"/>
-          </a:xfrm>
-          <a:prstGeom prst="rect">
-            <a:avLst/>
-          </a:prstGeom>
-        </p:spPr>
-      </p:pic>
-      <p:pic>
-        <p:nvPicPr>
-          <p:cNvPr id="18" name="Picture 17">
-            <a:extLst>
-              <a:ext uri="{FF2B5EF4-FFF2-40B4-BE49-F238E27FC236}">
-                <a16:creationId xmlns:a16="http://schemas.microsoft.com/office/drawing/2014/main" id="{2C1E6E08-3CC6-1663-D4C8-863DA8D1D945}"/>
-              </a:ext>
-            </a:extLst>
-          </p:cNvPr>
-          <p:cNvPicPr>
-            <a:picLocks noChangeAspect="1"/>
-          </p:cNvPicPr>
-          <p:nvPr/>
-        </p:nvPicPr>
-        <p:blipFill>
-          <a:blip r:embed="rId7"/>
-          <a:stretch>
-            <a:fillRect/>
-          </a:stretch>
-        </p:blipFill>
-        <p:spPr>
-          <a:xfrm>
-            <a:off x="4612127" y="4655316"/>
-            <a:ext cx="7579873" cy="1345671"/>
-          </a:xfrm>
-          <a:prstGeom prst="rect">
-            <a:avLst/>
-          </a:prstGeom>
-        </p:spPr>
-      </p:pic>
-      <p:pic>
-        <p:nvPicPr>
-          <p:cNvPr id="20" name="Picture 19">
-            <a:extLst>
-              <a:ext uri="{FF2B5EF4-FFF2-40B4-BE49-F238E27FC236}">
-                <a16:creationId xmlns:a16="http://schemas.microsoft.com/office/drawing/2014/main" id="{EA282769-AE40-9D8A-037F-B5063CE2B4A3}"/>
-              </a:ext>
-            </a:extLst>
-          </p:cNvPr>
-          <p:cNvPicPr>
-            <a:picLocks noChangeAspect="1"/>
-          </p:cNvPicPr>
-          <p:nvPr/>
-        </p:nvPicPr>
-        <p:blipFill>
-          <a:blip r:embed="rId8"/>
-          <a:stretch>
-            <a:fillRect/>
-          </a:stretch>
-        </p:blipFill>
-        <p:spPr>
-          <a:xfrm>
-            <a:off x="190063" y="4540570"/>
-            <a:ext cx="4208026" cy="1567686"/>
+            <a:off x="3473996" y="3653103"/>
+            <a:ext cx="4259658" cy="2839772"/>
           </a:xfrm>
           <a:prstGeom prst="rect">
             <a:avLst/>
@@ -5653,2247 +4670,7 @@
     </p:spTree>
     <p:extLst>
       <p:ext uri="{BB962C8B-B14F-4D97-AF65-F5344CB8AC3E}">
-        <p14:creationId xmlns:p14="http://schemas.microsoft.com/office/powerpoint/2010/main" val="3252920775"/>
-      </p:ext>
-    </p:extLst>
-  </p:cSld>
-  <p:clrMapOvr>
-    <a:masterClrMapping/>
-  </p:clrMapOvr>
-</p:sld>
-</file>
-
-<file path=ppt/slides/slide7.xml><?xml version="1.0" encoding="utf-8"?>
-<p:sld xmlns:a="http://schemas.openxmlformats.org/drawingml/2006/main" xmlns:r="http://schemas.openxmlformats.org/officeDocument/2006/relationships" xmlns:p="http://schemas.openxmlformats.org/presentationml/2006/main">
-  <p:cSld>
-    <p:spTree>
-      <p:nvGrpSpPr>
-        <p:cNvPr id="1" name=""/>
-        <p:cNvGrpSpPr/>
-        <p:nvPr/>
-      </p:nvGrpSpPr>
-      <p:grpSpPr>
-        <a:xfrm>
-          <a:off x="0" y="0"/>
-          <a:ext cx="0" cy="0"/>
-          <a:chOff x="0" y="0"/>
-          <a:chExt cx="0" cy="0"/>
-        </a:xfrm>
-      </p:grpSpPr>
-      <p:sp>
-        <p:nvSpPr>
-          <p:cNvPr id="2" name="TextBox 1">
-            <a:extLst>
-              <a:ext uri="{FF2B5EF4-FFF2-40B4-BE49-F238E27FC236}">
-                <a16:creationId xmlns:a16="http://schemas.microsoft.com/office/drawing/2014/main" id="{D5288738-3F57-1F81-3512-14FAC729726F}"/>
-              </a:ext>
-            </a:extLst>
-          </p:cNvPr>
-          <p:cNvSpPr txBox="1"/>
-          <p:nvPr/>
-        </p:nvSpPr>
-        <p:spPr>
-          <a:xfrm>
-            <a:off x="296441" y="207004"/>
-            <a:ext cx="11599118" cy="369332"/>
-          </a:xfrm>
-          <a:prstGeom prst="rect">
-            <a:avLst/>
-          </a:prstGeom>
-          <a:noFill/>
-        </p:spPr>
-        <p:txBody>
-          <a:bodyPr wrap="square" rtlCol="0">
-            <a:spAutoFit/>
-          </a:bodyPr>
-          <a:lstStyle/>
-          <a:p>
-            <a:pPr algn="ctr"/>
-            <a:r>
-              <a:rPr lang="en-US" dirty="0"/>
-              <a:t>External Libraries Used </a:t>
-            </a:r>
-          </a:p>
-        </p:txBody>
-      </p:sp>
-      <p:sp>
-        <p:nvSpPr>
-          <p:cNvPr id="3" name="TextBox 2">
-            <a:extLst>
-              <a:ext uri="{FF2B5EF4-FFF2-40B4-BE49-F238E27FC236}">
-                <a16:creationId xmlns:a16="http://schemas.microsoft.com/office/drawing/2014/main" id="{DC2A662C-0492-2251-93FC-13531B64A0D4}"/>
-              </a:ext>
-            </a:extLst>
-          </p:cNvPr>
-          <p:cNvSpPr txBox="1"/>
-          <p:nvPr/>
-        </p:nvSpPr>
-        <p:spPr>
-          <a:xfrm>
-            <a:off x="595653" y="931052"/>
-            <a:ext cx="3135099" cy="369332"/>
-          </a:xfrm>
-          <a:prstGeom prst="rect">
-            <a:avLst/>
-          </a:prstGeom>
-          <a:noFill/>
-          <a:ln w="12700" cap="rnd">
-            <a:solidFill>
-              <a:schemeClr val="accent1"/>
-            </a:solidFill>
-          </a:ln>
-        </p:spPr>
-        <p:txBody>
-          <a:bodyPr wrap="square" rtlCol="0">
-            <a:spAutoFit/>
-          </a:bodyPr>
-          <a:lstStyle/>
-          <a:p>
-            <a:r>
-              <a:rPr lang="en-US" dirty="0"/>
-              <a:t>Data Binding</a:t>
-            </a:r>
-          </a:p>
-        </p:txBody>
-      </p:sp>
-      <p:sp>
-        <p:nvSpPr>
-          <p:cNvPr id="4" name="TextBox 3">
-            <a:extLst>
-              <a:ext uri="{FF2B5EF4-FFF2-40B4-BE49-F238E27FC236}">
-                <a16:creationId xmlns:a16="http://schemas.microsoft.com/office/drawing/2014/main" id="{88B52936-37EF-7C93-5DFC-344D8144A6A9}"/>
-              </a:ext>
-            </a:extLst>
-          </p:cNvPr>
-          <p:cNvSpPr txBox="1"/>
-          <p:nvPr/>
-        </p:nvSpPr>
-        <p:spPr>
-          <a:xfrm>
-            <a:off x="4919472" y="792552"/>
-            <a:ext cx="6510528" cy="1200329"/>
-          </a:xfrm>
-          <a:prstGeom prst="rect">
-            <a:avLst/>
-          </a:prstGeom>
-          <a:noFill/>
-          <a:ln w="12700" cap="rnd">
-            <a:solidFill>
-              <a:schemeClr val="accent1"/>
-            </a:solidFill>
-          </a:ln>
-        </p:spPr>
-        <p:txBody>
-          <a:bodyPr wrap="square" rtlCol="0">
-            <a:spAutoFit/>
-          </a:bodyPr>
-          <a:lstStyle>
-            <a:defPPr>
-              <a:defRPr lang="en-US"/>
-            </a:defPPr>
-            <a:lvl1pPr>
-              <a:defRPr/>
-            </a:lvl1pPr>
-          </a:lstStyle>
-          <a:p>
-            <a:r>
-              <a:rPr lang="en-US" sz="1200" b="0" dirty="0">
-                <a:solidFill>
-                  <a:srgbClr val="9CDCFE"/>
-                </a:solidFill>
-                <a:effectLst/>
-                <a:highlight>
-                  <a:srgbClr val="1E1E1E"/>
-                </a:highlight>
-                <a:latin typeface="Consolas" panose="020B0609020204030204" pitchFamily="49" charset="0"/>
-              </a:rPr>
-              <a:t>d3</a:t>
-            </a:r>
-            <a:r>
-              <a:rPr lang="en-US" sz="1200" b="0" dirty="0">
-                <a:solidFill>
-                  <a:srgbClr val="D4D4D4"/>
-                </a:solidFill>
-                <a:effectLst/>
-                <a:highlight>
-                  <a:srgbClr val="1E1E1E"/>
-                </a:highlight>
-                <a:latin typeface="Consolas" panose="020B0609020204030204" pitchFamily="49" charset="0"/>
-              </a:rPr>
-              <a:t>.</a:t>
-            </a:r>
-            <a:r>
-              <a:rPr lang="en-US" sz="1200" b="0" dirty="0">
-                <a:solidFill>
-                  <a:srgbClr val="DCDCAA"/>
-                </a:solidFill>
-                <a:effectLst/>
-                <a:highlight>
-                  <a:srgbClr val="1E1E1E"/>
-                </a:highlight>
-                <a:latin typeface="Consolas" panose="020B0609020204030204" pitchFamily="49" charset="0"/>
-              </a:rPr>
-              <a:t>csv</a:t>
-            </a:r>
-            <a:r>
-              <a:rPr lang="en-US" sz="1200" b="0" dirty="0">
-                <a:solidFill>
-                  <a:srgbClr val="D4D4D4"/>
-                </a:solidFill>
-                <a:effectLst/>
-                <a:highlight>
-                  <a:srgbClr val="1E1E1E"/>
-                </a:highlight>
-                <a:latin typeface="Consolas" panose="020B0609020204030204" pitchFamily="49" charset="0"/>
-              </a:rPr>
-              <a:t>(</a:t>
-            </a:r>
-            <a:r>
-              <a:rPr lang="en-US" sz="1200" b="0" dirty="0">
-                <a:solidFill>
-                  <a:srgbClr val="CE9178"/>
-                </a:solidFill>
-                <a:effectLst/>
-                <a:highlight>
-                  <a:srgbClr val="1E1E1E"/>
-                </a:highlight>
-                <a:latin typeface="Consolas" panose="020B0609020204030204" pitchFamily="49" charset="0"/>
-              </a:rPr>
-              <a:t>"./Resources/Summary.csv"</a:t>
-            </a:r>
-            <a:r>
-              <a:rPr lang="en-US" sz="1200" b="0" dirty="0">
-                <a:solidFill>
-                  <a:srgbClr val="D4D4D4"/>
-                </a:solidFill>
-                <a:effectLst/>
-                <a:highlight>
-                  <a:srgbClr val="1E1E1E"/>
-                </a:highlight>
-                <a:latin typeface="Consolas" panose="020B0609020204030204" pitchFamily="49" charset="0"/>
-              </a:rPr>
-              <a:t>).</a:t>
-            </a:r>
-            <a:r>
-              <a:rPr lang="en-US" sz="1200" b="0" dirty="0">
-                <a:solidFill>
-                  <a:srgbClr val="DCDCAA"/>
-                </a:solidFill>
-                <a:effectLst/>
-                <a:highlight>
-                  <a:srgbClr val="1E1E1E"/>
-                </a:highlight>
-                <a:latin typeface="Consolas" panose="020B0609020204030204" pitchFamily="49" charset="0"/>
-              </a:rPr>
-              <a:t>then</a:t>
-            </a:r>
-            <a:r>
-              <a:rPr lang="en-US" sz="1200" b="0" dirty="0">
-                <a:solidFill>
-                  <a:srgbClr val="D4D4D4"/>
-                </a:solidFill>
-                <a:effectLst/>
-                <a:highlight>
-                  <a:srgbClr val="1E1E1E"/>
-                </a:highlight>
-                <a:latin typeface="Consolas" panose="020B0609020204030204" pitchFamily="49" charset="0"/>
-              </a:rPr>
-              <a:t>(</a:t>
-            </a:r>
-            <a:r>
-              <a:rPr lang="en-US" sz="1200" b="0" dirty="0">
-                <a:solidFill>
-                  <a:srgbClr val="569CD6"/>
-                </a:solidFill>
-                <a:effectLst/>
-                <a:highlight>
-                  <a:srgbClr val="1E1E1E"/>
-                </a:highlight>
-                <a:latin typeface="Consolas" panose="020B0609020204030204" pitchFamily="49" charset="0"/>
-              </a:rPr>
-              <a:t>function</a:t>
-            </a:r>
-            <a:r>
-              <a:rPr lang="en-US" sz="1200" b="0" dirty="0">
-                <a:solidFill>
-                  <a:srgbClr val="D4D4D4"/>
-                </a:solidFill>
-                <a:effectLst/>
-                <a:highlight>
-                  <a:srgbClr val="1E1E1E"/>
-                </a:highlight>
-                <a:latin typeface="Consolas" panose="020B0609020204030204" pitchFamily="49" charset="0"/>
-              </a:rPr>
-              <a:t>(</a:t>
-            </a:r>
-            <a:r>
-              <a:rPr lang="en-US" sz="1200" b="0" dirty="0">
-                <a:solidFill>
-                  <a:srgbClr val="9CDCFE"/>
-                </a:solidFill>
-                <a:effectLst/>
-                <a:highlight>
-                  <a:srgbClr val="1E1E1E"/>
-                </a:highlight>
-                <a:latin typeface="Consolas" panose="020B0609020204030204" pitchFamily="49" charset="0"/>
-              </a:rPr>
-              <a:t>data</a:t>
-            </a:r>
-            <a:r>
-              <a:rPr lang="en-US" sz="1200" b="0" dirty="0">
-                <a:solidFill>
-                  <a:srgbClr val="D4D4D4"/>
-                </a:solidFill>
-                <a:effectLst/>
-                <a:highlight>
-                  <a:srgbClr val="1E1E1E"/>
-                </a:highlight>
-                <a:latin typeface="Consolas" panose="020B0609020204030204" pitchFamily="49" charset="0"/>
-              </a:rPr>
-              <a:t>) { </a:t>
-            </a:r>
-          </a:p>
-          <a:p>
-            <a:endParaRPr lang="en-US" sz="1200" dirty="0">
-              <a:solidFill>
-                <a:srgbClr val="D4D4D4"/>
-              </a:solidFill>
-              <a:highlight>
-                <a:srgbClr val="1E1E1E"/>
-              </a:highlight>
-              <a:latin typeface="Consolas" panose="020B0609020204030204" pitchFamily="49" charset="0"/>
-            </a:endParaRPr>
-          </a:p>
-          <a:p>
-            <a:r>
-              <a:rPr lang="en-US" sz="1200" b="0" dirty="0">
-                <a:solidFill>
-                  <a:srgbClr val="D4D4D4"/>
-                </a:solidFill>
-                <a:effectLst/>
-                <a:highlight>
-                  <a:srgbClr val="1E1E1E"/>
-                </a:highlight>
-                <a:latin typeface="Consolas" panose="020B0609020204030204" pitchFamily="49" charset="0"/>
-              </a:rPr>
-              <a:t> </a:t>
-            </a:r>
-            <a:r>
-              <a:rPr lang="en-US" sz="1200" b="0" dirty="0">
-                <a:solidFill>
-                  <a:srgbClr val="6A9955"/>
-                </a:solidFill>
-                <a:effectLst/>
-                <a:highlight>
-                  <a:srgbClr val="1E1E1E"/>
-                </a:highlight>
-                <a:latin typeface="Consolas" panose="020B0609020204030204" pitchFamily="49" charset="0"/>
-              </a:rPr>
-              <a:t>&lt;!-- D3 library --&gt;</a:t>
-            </a:r>
-            <a:endParaRPr lang="en-US" sz="1200" b="0" dirty="0">
-              <a:solidFill>
-                <a:srgbClr val="D4D4D4"/>
-              </a:solidFill>
-              <a:effectLst/>
-              <a:highlight>
-                <a:srgbClr val="1E1E1E"/>
-              </a:highlight>
-              <a:latin typeface="Consolas" panose="020B0609020204030204" pitchFamily="49" charset="0"/>
-            </a:endParaRPr>
-          </a:p>
-          <a:p>
-            <a:r>
-              <a:rPr lang="en-US" sz="1200" b="0" dirty="0">
-                <a:solidFill>
-                  <a:srgbClr val="D4D4D4"/>
-                </a:solidFill>
-                <a:effectLst/>
-                <a:highlight>
-                  <a:srgbClr val="1E1E1E"/>
-                </a:highlight>
-                <a:latin typeface="Consolas" panose="020B0609020204030204" pitchFamily="49" charset="0"/>
-              </a:rPr>
-              <a:t>  </a:t>
-            </a:r>
-            <a:r>
-              <a:rPr lang="en-US" sz="1200" b="0" dirty="0">
-                <a:solidFill>
-                  <a:srgbClr val="808080"/>
-                </a:solidFill>
-                <a:effectLst/>
-                <a:highlight>
-                  <a:srgbClr val="1E1E1E"/>
-                </a:highlight>
-                <a:latin typeface="Consolas" panose="020B0609020204030204" pitchFamily="49" charset="0"/>
-              </a:rPr>
-              <a:t>&lt;</a:t>
-            </a:r>
-            <a:r>
-              <a:rPr lang="en-US" sz="1200" b="0" dirty="0">
-                <a:solidFill>
-                  <a:srgbClr val="569CD6"/>
-                </a:solidFill>
-                <a:effectLst/>
-                <a:highlight>
-                  <a:srgbClr val="1E1E1E"/>
-                </a:highlight>
-                <a:latin typeface="Consolas" panose="020B0609020204030204" pitchFamily="49" charset="0"/>
-              </a:rPr>
-              <a:t>script</a:t>
-            </a:r>
-            <a:r>
-              <a:rPr lang="en-US" sz="1200" b="0" dirty="0">
-                <a:solidFill>
-                  <a:srgbClr val="D4D4D4"/>
-                </a:solidFill>
-                <a:effectLst/>
-                <a:highlight>
-                  <a:srgbClr val="1E1E1E"/>
-                </a:highlight>
-                <a:latin typeface="Consolas" panose="020B0609020204030204" pitchFamily="49" charset="0"/>
-              </a:rPr>
-              <a:t> </a:t>
-            </a:r>
-            <a:r>
-              <a:rPr lang="en-US" sz="1200" b="0" dirty="0" err="1">
-                <a:solidFill>
-                  <a:srgbClr val="9CDCFE"/>
-                </a:solidFill>
-                <a:effectLst/>
-                <a:highlight>
-                  <a:srgbClr val="1E1E1E"/>
-                </a:highlight>
-                <a:latin typeface="Consolas" panose="020B0609020204030204" pitchFamily="49" charset="0"/>
-              </a:rPr>
-              <a:t>src</a:t>
-            </a:r>
-            <a:r>
-              <a:rPr lang="en-US" sz="1200" b="0" dirty="0">
-                <a:solidFill>
-                  <a:srgbClr val="D4D4D4"/>
-                </a:solidFill>
-                <a:effectLst/>
-                <a:highlight>
-                  <a:srgbClr val="1E1E1E"/>
-                </a:highlight>
-                <a:latin typeface="Consolas" panose="020B0609020204030204" pitchFamily="49" charset="0"/>
-              </a:rPr>
-              <a:t>=</a:t>
-            </a:r>
-            <a:r>
-              <a:rPr lang="en-US" sz="1200" b="0" dirty="0">
-                <a:solidFill>
-                  <a:srgbClr val="CE9178"/>
-                </a:solidFill>
-                <a:effectLst/>
-                <a:highlight>
-                  <a:srgbClr val="1E1E1E"/>
-                </a:highlight>
-                <a:latin typeface="Consolas" panose="020B0609020204030204" pitchFamily="49" charset="0"/>
-              </a:rPr>
-              <a:t>"https://d3js.org/d3.v7.min.js"</a:t>
-            </a:r>
-            <a:r>
-              <a:rPr lang="en-US" sz="1200" b="0" dirty="0">
-                <a:solidFill>
-                  <a:srgbClr val="808080"/>
-                </a:solidFill>
-                <a:effectLst/>
-                <a:highlight>
-                  <a:srgbClr val="1E1E1E"/>
-                </a:highlight>
-                <a:latin typeface="Consolas" panose="020B0609020204030204" pitchFamily="49" charset="0"/>
-              </a:rPr>
-              <a:t>&gt;&lt;/</a:t>
-            </a:r>
-            <a:r>
-              <a:rPr lang="en-US" sz="1200" b="0" dirty="0">
-                <a:solidFill>
-                  <a:srgbClr val="569CD6"/>
-                </a:solidFill>
-                <a:effectLst/>
-                <a:highlight>
-                  <a:srgbClr val="1E1E1E"/>
-                </a:highlight>
-                <a:latin typeface="Consolas" panose="020B0609020204030204" pitchFamily="49" charset="0"/>
-              </a:rPr>
-              <a:t>script</a:t>
-            </a:r>
-            <a:r>
-              <a:rPr lang="en-US" sz="1200" b="0" dirty="0">
-                <a:solidFill>
-                  <a:srgbClr val="808080"/>
-                </a:solidFill>
-                <a:effectLst/>
-                <a:highlight>
-                  <a:srgbClr val="1E1E1E"/>
-                </a:highlight>
-                <a:latin typeface="Consolas" panose="020B0609020204030204" pitchFamily="49" charset="0"/>
-              </a:rPr>
-              <a:t>&gt;</a:t>
-            </a:r>
-            <a:endParaRPr lang="en-US" sz="1200" b="0" dirty="0">
-              <a:solidFill>
-                <a:srgbClr val="D4D4D4"/>
-              </a:solidFill>
-              <a:effectLst/>
-              <a:highlight>
-                <a:srgbClr val="1E1E1E"/>
-              </a:highlight>
-              <a:latin typeface="Consolas" panose="020B0609020204030204" pitchFamily="49" charset="0"/>
-            </a:endParaRPr>
-          </a:p>
-          <a:p>
-            <a:endParaRPr lang="en-US" sz="1200" b="0" dirty="0">
-              <a:solidFill>
-                <a:srgbClr val="D4D4D4"/>
-              </a:solidFill>
-              <a:effectLst/>
-              <a:highlight>
-                <a:srgbClr val="1E1E1E"/>
-              </a:highlight>
-              <a:latin typeface="Consolas" panose="020B0609020204030204" pitchFamily="49" charset="0"/>
-            </a:endParaRPr>
-          </a:p>
-          <a:p>
-            <a:endParaRPr lang="en-US" sz="1200" b="0" dirty="0">
-              <a:solidFill>
-                <a:srgbClr val="D4D4D4"/>
-              </a:solidFill>
-              <a:effectLst/>
-              <a:highlight>
-                <a:srgbClr val="1E1E1E"/>
-              </a:highlight>
-              <a:latin typeface="Consolas" panose="020B0609020204030204" pitchFamily="49" charset="0"/>
-            </a:endParaRPr>
-          </a:p>
-        </p:txBody>
-      </p:sp>
-      <p:cxnSp>
-        <p:nvCxnSpPr>
-          <p:cNvPr id="5" name="Straight Arrow Connector 4">
-            <a:extLst>
-              <a:ext uri="{FF2B5EF4-FFF2-40B4-BE49-F238E27FC236}">
-                <a16:creationId xmlns:a16="http://schemas.microsoft.com/office/drawing/2014/main" id="{98C532DE-7C1D-547A-A8EF-0B1FDD1B8CCE}"/>
-              </a:ext>
-            </a:extLst>
-          </p:cNvPr>
-          <p:cNvCxnSpPr>
-            <a:cxnSpLocks/>
-          </p:cNvCxnSpPr>
-          <p:nvPr/>
-        </p:nvCxnSpPr>
-        <p:spPr>
-          <a:xfrm>
-            <a:off x="4039800" y="1141921"/>
-            <a:ext cx="775855" cy="0"/>
-          </a:xfrm>
-          <a:prstGeom prst="straightConnector1">
-            <a:avLst/>
-          </a:prstGeom>
-          <a:ln w="57150">
-            <a:tailEnd type="triangle"/>
-          </a:ln>
-        </p:spPr>
-        <p:style>
-          <a:lnRef idx="2">
-            <a:schemeClr val="accent1"/>
-          </a:lnRef>
-          <a:fillRef idx="0">
-            <a:schemeClr val="accent1"/>
-          </a:fillRef>
-          <a:effectRef idx="1">
-            <a:schemeClr val="accent1"/>
-          </a:effectRef>
-          <a:fontRef idx="minor">
-            <a:schemeClr val="tx1"/>
-          </a:fontRef>
-        </p:style>
-      </p:cxnSp>
-      <p:sp>
-        <p:nvSpPr>
-          <p:cNvPr id="8" name="TextBox 7">
-            <a:extLst>
-              <a:ext uri="{FF2B5EF4-FFF2-40B4-BE49-F238E27FC236}">
-                <a16:creationId xmlns:a16="http://schemas.microsoft.com/office/drawing/2014/main" id="{7A5DC2D1-0E45-354A-957C-A95CE65F9F6B}"/>
-              </a:ext>
-            </a:extLst>
-          </p:cNvPr>
-          <p:cNvSpPr txBox="1"/>
-          <p:nvPr/>
-        </p:nvSpPr>
-        <p:spPr>
-          <a:xfrm>
-            <a:off x="595652" y="3244334"/>
-            <a:ext cx="3135099" cy="369332"/>
-          </a:xfrm>
-          <a:prstGeom prst="rect">
-            <a:avLst/>
-          </a:prstGeom>
-          <a:noFill/>
-          <a:ln w="12700" cap="rnd">
-            <a:solidFill>
-              <a:schemeClr val="accent1"/>
-            </a:solidFill>
-          </a:ln>
-        </p:spPr>
-        <p:txBody>
-          <a:bodyPr wrap="square" rtlCol="0">
-            <a:spAutoFit/>
-          </a:bodyPr>
-          <a:lstStyle/>
-          <a:p>
-            <a:r>
-              <a:rPr lang="en-US" dirty="0"/>
-              <a:t>Map Visuals </a:t>
-            </a:r>
-          </a:p>
-        </p:txBody>
-      </p:sp>
-      <p:sp>
-        <p:nvSpPr>
-          <p:cNvPr id="9" name="TextBox 8">
-            <a:extLst>
-              <a:ext uri="{FF2B5EF4-FFF2-40B4-BE49-F238E27FC236}">
-                <a16:creationId xmlns:a16="http://schemas.microsoft.com/office/drawing/2014/main" id="{40AD61F9-3B82-93B7-F6A4-848FFCD490F5}"/>
-              </a:ext>
-            </a:extLst>
-          </p:cNvPr>
-          <p:cNvSpPr txBox="1"/>
-          <p:nvPr/>
-        </p:nvSpPr>
-        <p:spPr>
-          <a:xfrm>
-            <a:off x="4919472" y="2129728"/>
-            <a:ext cx="6510528" cy="2677656"/>
-          </a:xfrm>
-          <a:prstGeom prst="rect">
-            <a:avLst/>
-          </a:prstGeom>
-          <a:noFill/>
-          <a:ln w="12700" cap="rnd">
-            <a:solidFill>
-              <a:schemeClr val="accent1"/>
-            </a:solidFill>
-          </a:ln>
-        </p:spPr>
-        <p:txBody>
-          <a:bodyPr wrap="square" rtlCol="0">
-            <a:spAutoFit/>
-          </a:bodyPr>
-          <a:lstStyle>
-            <a:defPPr>
-              <a:defRPr lang="en-US"/>
-            </a:defPPr>
-            <a:lvl1pPr>
-              <a:defRPr/>
-            </a:lvl1pPr>
-          </a:lstStyle>
-          <a:p>
-            <a:r>
-              <a:rPr lang="en-US" sz="1200" b="0" dirty="0">
-                <a:solidFill>
-                  <a:srgbClr val="6A9955"/>
-                </a:solidFill>
-                <a:effectLst/>
-                <a:highlight>
-                  <a:srgbClr val="1E1E1E"/>
-                </a:highlight>
-                <a:latin typeface="Consolas" panose="020B0609020204030204" pitchFamily="49" charset="0"/>
-              </a:rPr>
-              <a:t>&lt;!-- Leaflet CSS --&gt;</a:t>
-            </a:r>
-            <a:endParaRPr lang="en-US" sz="1200" b="0" dirty="0">
-              <a:solidFill>
-                <a:srgbClr val="D4D4D4"/>
-              </a:solidFill>
-              <a:effectLst/>
-              <a:highlight>
-                <a:srgbClr val="1E1E1E"/>
-              </a:highlight>
-              <a:latin typeface="Consolas" panose="020B0609020204030204" pitchFamily="49" charset="0"/>
-            </a:endParaRPr>
-          </a:p>
-          <a:p>
-            <a:r>
-              <a:rPr lang="en-US" sz="1200" b="0" dirty="0">
-                <a:solidFill>
-                  <a:srgbClr val="D4D4D4"/>
-                </a:solidFill>
-                <a:effectLst/>
-                <a:highlight>
-                  <a:srgbClr val="1E1E1E"/>
-                </a:highlight>
-                <a:latin typeface="Consolas" panose="020B0609020204030204" pitchFamily="49" charset="0"/>
-              </a:rPr>
-              <a:t>  </a:t>
-            </a:r>
-            <a:r>
-              <a:rPr lang="en-US" sz="1200" b="0" dirty="0">
-                <a:solidFill>
-                  <a:srgbClr val="808080"/>
-                </a:solidFill>
-                <a:effectLst/>
-                <a:highlight>
-                  <a:srgbClr val="1E1E1E"/>
-                </a:highlight>
-                <a:latin typeface="Consolas" panose="020B0609020204030204" pitchFamily="49" charset="0"/>
-              </a:rPr>
-              <a:t>&lt;</a:t>
-            </a:r>
-            <a:r>
-              <a:rPr lang="en-US" sz="1200" b="0" dirty="0">
-                <a:solidFill>
-                  <a:srgbClr val="569CD6"/>
-                </a:solidFill>
-                <a:effectLst/>
-                <a:highlight>
-                  <a:srgbClr val="1E1E1E"/>
-                </a:highlight>
-                <a:latin typeface="Consolas" panose="020B0609020204030204" pitchFamily="49" charset="0"/>
-              </a:rPr>
-              <a:t>link</a:t>
-            </a:r>
-            <a:r>
-              <a:rPr lang="en-US" sz="1200" b="0" dirty="0">
-                <a:solidFill>
-                  <a:srgbClr val="D4D4D4"/>
-                </a:solidFill>
-                <a:effectLst/>
-                <a:highlight>
-                  <a:srgbClr val="1E1E1E"/>
-                </a:highlight>
-                <a:latin typeface="Consolas" panose="020B0609020204030204" pitchFamily="49" charset="0"/>
-              </a:rPr>
-              <a:t> </a:t>
-            </a:r>
-            <a:r>
-              <a:rPr lang="en-US" sz="1200" b="0" dirty="0" err="1">
-                <a:solidFill>
-                  <a:srgbClr val="9CDCFE"/>
-                </a:solidFill>
-                <a:effectLst/>
-                <a:highlight>
-                  <a:srgbClr val="1E1E1E"/>
-                </a:highlight>
-                <a:latin typeface="Consolas" panose="020B0609020204030204" pitchFamily="49" charset="0"/>
-              </a:rPr>
-              <a:t>rel</a:t>
-            </a:r>
-            <a:r>
-              <a:rPr lang="en-US" sz="1200" b="0" dirty="0">
-                <a:solidFill>
-                  <a:srgbClr val="D4D4D4"/>
-                </a:solidFill>
-                <a:effectLst/>
-                <a:highlight>
-                  <a:srgbClr val="1E1E1E"/>
-                </a:highlight>
-                <a:latin typeface="Consolas" panose="020B0609020204030204" pitchFamily="49" charset="0"/>
-              </a:rPr>
-              <a:t>=</a:t>
-            </a:r>
-            <a:r>
-              <a:rPr lang="en-US" sz="1200" b="0" dirty="0">
-                <a:solidFill>
-                  <a:srgbClr val="CE9178"/>
-                </a:solidFill>
-                <a:effectLst/>
-                <a:highlight>
-                  <a:srgbClr val="1E1E1E"/>
-                </a:highlight>
-                <a:latin typeface="Consolas" panose="020B0609020204030204" pitchFamily="49" charset="0"/>
-              </a:rPr>
-              <a:t>"stylesheet"</a:t>
-            </a:r>
-            <a:r>
-              <a:rPr lang="en-US" sz="1200" b="0" dirty="0">
-                <a:solidFill>
-                  <a:srgbClr val="D4D4D4"/>
-                </a:solidFill>
-                <a:effectLst/>
-                <a:highlight>
-                  <a:srgbClr val="1E1E1E"/>
-                </a:highlight>
-                <a:latin typeface="Consolas" panose="020B0609020204030204" pitchFamily="49" charset="0"/>
-              </a:rPr>
-              <a:t>  </a:t>
-            </a:r>
-            <a:r>
-              <a:rPr lang="en-US" sz="1200" b="0" dirty="0" err="1">
-                <a:solidFill>
-                  <a:srgbClr val="9CDCFE"/>
-                </a:solidFill>
-                <a:effectLst/>
-                <a:highlight>
-                  <a:srgbClr val="1E1E1E"/>
-                </a:highlight>
-                <a:latin typeface="Consolas" panose="020B0609020204030204" pitchFamily="49" charset="0"/>
-              </a:rPr>
-              <a:t>href</a:t>
-            </a:r>
-            <a:r>
-              <a:rPr lang="en-US" sz="1200" b="0" dirty="0">
-                <a:solidFill>
-                  <a:srgbClr val="D4D4D4"/>
-                </a:solidFill>
-                <a:effectLst/>
-                <a:highlight>
-                  <a:srgbClr val="1E1E1E"/>
-                </a:highlight>
-                <a:latin typeface="Consolas" panose="020B0609020204030204" pitchFamily="49" charset="0"/>
-              </a:rPr>
-              <a:t>=</a:t>
-            </a:r>
-            <a:r>
-              <a:rPr lang="en-US" sz="1200" b="0" dirty="0">
-                <a:solidFill>
-                  <a:srgbClr val="CE9178"/>
-                </a:solidFill>
-                <a:effectLst/>
-                <a:highlight>
-                  <a:srgbClr val="1E1E1E"/>
-                </a:highlight>
-                <a:latin typeface="Consolas" panose="020B0609020204030204" pitchFamily="49" charset="0"/>
-              </a:rPr>
-              <a:t>"https://unpkg.com/leaflet@1.9.4/</a:t>
-            </a:r>
-            <a:r>
-              <a:rPr lang="en-US" sz="1200" b="0" dirty="0" err="1">
-                <a:solidFill>
-                  <a:srgbClr val="CE9178"/>
-                </a:solidFill>
-                <a:effectLst/>
-                <a:highlight>
-                  <a:srgbClr val="1E1E1E"/>
-                </a:highlight>
-                <a:latin typeface="Consolas" panose="020B0609020204030204" pitchFamily="49" charset="0"/>
-              </a:rPr>
-              <a:t>dist</a:t>
-            </a:r>
-            <a:r>
-              <a:rPr lang="en-US" sz="1200" b="0" dirty="0">
-                <a:solidFill>
-                  <a:srgbClr val="CE9178"/>
-                </a:solidFill>
-                <a:effectLst/>
-                <a:highlight>
-                  <a:srgbClr val="1E1E1E"/>
-                </a:highlight>
-                <a:latin typeface="Consolas" panose="020B0609020204030204" pitchFamily="49" charset="0"/>
-              </a:rPr>
-              <a:t>/leaflet.css"</a:t>
-            </a:r>
-            <a:endParaRPr lang="en-US" sz="1200" b="0" dirty="0">
-              <a:solidFill>
-                <a:srgbClr val="D4D4D4"/>
-              </a:solidFill>
-              <a:effectLst/>
-              <a:highlight>
-                <a:srgbClr val="1E1E1E"/>
-              </a:highlight>
-              <a:latin typeface="Consolas" panose="020B0609020204030204" pitchFamily="49" charset="0"/>
-            </a:endParaRPr>
-          </a:p>
-          <a:p>
-            <a:r>
-              <a:rPr lang="en-US" sz="1200" b="0" dirty="0">
-                <a:solidFill>
-                  <a:srgbClr val="D4D4D4"/>
-                </a:solidFill>
-                <a:effectLst/>
-                <a:highlight>
-                  <a:srgbClr val="1E1E1E"/>
-                </a:highlight>
-                <a:latin typeface="Consolas" panose="020B0609020204030204" pitchFamily="49" charset="0"/>
-              </a:rPr>
-              <a:t>    </a:t>
-            </a:r>
-            <a:r>
-              <a:rPr lang="en-US" sz="1200" b="0" dirty="0">
-                <a:solidFill>
-                  <a:srgbClr val="9CDCFE"/>
-                </a:solidFill>
-                <a:effectLst/>
-                <a:highlight>
-                  <a:srgbClr val="1E1E1E"/>
-                </a:highlight>
-                <a:latin typeface="Consolas" panose="020B0609020204030204" pitchFamily="49" charset="0"/>
-              </a:rPr>
-              <a:t>integrity</a:t>
-            </a:r>
-            <a:r>
-              <a:rPr lang="en-US" sz="1200" b="0" dirty="0">
-                <a:solidFill>
-                  <a:srgbClr val="D4D4D4"/>
-                </a:solidFill>
-                <a:effectLst/>
-                <a:highlight>
-                  <a:srgbClr val="1E1E1E"/>
-                </a:highlight>
-                <a:latin typeface="Consolas" panose="020B0609020204030204" pitchFamily="49" charset="0"/>
-              </a:rPr>
-              <a:t>=</a:t>
-            </a:r>
-            <a:r>
-              <a:rPr lang="en-US" sz="1200" b="0" dirty="0">
-                <a:solidFill>
-                  <a:srgbClr val="CE9178"/>
-                </a:solidFill>
-                <a:effectLst/>
-                <a:highlight>
-                  <a:srgbClr val="1E1E1E"/>
-                </a:highlight>
-                <a:latin typeface="Consolas" panose="020B0609020204030204" pitchFamily="49" charset="0"/>
-              </a:rPr>
-              <a:t>"sha256-p4NxAoJBhIIN+hmNHrzRCf9tD/miZyoHS5obTRR9BMY="</a:t>
-            </a:r>
-            <a:endParaRPr lang="en-US" sz="1200" b="0" dirty="0">
-              <a:solidFill>
-                <a:srgbClr val="D4D4D4"/>
-              </a:solidFill>
-              <a:effectLst/>
-              <a:highlight>
-                <a:srgbClr val="1E1E1E"/>
-              </a:highlight>
-              <a:latin typeface="Consolas" panose="020B0609020204030204" pitchFamily="49" charset="0"/>
-            </a:endParaRPr>
-          </a:p>
-          <a:p>
-            <a:r>
-              <a:rPr lang="en-US" sz="1200" b="0" dirty="0">
-                <a:solidFill>
-                  <a:srgbClr val="D4D4D4"/>
-                </a:solidFill>
-                <a:effectLst/>
-                <a:highlight>
-                  <a:srgbClr val="1E1E1E"/>
-                </a:highlight>
-                <a:latin typeface="Consolas" panose="020B0609020204030204" pitchFamily="49" charset="0"/>
-              </a:rPr>
-              <a:t>    </a:t>
-            </a:r>
-            <a:r>
-              <a:rPr lang="en-US" sz="1200" b="0" dirty="0" err="1">
-                <a:solidFill>
-                  <a:srgbClr val="9CDCFE"/>
-                </a:solidFill>
-                <a:effectLst/>
-                <a:highlight>
-                  <a:srgbClr val="1E1E1E"/>
-                </a:highlight>
-                <a:latin typeface="Consolas" panose="020B0609020204030204" pitchFamily="49" charset="0"/>
-              </a:rPr>
-              <a:t>crossorigin</a:t>
-            </a:r>
-            <a:r>
-              <a:rPr lang="en-US" sz="1200" b="0" dirty="0">
-                <a:solidFill>
-                  <a:srgbClr val="D4D4D4"/>
-                </a:solidFill>
-                <a:effectLst/>
-                <a:highlight>
-                  <a:srgbClr val="1E1E1E"/>
-                </a:highlight>
-                <a:latin typeface="Consolas" panose="020B0609020204030204" pitchFamily="49" charset="0"/>
-              </a:rPr>
-              <a:t>=</a:t>
-            </a:r>
-            <a:r>
-              <a:rPr lang="en-US" sz="1200" b="0" dirty="0">
-                <a:solidFill>
-                  <a:srgbClr val="CE9178"/>
-                </a:solidFill>
-                <a:effectLst/>
-                <a:highlight>
-                  <a:srgbClr val="1E1E1E"/>
-                </a:highlight>
-                <a:latin typeface="Consolas" panose="020B0609020204030204" pitchFamily="49" charset="0"/>
-              </a:rPr>
-              <a:t>""</a:t>
-            </a:r>
-            <a:r>
-              <a:rPr lang="en-US" sz="1200" b="0" dirty="0">
-                <a:solidFill>
-                  <a:srgbClr val="D4D4D4"/>
-                </a:solidFill>
-                <a:effectLst/>
-                <a:highlight>
-                  <a:srgbClr val="1E1E1E"/>
-                </a:highlight>
-                <a:latin typeface="Consolas" panose="020B0609020204030204" pitchFamily="49" charset="0"/>
-              </a:rPr>
-              <a:t> </a:t>
-            </a:r>
-            <a:r>
-              <a:rPr lang="en-US" sz="1200" b="0" dirty="0">
-                <a:solidFill>
-                  <a:srgbClr val="808080"/>
-                </a:solidFill>
-                <a:effectLst/>
-                <a:highlight>
-                  <a:srgbClr val="1E1E1E"/>
-                </a:highlight>
-                <a:latin typeface="Consolas" panose="020B0609020204030204" pitchFamily="49" charset="0"/>
-              </a:rPr>
-              <a:t>/&gt;</a:t>
-            </a:r>
-            <a:endParaRPr lang="en-US" sz="1200" b="0" dirty="0">
-              <a:solidFill>
-                <a:srgbClr val="D4D4D4"/>
-              </a:solidFill>
-              <a:effectLst/>
-              <a:highlight>
-                <a:srgbClr val="1E1E1E"/>
-              </a:highlight>
-              <a:latin typeface="Consolas" panose="020B0609020204030204" pitchFamily="49" charset="0"/>
-            </a:endParaRPr>
-          </a:p>
-          <a:p>
-            <a:r>
-              <a:rPr lang="en-US" sz="1200" b="0" dirty="0">
-                <a:solidFill>
-                  <a:srgbClr val="D4D4D4"/>
-                </a:solidFill>
-                <a:effectLst/>
-                <a:highlight>
-                  <a:srgbClr val="1E1E1E"/>
-                </a:highlight>
-                <a:latin typeface="Consolas" panose="020B0609020204030204" pitchFamily="49" charset="0"/>
-              </a:rPr>
-              <a:t>  </a:t>
-            </a:r>
-          </a:p>
-          <a:p>
-            <a:r>
-              <a:rPr lang="en-US" sz="1200" b="0" dirty="0">
-                <a:solidFill>
-                  <a:srgbClr val="D4D4D4"/>
-                </a:solidFill>
-                <a:effectLst/>
-                <a:highlight>
-                  <a:srgbClr val="1E1E1E"/>
-                </a:highlight>
-                <a:latin typeface="Consolas" panose="020B0609020204030204" pitchFamily="49" charset="0"/>
-              </a:rPr>
-              <a:t>  </a:t>
-            </a:r>
-            <a:r>
-              <a:rPr lang="en-US" sz="1200" b="0" dirty="0">
-                <a:solidFill>
-                  <a:srgbClr val="6A9955"/>
-                </a:solidFill>
-                <a:effectLst/>
-                <a:highlight>
-                  <a:srgbClr val="1E1E1E"/>
-                </a:highlight>
-                <a:latin typeface="Consolas" panose="020B0609020204030204" pitchFamily="49" charset="0"/>
-              </a:rPr>
-              <a:t>&lt;!-- Leaflet JavaScript code --&gt;</a:t>
-            </a:r>
-            <a:endParaRPr lang="en-US" sz="1200" b="0" dirty="0">
-              <a:solidFill>
-                <a:srgbClr val="D4D4D4"/>
-              </a:solidFill>
-              <a:effectLst/>
-              <a:highlight>
-                <a:srgbClr val="1E1E1E"/>
-              </a:highlight>
-              <a:latin typeface="Consolas" panose="020B0609020204030204" pitchFamily="49" charset="0"/>
-            </a:endParaRPr>
-          </a:p>
-          <a:p>
-            <a:r>
-              <a:rPr lang="en-US" sz="1200" b="0" dirty="0">
-                <a:solidFill>
-                  <a:srgbClr val="D4D4D4"/>
-                </a:solidFill>
-                <a:effectLst/>
-                <a:highlight>
-                  <a:srgbClr val="1E1E1E"/>
-                </a:highlight>
-                <a:latin typeface="Consolas" panose="020B0609020204030204" pitchFamily="49" charset="0"/>
-              </a:rPr>
-              <a:t>  </a:t>
-            </a:r>
-            <a:r>
-              <a:rPr lang="en-US" sz="1200" b="0" dirty="0">
-                <a:solidFill>
-                  <a:srgbClr val="808080"/>
-                </a:solidFill>
-                <a:effectLst/>
-                <a:highlight>
-                  <a:srgbClr val="1E1E1E"/>
-                </a:highlight>
-                <a:latin typeface="Consolas" panose="020B0609020204030204" pitchFamily="49" charset="0"/>
-              </a:rPr>
-              <a:t>&lt;</a:t>
-            </a:r>
-            <a:r>
-              <a:rPr lang="en-US" sz="1200" b="0" dirty="0">
-                <a:solidFill>
-                  <a:srgbClr val="569CD6"/>
-                </a:solidFill>
-                <a:effectLst/>
-                <a:highlight>
-                  <a:srgbClr val="1E1E1E"/>
-                </a:highlight>
-                <a:latin typeface="Consolas" panose="020B0609020204030204" pitchFamily="49" charset="0"/>
-              </a:rPr>
-              <a:t>script</a:t>
-            </a:r>
-            <a:r>
-              <a:rPr lang="en-US" sz="1200" b="0" dirty="0">
-                <a:solidFill>
-                  <a:srgbClr val="D4D4D4"/>
-                </a:solidFill>
-                <a:effectLst/>
-                <a:highlight>
-                  <a:srgbClr val="1E1E1E"/>
-                </a:highlight>
-                <a:latin typeface="Consolas" panose="020B0609020204030204" pitchFamily="49" charset="0"/>
-              </a:rPr>
-              <a:t> </a:t>
-            </a:r>
-            <a:r>
-              <a:rPr lang="en-US" sz="1200" b="0" dirty="0" err="1">
-                <a:solidFill>
-                  <a:srgbClr val="9CDCFE"/>
-                </a:solidFill>
-                <a:effectLst/>
-                <a:highlight>
-                  <a:srgbClr val="1E1E1E"/>
-                </a:highlight>
-                <a:latin typeface="Consolas" panose="020B0609020204030204" pitchFamily="49" charset="0"/>
-              </a:rPr>
-              <a:t>src</a:t>
-            </a:r>
-            <a:r>
-              <a:rPr lang="en-US" sz="1200" b="0" dirty="0">
-                <a:solidFill>
-                  <a:srgbClr val="D4D4D4"/>
-                </a:solidFill>
-                <a:effectLst/>
-                <a:highlight>
-                  <a:srgbClr val="1E1E1E"/>
-                </a:highlight>
-                <a:latin typeface="Consolas" panose="020B0609020204030204" pitchFamily="49" charset="0"/>
-              </a:rPr>
-              <a:t>=</a:t>
-            </a:r>
-            <a:r>
-              <a:rPr lang="en-US" sz="1200" b="0" dirty="0">
-                <a:solidFill>
-                  <a:srgbClr val="CE9178"/>
-                </a:solidFill>
-                <a:effectLst/>
-                <a:highlight>
-                  <a:srgbClr val="1E1E1E"/>
-                </a:highlight>
-                <a:latin typeface="Consolas" panose="020B0609020204030204" pitchFamily="49" charset="0"/>
-              </a:rPr>
-              <a:t>"https://unpkg.com/leaflet@1.9.4/</a:t>
-            </a:r>
-            <a:r>
-              <a:rPr lang="en-US" sz="1200" b="0" dirty="0" err="1">
-                <a:solidFill>
-                  <a:srgbClr val="CE9178"/>
-                </a:solidFill>
-                <a:effectLst/>
-                <a:highlight>
-                  <a:srgbClr val="1E1E1E"/>
-                </a:highlight>
-                <a:latin typeface="Consolas" panose="020B0609020204030204" pitchFamily="49" charset="0"/>
-              </a:rPr>
-              <a:t>dist</a:t>
-            </a:r>
-            <a:r>
-              <a:rPr lang="en-US" sz="1200" b="0" dirty="0">
-                <a:solidFill>
-                  <a:srgbClr val="CE9178"/>
-                </a:solidFill>
-                <a:effectLst/>
-                <a:highlight>
-                  <a:srgbClr val="1E1E1E"/>
-                </a:highlight>
-                <a:latin typeface="Consolas" panose="020B0609020204030204" pitchFamily="49" charset="0"/>
-              </a:rPr>
-              <a:t>/leaflet.js"</a:t>
-            </a:r>
-            <a:endParaRPr lang="en-US" sz="1200" b="0" dirty="0">
-              <a:solidFill>
-                <a:srgbClr val="D4D4D4"/>
-              </a:solidFill>
-              <a:effectLst/>
-              <a:highlight>
-                <a:srgbClr val="1E1E1E"/>
-              </a:highlight>
-              <a:latin typeface="Consolas" panose="020B0609020204030204" pitchFamily="49" charset="0"/>
-            </a:endParaRPr>
-          </a:p>
-          <a:p>
-            <a:r>
-              <a:rPr lang="en-US" sz="1200" b="0" dirty="0">
-                <a:solidFill>
-                  <a:srgbClr val="D4D4D4"/>
-                </a:solidFill>
-                <a:effectLst/>
-                <a:highlight>
-                  <a:srgbClr val="1E1E1E"/>
-                </a:highlight>
-                <a:latin typeface="Consolas" panose="020B0609020204030204" pitchFamily="49" charset="0"/>
-              </a:rPr>
-              <a:t>    </a:t>
-            </a:r>
-            <a:r>
-              <a:rPr lang="en-US" sz="1200" b="0" dirty="0">
-                <a:solidFill>
-                  <a:srgbClr val="9CDCFE"/>
-                </a:solidFill>
-                <a:effectLst/>
-                <a:highlight>
-                  <a:srgbClr val="1E1E1E"/>
-                </a:highlight>
-                <a:latin typeface="Consolas" panose="020B0609020204030204" pitchFamily="49" charset="0"/>
-              </a:rPr>
-              <a:t>integrity</a:t>
-            </a:r>
-            <a:r>
-              <a:rPr lang="en-US" sz="1200" b="0" dirty="0">
-                <a:solidFill>
-                  <a:srgbClr val="D4D4D4"/>
-                </a:solidFill>
-                <a:effectLst/>
-                <a:highlight>
-                  <a:srgbClr val="1E1E1E"/>
-                </a:highlight>
-                <a:latin typeface="Consolas" panose="020B0609020204030204" pitchFamily="49" charset="0"/>
-              </a:rPr>
-              <a:t>=</a:t>
-            </a:r>
-            <a:r>
-              <a:rPr lang="en-US" sz="1200" b="0" dirty="0">
-                <a:solidFill>
-                  <a:srgbClr val="CE9178"/>
-                </a:solidFill>
-                <a:effectLst/>
-                <a:highlight>
-                  <a:srgbClr val="1E1E1E"/>
-                </a:highlight>
-                <a:latin typeface="Consolas" panose="020B0609020204030204" pitchFamily="49" charset="0"/>
-              </a:rPr>
-              <a:t>"sha256-20nQCchB9co0qIjJZRGuk2/Z9VM+kNiyxNV1lvTlZBo="</a:t>
-            </a:r>
-            <a:endParaRPr lang="en-US" sz="1200" b="0" dirty="0">
-              <a:solidFill>
-                <a:srgbClr val="D4D4D4"/>
-              </a:solidFill>
-              <a:effectLst/>
-              <a:highlight>
-                <a:srgbClr val="1E1E1E"/>
-              </a:highlight>
-              <a:latin typeface="Consolas" panose="020B0609020204030204" pitchFamily="49" charset="0"/>
-            </a:endParaRPr>
-          </a:p>
-          <a:p>
-            <a:r>
-              <a:rPr lang="en-US" sz="1200" b="0" dirty="0">
-                <a:solidFill>
-                  <a:srgbClr val="D4D4D4"/>
-                </a:solidFill>
-                <a:effectLst/>
-                <a:highlight>
-                  <a:srgbClr val="1E1E1E"/>
-                </a:highlight>
-                <a:latin typeface="Consolas" panose="020B0609020204030204" pitchFamily="49" charset="0"/>
-              </a:rPr>
-              <a:t>    </a:t>
-            </a:r>
-            <a:r>
-              <a:rPr lang="en-US" sz="1200" b="0" dirty="0" err="1">
-                <a:solidFill>
-                  <a:srgbClr val="9CDCFE"/>
-                </a:solidFill>
-                <a:effectLst/>
-                <a:highlight>
-                  <a:srgbClr val="1E1E1E"/>
-                </a:highlight>
-                <a:latin typeface="Consolas" panose="020B0609020204030204" pitchFamily="49" charset="0"/>
-              </a:rPr>
-              <a:t>crossorigin</a:t>
-            </a:r>
-            <a:r>
-              <a:rPr lang="en-US" sz="1200" b="0" dirty="0">
-                <a:solidFill>
-                  <a:srgbClr val="D4D4D4"/>
-                </a:solidFill>
-                <a:effectLst/>
-                <a:highlight>
-                  <a:srgbClr val="1E1E1E"/>
-                </a:highlight>
-                <a:latin typeface="Consolas" panose="020B0609020204030204" pitchFamily="49" charset="0"/>
-              </a:rPr>
-              <a:t>=</a:t>
-            </a:r>
-            <a:r>
-              <a:rPr lang="en-US" sz="1200" b="0" dirty="0">
-                <a:solidFill>
-                  <a:srgbClr val="CE9178"/>
-                </a:solidFill>
-                <a:effectLst/>
-                <a:highlight>
-                  <a:srgbClr val="1E1E1E"/>
-                </a:highlight>
-                <a:latin typeface="Consolas" panose="020B0609020204030204" pitchFamily="49" charset="0"/>
-              </a:rPr>
-              <a:t>""</a:t>
-            </a:r>
-            <a:r>
-              <a:rPr lang="en-US" sz="1200" b="0" dirty="0">
-                <a:solidFill>
-                  <a:srgbClr val="808080"/>
-                </a:solidFill>
-                <a:effectLst/>
-                <a:highlight>
-                  <a:srgbClr val="1E1E1E"/>
-                </a:highlight>
-                <a:latin typeface="Consolas" panose="020B0609020204030204" pitchFamily="49" charset="0"/>
-              </a:rPr>
-              <a:t>&gt;&lt;/</a:t>
-            </a:r>
-            <a:r>
-              <a:rPr lang="en-US" sz="1200" b="0" dirty="0">
-                <a:solidFill>
-                  <a:srgbClr val="569CD6"/>
-                </a:solidFill>
-                <a:effectLst/>
-                <a:highlight>
-                  <a:srgbClr val="1E1E1E"/>
-                </a:highlight>
-                <a:latin typeface="Consolas" panose="020B0609020204030204" pitchFamily="49" charset="0"/>
-              </a:rPr>
-              <a:t>script</a:t>
-            </a:r>
-            <a:r>
-              <a:rPr lang="en-US" sz="1200" b="0" dirty="0">
-                <a:solidFill>
-                  <a:srgbClr val="808080"/>
-                </a:solidFill>
-                <a:effectLst/>
-                <a:highlight>
-                  <a:srgbClr val="1E1E1E"/>
-                </a:highlight>
-                <a:latin typeface="Consolas" panose="020B0609020204030204" pitchFamily="49" charset="0"/>
-              </a:rPr>
-              <a:t>&gt;</a:t>
-            </a:r>
-            <a:endParaRPr lang="en-US" sz="1200" b="0" dirty="0">
-              <a:solidFill>
-                <a:srgbClr val="D4D4D4"/>
-              </a:solidFill>
-              <a:effectLst/>
-              <a:highlight>
-                <a:srgbClr val="1E1E1E"/>
-              </a:highlight>
-              <a:latin typeface="Consolas" panose="020B0609020204030204" pitchFamily="49" charset="0"/>
-            </a:endParaRPr>
-          </a:p>
-          <a:p>
-            <a:br>
-              <a:rPr lang="en-US" sz="1200" b="0" dirty="0">
-                <a:solidFill>
-                  <a:srgbClr val="D4D4D4"/>
-                </a:solidFill>
-                <a:effectLst/>
-                <a:highlight>
-                  <a:srgbClr val="1E1E1E"/>
-                </a:highlight>
-                <a:latin typeface="Consolas" panose="020B0609020204030204" pitchFamily="49" charset="0"/>
-              </a:rPr>
-            </a:br>
-            <a:r>
-              <a:rPr lang="en-US" sz="1200" b="0" dirty="0">
-                <a:solidFill>
-                  <a:srgbClr val="D4D4D4"/>
-                </a:solidFill>
-                <a:effectLst/>
-                <a:highlight>
-                  <a:srgbClr val="1E1E1E"/>
-                </a:highlight>
-                <a:latin typeface="Consolas" panose="020B0609020204030204" pitchFamily="49" charset="0"/>
-              </a:rPr>
-              <a:t>    </a:t>
-            </a:r>
-            <a:r>
-              <a:rPr lang="en-US" sz="1200" b="0" dirty="0">
-                <a:solidFill>
-                  <a:srgbClr val="6A9955"/>
-                </a:solidFill>
-                <a:effectLst/>
-                <a:highlight>
-                  <a:srgbClr val="1E1E1E"/>
-                </a:highlight>
-                <a:latin typeface="Consolas" panose="020B0609020204030204" pitchFamily="49" charset="0"/>
-              </a:rPr>
-              <a:t>&lt;!-- leaflet-choropleth JavaScript --&gt;</a:t>
-            </a:r>
-            <a:endParaRPr lang="en-US" sz="1200" b="0" dirty="0">
-              <a:solidFill>
-                <a:srgbClr val="D4D4D4"/>
-              </a:solidFill>
-              <a:effectLst/>
-              <a:highlight>
-                <a:srgbClr val="1E1E1E"/>
-              </a:highlight>
-              <a:latin typeface="Consolas" panose="020B0609020204030204" pitchFamily="49" charset="0"/>
-            </a:endParaRPr>
-          </a:p>
-          <a:p>
-            <a:r>
-              <a:rPr lang="en-US" sz="1200" b="0" dirty="0">
-                <a:solidFill>
-                  <a:srgbClr val="D4D4D4"/>
-                </a:solidFill>
-                <a:effectLst/>
-                <a:highlight>
-                  <a:srgbClr val="1E1E1E"/>
-                </a:highlight>
-                <a:latin typeface="Consolas" panose="020B0609020204030204" pitchFamily="49" charset="0"/>
-              </a:rPr>
-              <a:t>    </a:t>
-            </a:r>
-            <a:r>
-              <a:rPr lang="en-US" sz="1200" b="0" dirty="0">
-                <a:solidFill>
-                  <a:srgbClr val="808080"/>
-                </a:solidFill>
-                <a:effectLst/>
-                <a:highlight>
-                  <a:srgbClr val="1E1E1E"/>
-                </a:highlight>
-                <a:latin typeface="Consolas" panose="020B0609020204030204" pitchFamily="49" charset="0"/>
-              </a:rPr>
-              <a:t>&lt;</a:t>
-            </a:r>
-            <a:r>
-              <a:rPr lang="en-US" sz="1200" b="0" dirty="0">
-                <a:solidFill>
-                  <a:srgbClr val="569CD6"/>
-                </a:solidFill>
-                <a:effectLst/>
-                <a:highlight>
-                  <a:srgbClr val="1E1E1E"/>
-                </a:highlight>
-                <a:latin typeface="Consolas" panose="020B0609020204030204" pitchFamily="49" charset="0"/>
-              </a:rPr>
-              <a:t>script</a:t>
-            </a:r>
-            <a:r>
-              <a:rPr lang="en-US" sz="1200" b="0" dirty="0">
-                <a:solidFill>
-                  <a:srgbClr val="D4D4D4"/>
-                </a:solidFill>
-                <a:effectLst/>
-                <a:highlight>
-                  <a:srgbClr val="1E1E1E"/>
-                </a:highlight>
-                <a:latin typeface="Consolas" panose="020B0609020204030204" pitchFamily="49" charset="0"/>
-              </a:rPr>
-              <a:t> </a:t>
-            </a:r>
-            <a:r>
-              <a:rPr lang="en-US" sz="1200" b="0" dirty="0">
-                <a:solidFill>
-                  <a:srgbClr val="9CDCFE"/>
-                </a:solidFill>
-                <a:effectLst/>
-                <a:highlight>
-                  <a:srgbClr val="1E1E1E"/>
-                </a:highlight>
-                <a:latin typeface="Consolas" panose="020B0609020204030204" pitchFamily="49" charset="0"/>
-              </a:rPr>
-              <a:t>type</a:t>
-            </a:r>
-            <a:r>
-              <a:rPr lang="en-US" sz="1200" b="0" dirty="0">
-                <a:solidFill>
-                  <a:srgbClr val="D4D4D4"/>
-                </a:solidFill>
-                <a:effectLst/>
-                <a:highlight>
-                  <a:srgbClr val="1E1E1E"/>
-                </a:highlight>
-                <a:latin typeface="Consolas" panose="020B0609020204030204" pitchFamily="49" charset="0"/>
-              </a:rPr>
-              <a:t>=</a:t>
-            </a:r>
-            <a:r>
-              <a:rPr lang="en-US" sz="1200" b="0" dirty="0">
-                <a:solidFill>
-                  <a:srgbClr val="CE9178"/>
-                </a:solidFill>
-                <a:effectLst/>
-                <a:highlight>
-                  <a:srgbClr val="1E1E1E"/>
-                </a:highlight>
-                <a:latin typeface="Consolas" panose="020B0609020204030204" pitchFamily="49" charset="0"/>
-              </a:rPr>
-              <a:t>"text/</a:t>
-            </a:r>
-            <a:r>
-              <a:rPr lang="en-US" sz="1200" b="0" dirty="0" err="1">
-                <a:solidFill>
-                  <a:srgbClr val="CE9178"/>
-                </a:solidFill>
-                <a:effectLst/>
-                <a:highlight>
-                  <a:srgbClr val="1E1E1E"/>
-                </a:highlight>
-                <a:latin typeface="Consolas" panose="020B0609020204030204" pitchFamily="49" charset="0"/>
-              </a:rPr>
-              <a:t>javascript</a:t>
-            </a:r>
-            <a:r>
-              <a:rPr lang="en-US" sz="1200" b="0" dirty="0">
-                <a:solidFill>
-                  <a:srgbClr val="CE9178"/>
-                </a:solidFill>
-                <a:effectLst/>
-                <a:highlight>
-                  <a:srgbClr val="1E1E1E"/>
-                </a:highlight>
-                <a:latin typeface="Consolas" panose="020B0609020204030204" pitchFamily="49" charset="0"/>
-              </a:rPr>
-              <a:t>"</a:t>
-            </a:r>
-            <a:r>
-              <a:rPr lang="en-US" sz="1200" b="0" dirty="0">
-                <a:solidFill>
-                  <a:srgbClr val="D4D4D4"/>
-                </a:solidFill>
-                <a:effectLst/>
-                <a:highlight>
-                  <a:srgbClr val="1E1E1E"/>
-                </a:highlight>
-                <a:latin typeface="Consolas" panose="020B0609020204030204" pitchFamily="49" charset="0"/>
-              </a:rPr>
-              <a:t> </a:t>
-            </a:r>
-            <a:r>
-              <a:rPr lang="en-US" sz="1200" b="0" dirty="0" err="1">
-                <a:solidFill>
-                  <a:srgbClr val="9CDCFE"/>
-                </a:solidFill>
-                <a:effectLst/>
-                <a:highlight>
-                  <a:srgbClr val="1E1E1E"/>
-                </a:highlight>
-                <a:latin typeface="Consolas" panose="020B0609020204030204" pitchFamily="49" charset="0"/>
-              </a:rPr>
-              <a:t>src</a:t>
-            </a:r>
-            <a:r>
-              <a:rPr lang="en-US" sz="1200" b="0" dirty="0">
-                <a:solidFill>
-                  <a:srgbClr val="D4D4D4"/>
-                </a:solidFill>
-                <a:effectLst/>
-                <a:highlight>
-                  <a:srgbClr val="1E1E1E"/>
-                </a:highlight>
-                <a:latin typeface="Consolas" panose="020B0609020204030204" pitchFamily="49" charset="0"/>
-              </a:rPr>
-              <a:t>=</a:t>
-            </a:r>
-            <a:r>
-              <a:rPr lang="en-US" sz="1200" b="0" dirty="0">
-                <a:solidFill>
-                  <a:srgbClr val="CE9178"/>
-                </a:solidFill>
-                <a:effectLst/>
-                <a:highlight>
-                  <a:srgbClr val="1E1E1E"/>
-                </a:highlight>
-                <a:latin typeface="Consolas" panose="020B0609020204030204" pitchFamily="49" charset="0"/>
-              </a:rPr>
-              <a:t>"static/</a:t>
-            </a:r>
-            <a:r>
-              <a:rPr lang="en-US" sz="1200" b="0" dirty="0" err="1">
-                <a:solidFill>
-                  <a:srgbClr val="CE9178"/>
-                </a:solidFill>
-                <a:effectLst/>
-                <a:highlight>
-                  <a:srgbClr val="1E1E1E"/>
-                </a:highlight>
-                <a:latin typeface="Consolas" panose="020B0609020204030204" pitchFamily="49" charset="0"/>
-              </a:rPr>
-              <a:t>js</a:t>
-            </a:r>
-            <a:r>
-              <a:rPr lang="en-US" sz="1200" b="0" dirty="0">
-                <a:solidFill>
-                  <a:srgbClr val="CE9178"/>
-                </a:solidFill>
-                <a:effectLst/>
-                <a:highlight>
-                  <a:srgbClr val="1E1E1E"/>
-                </a:highlight>
-                <a:latin typeface="Consolas" panose="020B0609020204030204" pitchFamily="49" charset="0"/>
-              </a:rPr>
-              <a:t>/choropleth.js"</a:t>
-            </a:r>
-            <a:r>
-              <a:rPr lang="en-US" sz="1200" b="0" dirty="0">
-                <a:solidFill>
-                  <a:srgbClr val="808080"/>
-                </a:solidFill>
-                <a:effectLst/>
-                <a:highlight>
-                  <a:srgbClr val="1E1E1E"/>
-                </a:highlight>
-                <a:latin typeface="Consolas" panose="020B0609020204030204" pitchFamily="49" charset="0"/>
-              </a:rPr>
-              <a:t>&gt;&lt;/</a:t>
-            </a:r>
-            <a:r>
-              <a:rPr lang="en-US" sz="1200" b="0" dirty="0">
-                <a:solidFill>
-                  <a:srgbClr val="569CD6"/>
-                </a:solidFill>
-                <a:effectLst/>
-                <a:highlight>
-                  <a:srgbClr val="1E1E1E"/>
-                </a:highlight>
-                <a:latin typeface="Consolas" panose="020B0609020204030204" pitchFamily="49" charset="0"/>
-              </a:rPr>
-              <a:t>script</a:t>
-            </a:r>
-            <a:r>
-              <a:rPr lang="en-US" sz="1200" b="0" dirty="0">
-                <a:solidFill>
-                  <a:srgbClr val="808080"/>
-                </a:solidFill>
-                <a:effectLst/>
-                <a:highlight>
-                  <a:srgbClr val="1E1E1E"/>
-                </a:highlight>
-                <a:latin typeface="Consolas" panose="020B0609020204030204" pitchFamily="49" charset="0"/>
-              </a:rPr>
-              <a:t>&gt;</a:t>
-            </a:r>
-            <a:endParaRPr lang="en-US" sz="1200" b="0" dirty="0">
-              <a:solidFill>
-                <a:srgbClr val="D4D4D4"/>
-              </a:solidFill>
-              <a:effectLst/>
-              <a:highlight>
-                <a:srgbClr val="1E1E1E"/>
-              </a:highlight>
-              <a:latin typeface="Consolas" panose="020B0609020204030204" pitchFamily="49" charset="0"/>
-            </a:endParaRPr>
-          </a:p>
-          <a:p>
-            <a:endParaRPr lang="en-US" sz="1200" b="0" dirty="0">
-              <a:solidFill>
-                <a:srgbClr val="D4D4D4"/>
-              </a:solidFill>
-              <a:effectLst/>
-              <a:highlight>
-                <a:srgbClr val="1E1E1E"/>
-              </a:highlight>
-              <a:latin typeface="Consolas" panose="020B0609020204030204" pitchFamily="49" charset="0"/>
-            </a:endParaRPr>
-          </a:p>
-        </p:txBody>
-      </p:sp>
-      <p:cxnSp>
-        <p:nvCxnSpPr>
-          <p:cNvPr id="10" name="Straight Arrow Connector 9">
-            <a:extLst>
-              <a:ext uri="{FF2B5EF4-FFF2-40B4-BE49-F238E27FC236}">
-                <a16:creationId xmlns:a16="http://schemas.microsoft.com/office/drawing/2014/main" id="{A57A47EE-C1B9-57B0-0FDC-E3D611309A21}"/>
-              </a:ext>
-            </a:extLst>
-          </p:cNvPr>
-          <p:cNvCxnSpPr>
-            <a:cxnSpLocks/>
-          </p:cNvCxnSpPr>
-          <p:nvPr/>
-        </p:nvCxnSpPr>
-        <p:spPr>
-          <a:xfrm>
-            <a:off x="3956673" y="3405042"/>
-            <a:ext cx="775855" cy="0"/>
-          </a:xfrm>
-          <a:prstGeom prst="straightConnector1">
-            <a:avLst/>
-          </a:prstGeom>
-          <a:ln w="57150">
-            <a:tailEnd type="triangle"/>
-          </a:ln>
-        </p:spPr>
-        <p:style>
-          <a:lnRef idx="2">
-            <a:schemeClr val="accent1"/>
-          </a:lnRef>
-          <a:fillRef idx="0">
-            <a:schemeClr val="accent1"/>
-          </a:fillRef>
-          <a:effectRef idx="1">
-            <a:schemeClr val="accent1"/>
-          </a:effectRef>
-          <a:fontRef idx="minor">
-            <a:schemeClr val="tx1"/>
-          </a:fontRef>
-        </p:style>
-      </p:cxnSp>
-      <p:sp>
-        <p:nvSpPr>
-          <p:cNvPr id="11" name="TextBox 10">
-            <a:extLst>
-              <a:ext uri="{FF2B5EF4-FFF2-40B4-BE49-F238E27FC236}">
-                <a16:creationId xmlns:a16="http://schemas.microsoft.com/office/drawing/2014/main" id="{CDA92900-1463-A123-44AB-BF16470B7F42}"/>
-              </a:ext>
-            </a:extLst>
-          </p:cNvPr>
-          <p:cNvSpPr txBox="1"/>
-          <p:nvPr/>
-        </p:nvSpPr>
-        <p:spPr>
-          <a:xfrm>
-            <a:off x="595652" y="5332150"/>
-            <a:ext cx="3135099" cy="369332"/>
-          </a:xfrm>
-          <a:prstGeom prst="rect">
-            <a:avLst/>
-          </a:prstGeom>
-          <a:noFill/>
-          <a:ln w="12700" cap="rnd">
-            <a:solidFill>
-              <a:schemeClr val="accent1"/>
-            </a:solidFill>
-          </a:ln>
-        </p:spPr>
-        <p:txBody>
-          <a:bodyPr wrap="square" rtlCol="0">
-            <a:spAutoFit/>
-          </a:bodyPr>
-          <a:lstStyle/>
-          <a:p>
-            <a:r>
-              <a:rPr lang="en-US" dirty="0"/>
-              <a:t>Graph Visuals </a:t>
-            </a:r>
-          </a:p>
-        </p:txBody>
-      </p:sp>
-      <p:sp>
-        <p:nvSpPr>
-          <p:cNvPr id="12" name="TextBox 11">
-            <a:extLst>
-              <a:ext uri="{FF2B5EF4-FFF2-40B4-BE49-F238E27FC236}">
-                <a16:creationId xmlns:a16="http://schemas.microsoft.com/office/drawing/2014/main" id="{FFCD9377-DD71-AE37-56AE-A0207C08BAB9}"/>
-              </a:ext>
-            </a:extLst>
-          </p:cNvPr>
-          <p:cNvSpPr txBox="1"/>
-          <p:nvPr/>
-        </p:nvSpPr>
-        <p:spPr>
-          <a:xfrm>
-            <a:off x="4919472" y="5239817"/>
-            <a:ext cx="6510528" cy="461665"/>
-          </a:xfrm>
-          <a:prstGeom prst="rect">
-            <a:avLst/>
-          </a:prstGeom>
-          <a:noFill/>
-          <a:ln w="12700" cap="rnd">
-            <a:solidFill>
-              <a:schemeClr val="accent1"/>
-            </a:solidFill>
-          </a:ln>
-        </p:spPr>
-        <p:txBody>
-          <a:bodyPr wrap="square" rtlCol="0">
-            <a:spAutoFit/>
-          </a:bodyPr>
-          <a:lstStyle>
-            <a:defPPr>
-              <a:defRPr lang="en-US"/>
-            </a:defPPr>
-            <a:lvl1pPr>
-              <a:defRPr/>
-            </a:lvl1pPr>
-          </a:lstStyle>
-          <a:p>
-            <a:r>
-              <a:rPr lang="en-US" sz="1200" b="0" dirty="0">
-                <a:solidFill>
-                  <a:srgbClr val="808080"/>
-                </a:solidFill>
-                <a:effectLst/>
-                <a:highlight>
-                  <a:srgbClr val="1E1E1E"/>
-                </a:highlight>
-                <a:latin typeface="Consolas" panose="020B0609020204030204" pitchFamily="49" charset="0"/>
-              </a:rPr>
-              <a:t>&lt;</a:t>
-            </a:r>
-            <a:r>
-              <a:rPr lang="en-US" sz="1200" b="0" dirty="0">
-                <a:solidFill>
-                  <a:srgbClr val="569CD6"/>
-                </a:solidFill>
-                <a:effectLst/>
-                <a:highlight>
-                  <a:srgbClr val="1E1E1E"/>
-                </a:highlight>
-                <a:latin typeface="Consolas" panose="020B0609020204030204" pitchFamily="49" charset="0"/>
-              </a:rPr>
-              <a:t>script</a:t>
-            </a:r>
-            <a:r>
-              <a:rPr lang="en-US" sz="1200" b="0" dirty="0">
-                <a:solidFill>
-                  <a:srgbClr val="D4D4D4"/>
-                </a:solidFill>
-                <a:effectLst/>
-                <a:highlight>
-                  <a:srgbClr val="1E1E1E"/>
-                </a:highlight>
-                <a:latin typeface="Consolas" panose="020B0609020204030204" pitchFamily="49" charset="0"/>
-              </a:rPr>
-              <a:t> </a:t>
-            </a:r>
-            <a:r>
-              <a:rPr lang="en-US" sz="1200" b="0" dirty="0" err="1">
-                <a:solidFill>
-                  <a:srgbClr val="9CDCFE"/>
-                </a:solidFill>
-                <a:effectLst/>
-                <a:highlight>
-                  <a:srgbClr val="1E1E1E"/>
-                </a:highlight>
-                <a:latin typeface="Consolas" panose="020B0609020204030204" pitchFamily="49" charset="0"/>
-              </a:rPr>
-              <a:t>src</a:t>
-            </a:r>
-            <a:r>
-              <a:rPr lang="en-US" sz="1200" b="0" dirty="0">
-                <a:solidFill>
-                  <a:srgbClr val="D4D4D4"/>
-                </a:solidFill>
-                <a:effectLst/>
-                <a:highlight>
-                  <a:srgbClr val="1E1E1E"/>
-                </a:highlight>
-                <a:latin typeface="Consolas" panose="020B0609020204030204" pitchFamily="49" charset="0"/>
-              </a:rPr>
-              <a:t>=</a:t>
-            </a:r>
-            <a:r>
-              <a:rPr lang="en-US" sz="1200" b="0" dirty="0">
-                <a:solidFill>
-                  <a:srgbClr val="CE9178"/>
-                </a:solidFill>
-                <a:effectLst/>
-                <a:highlight>
-                  <a:srgbClr val="1E1E1E"/>
-                </a:highlight>
-                <a:latin typeface="Consolas" panose="020B0609020204030204" pitchFamily="49" charset="0"/>
-              </a:rPr>
-              <a:t>"https://cdn.plot.ly/plotly-latest.min.js"</a:t>
-            </a:r>
-            <a:r>
-              <a:rPr lang="en-US" sz="1200" b="0" dirty="0">
-                <a:solidFill>
-                  <a:srgbClr val="808080"/>
-                </a:solidFill>
-                <a:effectLst/>
-                <a:highlight>
-                  <a:srgbClr val="1E1E1E"/>
-                </a:highlight>
-                <a:latin typeface="Consolas" panose="020B0609020204030204" pitchFamily="49" charset="0"/>
-              </a:rPr>
-              <a:t>&gt;&lt;/</a:t>
-            </a:r>
-            <a:r>
-              <a:rPr lang="en-US" sz="1200" b="0" dirty="0">
-                <a:solidFill>
-                  <a:srgbClr val="569CD6"/>
-                </a:solidFill>
-                <a:effectLst/>
-                <a:highlight>
-                  <a:srgbClr val="1E1E1E"/>
-                </a:highlight>
-                <a:latin typeface="Consolas" panose="020B0609020204030204" pitchFamily="49" charset="0"/>
-              </a:rPr>
-              <a:t>script</a:t>
-            </a:r>
-            <a:r>
-              <a:rPr lang="en-US" sz="1200" b="0" dirty="0">
-                <a:solidFill>
-                  <a:srgbClr val="808080"/>
-                </a:solidFill>
-                <a:effectLst/>
-                <a:highlight>
-                  <a:srgbClr val="1E1E1E"/>
-                </a:highlight>
-                <a:latin typeface="Consolas" panose="020B0609020204030204" pitchFamily="49" charset="0"/>
-              </a:rPr>
-              <a:t>&gt;</a:t>
-            </a:r>
-            <a:endParaRPr lang="en-US" sz="1200" b="0" dirty="0">
-              <a:solidFill>
-                <a:srgbClr val="D4D4D4"/>
-              </a:solidFill>
-              <a:effectLst/>
-              <a:highlight>
-                <a:srgbClr val="1E1E1E"/>
-              </a:highlight>
-              <a:latin typeface="Consolas" panose="020B0609020204030204" pitchFamily="49" charset="0"/>
-            </a:endParaRPr>
-          </a:p>
-          <a:p>
-            <a:endParaRPr lang="en-US" sz="1200" b="0" dirty="0">
-              <a:solidFill>
-                <a:srgbClr val="D4D4D4"/>
-              </a:solidFill>
-              <a:effectLst/>
-              <a:highlight>
-                <a:srgbClr val="1E1E1E"/>
-              </a:highlight>
-              <a:latin typeface="Consolas" panose="020B0609020204030204" pitchFamily="49" charset="0"/>
-            </a:endParaRPr>
-          </a:p>
-        </p:txBody>
-      </p:sp>
-      <p:cxnSp>
-        <p:nvCxnSpPr>
-          <p:cNvPr id="13" name="Straight Arrow Connector 12">
-            <a:extLst>
-              <a:ext uri="{FF2B5EF4-FFF2-40B4-BE49-F238E27FC236}">
-                <a16:creationId xmlns:a16="http://schemas.microsoft.com/office/drawing/2014/main" id="{63FD47B6-D1C2-E6B2-EA47-9DE456D35C52}"/>
-              </a:ext>
-            </a:extLst>
-          </p:cNvPr>
-          <p:cNvCxnSpPr>
-            <a:cxnSpLocks/>
-          </p:cNvCxnSpPr>
-          <p:nvPr/>
-        </p:nvCxnSpPr>
-        <p:spPr>
-          <a:xfrm>
-            <a:off x="4081368" y="5450687"/>
-            <a:ext cx="775855" cy="0"/>
-          </a:xfrm>
-          <a:prstGeom prst="straightConnector1">
-            <a:avLst/>
-          </a:prstGeom>
-          <a:ln w="57150">
-            <a:tailEnd type="triangle"/>
-          </a:ln>
-        </p:spPr>
-        <p:style>
-          <a:lnRef idx="2">
-            <a:schemeClr val="accent1"/>
-          </a:lnRef>
-          <a:fillRef idx="0">
-            <a:schemeClr val="accent1"/>
-          </a:fillRef>
-          <a:effectRef idx="1">
-            <a:schemeClr val="accent1"/>
-          </a:effectRef>
-          <a:fontRef idx="minor">
-            <a:schemeClr val="tx1"/>
-          </a:fontRef>
-        </p:style>
-      </p:cxnSp>
-    </p:spTree>
-    <p:extLst>
-      <p:ext uri="{BB962C8B-B14F-4D97-AF65-F5344CB8AC3E}">
-        <p14:creationId xmlns:p14="http://schemas.microsoft.com/office/powerpoint/2010/main" val="675222058"/>
-      </p:ext>
-    </p:extLst>
-  </p:cSld>
-  <p:clrMapOvr>
-    <a:masterClrMapping/>
-  </p:clrMapOvr>
-</p:sld>
-</file>
-
-<file path=ppt/slides/slide8.xml><?xml version="1.0" encoding="utf-8"?>
-<p:sld xmlns:a="http://schemas.openxmlformats.org/drawingml/2006/main" xmlns:r="http://schemas.openxmlformats.org/officeDocument/2006/relationships" xmlns:p="http://schemas.openxmlformats.org/presentationml/2006/main">
-  <p:cSld>
-    <p:spTree>
-      <p:nvGrpSpPr>
-        <p:cNvPr id="1" name=""/>
-        <p:cNvGrpSpPr/>
-        <p:nvPr/>
-      </p:nvGrpSpPr>
-      <p:grpSpPr>
-        <a:xfrm>
-          <a:off x="0" y="0"/>
-          <a:ext cx="0" cy="0"/>
-          <a:chOff x="0" y="0"/>
-          <a:chExt cx="0" cy="0"/>
-        </a:xfrm>
-      </p:grpSpPr>
-      <p:sp>
-        <p:nvSpPr>
-          <p:cNvPr id="2" name="Title 1">
-            <a:extLst>
-              <a:ext uri="{FF2B5EF4-FFF2-40B4-BE49-F238E27FC236}">
-                <a16:creationId xmlns:a16="http://schemas.microsoft.com/office/drawing/2014/main" id="{792CF614-8A26-89E2-AE07-1602A5BBCEFA}"/>
-              </a:ext>
-            </a:extLst>
-          </p:cNvPr>
-          <p:cNvSpPr>
-            <a:spLocks noGrp="1"/>
-          </p:cNvSpPr>
-          <p:nvPr>
-            <p:ph type="title"/>
-          </p:nvPr>
-        </p:nvSpPr>
-        <p:spPr/>
-        <p:txBody>
-          <a:bodyPr/>
-          <a:lstStyle/>
-          <a:p>
-            <a:pPr algn="ctr"/>
-            <a:r>
-              <a:rPr lang="en-US" dirty="0"/>
-              <a:t>Conclusion</a:t>
-            </a:r>
-          </a:p>
-        </p:txBody>
-      </p:sp>
-      <p:sp>
-        <p:nvSpPr>
-          <p:cNvPr id="3" name="Content Placeholder 2">
-            <a:extLst>
-              <a:ext uri="{FF2B5EF4-FFF2-40B4-BE49-F238E27FC236}">
-                <a16:creationId xmlns:a16="http://schemas.microsoft.com/office/drawing/2014/main" id="{45C7E082-7169-14B0-95F1-3B5E75C605D4}"/>
-              </a:ext>
-            </a:extLst>
-          </p:cNvPr>
-          <p:cNvSpPr>
-            <a:spLocks noGrp="1"/>
-          </p:cNvSpPr>
-          <p:nvPr>
-            <p:ph idx="1"/>
-          </p:nvPr>
-        </p:nvSpPr>
-        <p:spPr/>
-        <p:txBody>
-          <a:bodyPr>
-            <a:normAutofit/>
-          </a:bodyPr>
-          <a:lstStyle/>
-          <a:p>
-            <a:pPr marL="0" indent="0">
-              <a:buNone/>
-            </a:pPr>
-            <a:r>
-              <a:rPr lang="en-US" sz="1800" dirty="0"/>
-              <a:t>Summarize the visuals</a:t>
-            </a:r>
-          </a:p>
-          <a:p>
-            <a:r>
-              <a:rPr lang="en-US" sz="1800" dirty="0"/>
-              <a:t>World Density– not many players internationally join the American MLB.</a:t>
-            </a:r>
-          </a:p>
-          <a:p>
-            <a:r>
-              <a:rPr lang="en-US" sz="1800" dirty="0"/>
-              <a:t>States Density – Base on the visual we can tell that California has produce the most MLB players. </a:t>
-            </a:r>
-          </a:p>
-          <a:p>
-            <a:r>
-              <a:rPr lang="en-US" sz="1800" dirty="0"/>
-              <a:t>MLB players birth years – Most players born from 1960’s into late 1980’s contributed to the MLB.</a:t>
-            </a:r>
-          </a:p>
-          <a:p>
-            <a:endParaRPr lang="en-US" sz="1800" dirty="0"/>
-          </a:p>
-          <a:p>
-            <a:endParaRPr lang="en-US" sz="1800"/>
-          </a:p>
-          <a:p>
-            <a:endParaRPr lang="en-US" sz="1800" dirty="0"/>
-          </a:p>
-        </p:txBody>
-      </p:sp>
-      <p:pic>
-        <p:nvPicPr>
-          <p:cNvPr id="5" name="Picture 4" descr="A baseball bat and glove on a dirt field&#10;&#10;Description automatically generated">
-            <a:extLst>
-              <a:ext uri="{FF2B5EF4-FFF2-40B4-BE49-F238E27FC236}">
-                <a16:creationId xmlns:a16="http://schemas.microsoft.com/office/drawing/2014/main" id="{170D67A4-2436-81AE-9002-6E7534C3383F}"/>
-              </a:ext>
-            </a:extLst>
-          </p:cNvPr>
-          <p:cNvPicPr>
-            <a:picLocks noChangeAspect="1"/>
-          </p:cNvPicPr>
-          <p:nvPr/>
-        </p:nvPicPr>
-        <p:blipFill>
-          <a:blip r:embed="rId2">
-            <a:extLst>
-              <a:ext uri="{28A0092B-C50C-407E-A947-70E740481C1C}">
-                <a14:useLocalDpi xmlns:a14="http://schemas.microsoft.com/office/drawing/2010/main" val="0"/>
-              </a:ext>
-            </a:extLst>
-          </a:blip>
-          <a:stretch>
-            <a:fillRect/>
-          </a:stretch>
-        </p:blipFill>
-        <p:spPr>
-          <a:xfrm>
-            <a:off x="3473996" y="3653103"/>
-            <a:ext cx="3702659" cy="2184279"/>
-          </a:xfrm>
-          <a:prstGeom prst="rect">
-            <a:avLst/>
-          </a:prstGeom>
-        </p:spPr>
-      </p:pic>
-      <p:sp>
-        <p:nvSpPr>
-          <p:cNvPr id="4" name="TextBox 3">
-            <a:extLst>
-              <a:ext uri="{FF2B5EF4-FFF2-40B4-BE49-F238E27FC236}">
-                <a16:creationId xmlns:a16="http://schemas.microsoft.com/office/drawing/2014/main" id="{823740D6-244B-0A0C-4B9D-9D5EB7FDB863}"/>
-              </a:ext>
-            </a:extLst>
-          </p:cNvPr>
-          <p:cNvSpPr txBox="1"/>
-          <p:nvPr/>
-        </p:nvSpPr>
-        <p:spPr>
-          <a:xfrm>
-            <a:off x="73891" y="6308209"/>
-            <a:ext cx="12044218" cy="369332"/>
-          </a:xfrm>
-          <a:prstGeom prst="rect">
-            <a:avLst/>
-          </a:prstGeom>
-          <a:noFill/>
-          <a:ln w="12700" cap="rnd">
-            <a:solidFill>
-              <a:schemeClr val="accent1"/>
-            </a:solidFill>
-          </a:ln>
-        </p:spPr>
-        <p:txBody>
-          <a:bodyPr wrap="square" rtlCol="0">
-            <a:spAutoFit/>
-          </a:bodyPr>
-          <a:lstStyle>
-            <a:defPPr>
-              <a:defRPr lang="en-US"/>
-            </a:defPPr>
-            <a:lvl1pPr>
-              <a:defRPr/>
-            </a:lvl1pPr>
-          </a:lstStyle>
-          <a:p>
-            <a:r>
-              <a:rPr lang="en-US" dirty="0"/>
-              <a:t>Web Project Repositor : </a:t>
-            </a:r>
-            <a:r>
-              <a:rPr lang="en-US" i="1" dirty="0">
-                <a:solidFill>
-                  <a:schemeClr val="tx2">
-                    <a:lumMod val="90000"/>
-                    <a:lumOff val="10000"/>
-                  </a:schemeClr>
-                </a:solidFill>
-              </a:rPr>
-              <a:t>https://github.com/leeju09/Project-3-Baseball-</a:t>
-            </a:r>
-          </a:p>
-        </p:txBody>
-      </p:sp>
-    </p:spTree>
-    <p:extLst>
-      <p:ext uri="{BB962C8B-B14F-4D97-AF65-F5344CB8AC3E}">
         <p14:creationId xmlns:p14="http://schemas.microsoft.com/office/powerpoint/2010/main" val="3650296232"/>
-      </p:ext>
-    </p:extLst>
-  </p:cSld>
-  <p:clrMapOvr>
-    <a:masterClrMapping/>
-  </p:clrMapOvr>
-</p:sld>
-</file>
-
-<file path=ppt/slides/slide9.xml><?xml version="1.0" encoding="utf-8"?>
-<p:sld xmlns:a="http://schemas.openxmlformats.org/drawingml/2006/main" xmlns:r="http://schemas.openxmlformats.org/officeDocument/2006/relationships" xmlns:p="http://schemas.openxmlformats.org/presentationml/2006/main">
-  <p:cSld>
-    <p:spTree>
-      <p:nvGrpSpPr>
-        <p:cNvPr id="1" name=""/>
-        <p:cNvGrpSpPr/>
-        <p:nvPr/>
-      </p:nvGrpSpPr>
-      <p:grpSpPr>
-        <a:xfrm>
-          <a:off x="0" y="0"/>
-          <a:ext cx="0" cy="0"/>
-          <a:chOff x="0" y="0"/>
-          <a:chExt cx="0" cy="0"/>
-        </a:xfrm>
-      </p:grpSpPr>
-      <p:sp>
-        <p:nvSpPr>
-          <p:cNvPr id="2" name="Title 1">
-            <a:extLst>
-              <a:ext uri="{FF2B5EF4-FFF2-40B4-BE49-F238E27FC236}">
-                <a16:creationId xmlns:a16="http://schemas.microsoft.com/office/drawing/2014/main" id="{3EDC26B8-2F0A-193E-D0C0-63B585F2D516}"/>
-              </a:ext>
-            </a:extLst>
-          </p:cNvPr>
-          <p:cNvSpPr>
-            <a:spLocks noGrp="1"/>
-          </p:cNvSpPr>
-          <p:nvPr>
-            <p:ph type="title"/>
-          </p:nvPr>
-        </p:nvSpPr>
-        <p:spPr>
-          <a:xfrm>
-            <a:off x="838200" y="365125"/>
-            <a:ext cx="10515600" cy="1205057"/>
-          </a:xfrm>
-        </p:spPr>
-        <p:txBody>
-          <a:bodyPr/>
-          <a:lstStyle/>
-          <a:p>
-            <a:pPr algn="ctr"/>
-            <a:r>
-              <a:rPr lang="en-US" dirty="0"/>
-              <a:t>Q &amp; A</a:t>
-            </a:r>
-          </a:p>
-        </p:txBody>
-      </p:sp>
-    </p:spTree>
-    <p:extLst>
-      <p:ext uri="{BB962C8B-B14F-4D97-AF65-F5344CB8AC3E}">
-        <p14:creationId xmlns:p14="http://schemas.microsoft.com/office/powerpoint/2010/main" val="3347308563"/>
       </p:ext>
     </p:extLst>
   </p:cSld>

</xml_diff>